<commit_message>
Slide update: K8s, GitOps
</commit_message>
<xml_diff>
--- a/slides/Introduction to Kubernetes.pptx
+++ b/slides/Introduction to Kubernetes.pptx
@@ -5,7 +5,7 @@
     <p:sldMasterId id="2147483648" r:id="rId1"/>
   </p:sldMasterIdLst>
   <p:notesMasterIdLst>
-    <p:notesMasterId r:id="rId8"/>
+    <p:notesMasterId r:id="rId10"/>
   </p:notesMasterIdLst>
   <p:sldIdLst>
     <p:sldId id="256" r:id="rId2"/>
@@ -14,6 +14,8 @@
     <p:sldId id="259" r:id="rId5"/>
     <p:sldId id="261" r:id="rId6"/>
     <p:sldId id="260" r:id="rId7"/>
+    <p:sldId id="262" r:id="rId8"/>
+    <p:sldId id="263" r:id="rId9"/>
   </p:sldIdLst>
   <p:sldSz cx="12192000" cy="6858000"/>
   <p:notesSz cx="6858000" cy="9144000"/>
@@ -868,7 +870,7 @@
 </file>
 
 <file path=ppt/diagrams/colors2.xml><?xml version="1.0" encoding="utf-8"?>
-<dgm:colorsDef xmlns:dgm="http://schemas.openxmlformats.org/drawingml/2006/diagram" xmlns:a="http://schemas.openxmlformats.org/drawingml/2006/main" uniqueId="urn:microsoft.com/office/officeart/2018/5/colors/Iconchunking_neutralbg_accent1_2">
+<dgm:colorsDef xmlns:dgm="http://schemas.openxmlformats.org/drawingml/2006/diagram" xmlns:a="http://schemas.openxmlformats.org/drawingml/2006/main" uniqueId="urn:microsoft.com/office/officeart/2005/8/colors/accent1_2">
   <dgm:title val=""/>
   <dgm:desc val=""/>
   <dgm:catLst>
@@ -903,9 +905,7 @@
       <a:schemeClr val="accent1"/>
     </dgm:fillClrLst>
     <dgm:linClrLst meth="repeat">
-      <a:schemeClr val="lt1">
-        <a:alpha val="0"/>
-      </a:schemeClr>
+      <a:schemeClr val="lt1"/>
     </dgm:linClrLst>
     <dgm:effectClrLst/>
     <dgm:txLinClrLst/>
@@ -1532,8 +1532,8 @@
   </dgm:styleLbl>
   <dgm:styleLbl name="bgShp">
     <dgm:fillClrLst meth="repeat">
-      <a:schemeClr val="bg1">
-        <a:lumMod val="95000"/>
+      <a:schemeClr val="accent1">
+        <a:tint val="40000"/>
       </a:schemeClr>
     </dgm:fillClrLst>
     <dgm:linClrLst meth="repeat">
@@ -1616,7 +1616,1143 @@
 </dgm:colorsDef>
 </file>
 
+<file path=ppt/diagrams/colors3.xml><?xml version="1.0" encoding="utf-8"?>
+<dgm:colorsDef xmlns:dgm="http://schemas.openxmlformats.org/drawingml/2006/diagram" xmlns:a="http://schemas.openxmlformats.org/drawingml/2006/main" uniqueId="urn:microsoft.com/office/officeart/2018/5/colors/Iconchunking_neutralbg_accent1_2">
+  <dgm:title val=""/>
+  <dgm:desc val=""/>
+  <dgm:catLst>
+    <dgm:cat type="accent1" pri="11200"/>
+  </dgm:catLst>
+  <dgm:styleLbl name="node0">
+    <dgm:fillClrLst meth="repeat">
+      <a:schemeClr val="accent1"/>
+    </dgm:fillClrLst>
+    <dgm:linClrLst meth="repeat">
+      <a:schemeClr val="lt1"/>
+    </dgm:linClrLst>
+    <dgm:effectClrLst/>
+    <dgm:txLinClrLst/>
+    <dgm:txFillClrLst/>
+    <dgm:txEffectClrLst/>
+  </dgm:styleLbl>
+  <dgm:styleLbl name="alignNode1">
+    <dgm:fillClrLst meth="repeat">
+      <a:schemeClr val="accent1"/>
+    </dgm:fillClrLst>
+    <dgm:linClrLst meth="repeat">
+      <a:schemeClr val="accent1"/>
+    </dgm:linClrLst>
+    <dgm:effectClrLst/>
+    <dgm:txLinClrLst/>
+    <dgm:txFillClrLst/>
+    <dgm:txEffectClrLst/>
+  </dgm:styleLbl>
+  <dgm:styleLbl name="node1">
+    <dgm:fillClrLst meth="repeat">
+      <a:schemeClr val="accent1"/>
+    </dgm:fillClrLst>
+    <dgm:linClrLst meth="repeat">
+      <a:schemeClr val="lt1">
+        <a:alpha val="0"/>
+      </a:schemeClr>
+    </dgm:linClrLst>
+    <dgm:effectClrLst/>
+    <dgm:txLinClrLst/>
+    <dgm:txFillClrLst/>
+    <dgm:txEffectClrLst/>
+  </dgm:styleLbl>
+  <dgm:styleLbl name="lnNode1">
+    <dgm:fillClrLst meth="repeat">
+      <a:schemeClr val="accent1"/>
+    </dgm:fillClrLst>
+    <dgm:linClrLst meth="repeat">
+      <a:schemeClr val="lt1"/>
+    </dgm:linClrLst>
+    <dgm:effectClrLst/>
+    <dgm:txLinClrLst/>
+    <dgm:txFillClrLst/>
+    <dgm:txEffectClrLst/>
+  </dgm:styleLbl>
+  <dgm:styleLbl name="vennNode1">
+    <dgm:fillClrLst meth="repeat">
+      <a:schemeClr val="accent1">
+        <a:alpha val="50000"/>
+      </a:schemeClr>
+    </dgm:fillClrLst>
+    <dgm:linClrLst meth="repeat">
+      <a:schemeClr val="lt1"/>
+    </dgm:linClrLst>
+    <dgm:effectClrLst/>
+    <dgm:txLinClrLst/>
+    <dgm:txFillClrLst/>
+    <dgm:txEffectClrLst/>
+  </dgm:styleLbl>
+  <dgm:styleLbl name="node2">
+    <dgm:fillClrLst meth="repeat">
+      <a:schemeClr val="accent1"/>
+    </dgm:fillClrLst>
+    <dgm:linClrLst meth="repeat">
+      <a:schemeClr val="lt1"/>
+    </dgm:linClrLst>
+    <dgm:effectClrLst/>
+    <dgm:txLinClrLst/>
+    <dgm:txFillClrLst/>
+    <dgm:txEffectClrLst/>
+  </dgm:styleLbl>
+  <dgm:styleLbl name="node3">
+    <dgm:fillClrLst meth="repeat">
+      <a:schemeClr val="accent1"/>
+    </dgm:fillClrLst>
+    <dgm:linClrLst meth="repeat">
+      <a:schemeClr val="lt1"/>
+    </dgm:linClrLst>
+    <dgm:effectClrLst/>
+    <dgm:txLinClrLst/>
+    <dgm:txFillClrLst/>
+    <dgm:txEffectClrLst/>
+  </dgm:styleLbl>
+  <dgm:styleLbl name="node4">
+    <dgm:fillClrLst meth="repeat">
+      <a:schemeClr val="accent1"/>
+    </dgm:fillClrLst>
+    <dgm:linClrLst meth="repeat">
+      <a:schemeClr val="lt1"/>
+    </dgm:linClrLst>
+    <dgm:effectClrLst/>
+    <dgm:txLinClrLst/>
+    <dgm:txFillClrLst/>
+    <dgm:txEffectClrLst/>
+  </dgm:styleLbl>
+  <dgm:styleLbl name="fgImgPlace1">
+    <dgm:fillClrLst meth="repeat">
+      <a:schemeClr val="accent1">
+        <a:tint val="50000"/>
+      </a:schemeClr>
+    </dgm:fillClrLst>
+    <dgm:linClrLst meth="repeat">
+      <a:schemeClr val="lt1"/>
+    </dgm:linClrLst>
+    <dgm:effectClrLst/>
+    <dgm:txLinClrLst/>
+    <dgm:txFillClrLst meth="repeat">
+      <a:schemeClr val="lt1"/>
+    </dgm:txFillClrLst>
+    <dgm:txEffectClrLst/>
+  </dgm:styleLbl>
+  <dgm:styleLbl name="alignImgPlace1">
+    <dgm:fillClrLst meth="repeat">
+      <a:schemeClr val="accent1">
+        <a:tint val="50000"/>
+      </a:schemeClr>
+    </dgm:fillClrLst>
+    <dgm:linClrLst meth="repeat">
+      <a:schemeClr val="lt1"/>
+    </dgm:linClrLst>
+    <dgm:effectClrLst/>
+    <dgm:txLinClrLst/>
+    <dgm:txFillClrLst meth="repeat">
+      <a:schemeClr val="lt1"/>
+    </dgm:txFillClrLst>
+    <dgm:txEffectClrLst/>
+  </dgm:styleLbl>
+  <dgm:styleLbl name="bgImgPlace1">
+    <dgm:fillClrLst meth="repeat">
+      <a:schemeClr val="accent1">
+        <a:tint val="50000"/>
+      </a:schemeClr>
+    </dgm:fillClrLst>
+    <dgm:linClrLst meth="repeat">
+      <a:schemeClr val="lt1"/>
+    </dgm:linClrLst>
+    <dgm:effectClrLst/>
+    <dgm:txLinClrLst/>
+    <dgm:txFillClrLst meth="repeat">
+      <a:schemeClr val="lt1"/>
+    </dgm:txFillClrLst>
+    <dgm:txEffectClrLst/>
+  </dgm:styleLbl>
+  <dgm:styleLbl name="sibTrans2D1">
+    <dgm:fillClrLst meth="repeat">
+      <a:schemeClr val="accent1">
+        <a:tint val="60000"/>
+      </a:schemeClr>
+    </dgm:fillClrLst>
+    <dgm:linClrLst meth="repeat">
+      <a:schemeClr val="accent1">
+        <a:tint val="60000"/>
+      </a:schemeClr>
+    </dgm:linClrLst>
+    <dgm:effectClrLst/>
+    <dgm:txLinClrLst/>
+    <dgm:txFillClrLst/>
+    <dgm:txEffectClrLst/>
+  </dgm:styleLbl>
+  <dgm:styleLbl name="fgSibTrans2D1">
+    <dgm:fillClrLst meth="repeat">
+      <a:schemeClr val="accent1">
+        <a:tint val="60000"/>
+      </a:schemeClr>
+    </dgm:fillClrLst>
+    <dgm:linClrLst meth="repeat">
+      <a:schemeClr val="accent1">
+        <a:tint val="60000"/>
+      </a:schemeClr>
+    </dgm:linClrLst>
+    <dgm:effectClrLst/>
+    <dgm:txLinClrLst/>
+    <dgm:txFillClrLst/>
+    <dgm:txEffectClrLst/>
+  </dgm:styleLbl>
+  <dgm:styleLbl name="bgSibTrans2D1">
+    <dgm:fillClrLst meth="repeat">
+      <a:schemeClr val="accent1">
+        <a:tint val="60000"/>
+      </a:schemeClr>
+    </dgm:fillClrLst>
+    <dgm:linClrLst meth="repeat">
+      <a:schemeClr val="accent1">
+        <a:tint val="60000"/>
+      </a:schemeClr>
+    </dgm:linClrLst>
+    <dgm:effectClrLst/>
+    <dgm:txLinClrLst/>
+    <dgm:txFillClrLst/>
+    <dgm:txEffectClrLst/>
+  </dgm:styleLbl>
+  <dgm:styleLbl name="sibTrans1D1">
+    <dgm:fillClrLst meth="repeat">
+      <a:schemeClr val="accent1"/>
+    </dgm:fillClrLst>
+    <dgm:linClrLst meth="repeat">
+      <a:schemeClr val="accent1"/>
+    </dgm:linClrLst>
+    <dgm:effectClrLst/>
+    <dgm:txLinClrLst/>
+    <dgm:txFillClrLst meth="repeat">
+      <a:schemeClr val="tx1"/>
+    </dgm:txFillClrLst>
+    <dgm:txEffectClrLst/>
+  </dgm:styleLbl>
+  <dgm:styleLbl name="callout">
+    <dgm:fillClrLst meth="repeat">
+      <a:schemeClr val="accent1"/>
+    </dgm:fillClrLst>
+    <dgm:linClrLst meth="repeat">
+      <a:schemeClr val="accent1">
+        <a:tint val="50000"/>
+      </a:schemeClr>
+    </dgm:linClrLst>
+    <dgm:effectClrLst/>
+    <dgm:txLinClrLst/>
+    <dgm:txFillClrLst meth="repeat">
+      <a:schemeClr val="tx1"/>
+    </dgm:txFillClrLst>
+    <dgm:txEffectClrLst/>
+  </dgm:styleLbl>
+  <dgm:styleLbl name="asst0">
+    <dgm:fillClrLst meth="repeat">
+      <a:schemeClr val="accent1"/>
+    </dgm:fillClrLst>
+    <dgm:linClrLst meth="repeat">
+      <a:schemeClr val="lt1"/>
+    </dgm:linClrLst>
+    <dgm:effectClrLst/>
+    <dgm:txLinClrLst/>
+    <dgm:txFillClrLst/>
+    <dgm:txEffectClrLst/>
+  </dgm:styleLbl>
+  <dgm:styleLbl name="asst1">
+    <dgm:fillClrLst meth="repeat">
+      <a:schemeClr val="accent1"/>
+    </dgm:fillClrLst>
+    <dgm:linClrLst meth="repeat">
+      <a:schemeClr val="lt1"/>
+    </dgm:linClrLst>
+    <dgm:effectClrLst/>
+    <dgm:txLinClrLst/>
+    <dgm:txFillClrLst/>
+    <dgm:txEffectClrLst/>
+  </dgm:styleLbl>
+  <dgm:styleLbl name="asst2">
+    <dgm:fillClrLst meth="repeat">
+      <a:schemeClr val="accent1"/>
+    </dgm:fillClrLst>
+    <dgm:linClrLst meth="repeat">
+      <a:schemeClr val="lt1"/>
+    </dgm:linClrLst>
+    <dgm:effectClrLst/>
+    <dgm:txLinClrLst/>
+    <dgm:txFillClrLst/>
+    <dgm:txEffectClrLst/>
+  </dgm:styleLbl>
+  <dgm:styleLbl name="asst3">
+    <dgm:fillClrLst meth="repeat">
+      <a:schemeClr val="accent1"/>
+    </dgm:fillClrLst>
+    <dgm:linClrLst meth="repeat">
+      <a:schemeClr val="lt1"/>
+    </dgm:linClrLst>
+    <dgm:effectClrLst/>
+    <dgm:txLinClrLst/>
+    <dgm:txFillClrLst/>
+    <dgm:txEffectClrLst/>
+  </dgm:styleLbl>
+  <dgm:styleLbl name="asst4">
+    <dgm:fillClrLst meth="repeat">
+      <a:schemeClr val="accent1"/>
+    </dgm:fillClrLst>
+    <dgm:linClrLst meth="repeat">
+      <a:schemeClr val="lt1"/>
+    </dgm:linClrLst>
+    <dgm:effectClrLst/>
+    <dgm:txLinClrLst/>
+    <dgm:txFillClrLst/>
+    <dgm:txEffectClrLst/>
+  </dgm:styleLbl>
+  <dgm:styleLbl name="parChTrans2D1">
+    <dgm:fillClrLst meth="repeat">
+      <a:schemeClr val="accent1">
+        <a:tint val="60000"/>
+      </a:schemeClr>
+    </dgm:fillClrLst>
+    <dgm:linClrLst meth="repeat">
+      <a:schemeClr val="accent1">
+        <a:tint val="60000"/>
+      </a:schemeClr>
+    </dgm:linClrLst>
+    <dgm:effectClrLst/>
+    <dgm:txLinClrLst/>
+    <dgm:txFillClrLst meth="repeat">
+      <a:schemeClr val="lt1"/>
+    </dgm:txFillClrLst>
+    <dgm:txEffectClrLst/>
+  </dgm:styleLbl>
+  <dgm:styleLbl name="parChTrans2D2">
+    <dgm:fillClrLst meth="repeat">
+      <a:schemeClr val="accent1"/>
+    </dgm:fillClrLst>
+    <dgm:linClrLst meth="repeat">
+      <a:schemeClr val="accent1"/>
+    </dgm:linClrLst>
+    <dgm:effectClrLst/>
+    <dgm:txLinClrLst/>
+    <dgm:txFillClrLst meth="repeat">
+      <a:schemeClr val="lt1"/>
+    </dgm:txFillClrLst>
+    <dgm:txEffectClrLst/>
+  </dgm:styleLbl>
+  <dgm:styleLbl name="parChTrans2D3">
+    <dgm:fillClrLst meth="repeat">
+      <a:schemeClr val="accent1"/>
+    </dgm:fillClrLst>
+    <dgm:linClrLst meth="repeat">
+      <a:schemeClr val="accent1"/>
+    </dgm:linClrLst>
+    <dgm:effectClrLst/>
+    <dgm:txLinClrLst/>
+    <dgm:txFillClrLst meth="repeat">
+      <a:schemeClr val="lt1"/>
+    </dgm:txFillClrLst>
+    <dgm:txEffectClrLst/>
+  </dgm:styleLbl>
+  <dgm:styleLbl name="parChTrans2D4">
+    <dgm:fillClrLst meth="repeat">
+      <a:schemeClr val="accent1"/>
+    </dgm:fillClrLst>
+    <dgm:linClrLst meth="repeat">
+      <a:schemeClr val="accent1"/>
+    </dgm:linClrLst>
+    <dgm:effectClrLst/>
+    <dgm:txLinClrLst/>
+    <dgm:txFillClrLst meth="repeat">
+      <a:schemeClr val="lt1"/>
+    </dgm:txFillClrLst>
+    <dgm:txEffectClrLst/>
+  </dgm:styleLbl>
+  <dgm:styleLbl name="parChTrans1D1">
+    <dgm:fillClrLst meth="repeat">
+      <a:schemeClr val="accent1"/>
+    </dgm:fillClrLst>
+    <dgm:linClrLst meth="repeat">
+      <a:schemeClr val="accent1">
+        <a:shade val="60000"/>
+      </a:schemeClr>
+    </dgm:linClrLst>
+    <dgm:effectClrLst/>
+    <dgm:txLinClrLst/>
+    <dgm:txFillClrLst meth="repeat">
+      <a:schemeClr val="tx1"/>
+    </dgm:txFillClrLst>
+    <dgm:txEffectClrLst/>
+  </dgm:styleLbl>
+  <dgm:styleLbl name="parChTrans1D2">
+    <dgm:fillClrLst meth="repeat">
+      <a:schemeClr val="accent1"/>
+    </dgm:fillClrLst>
+    <dgm:linClrLst meth="repeat">
+      <a:schemeClr val="accent1">
+        <a:shade val="60000"/>
+      </a:schemeClr>
+    </dgm:linClrLst>
+    <dgm:effectClrLst/>
+    <dgm:txLinClrLst/>
+    <dgm:txFillClrLst meth="repeat">
+      <a:schemeClr val="tx1"/>
+    </dgm:txFillClrLst>
+    <dgm:txEffectClrLst/>
+  </dgm:styleLbl>
+  <dgm:styleLbl name="parChTrans1D3">
+    <dgm:fillClrLst meth="repeat">
+      <a:schemeClr val="accent1"/>
+    </dgm:fillClrLst>
+    <dgm:linClrLst meth="repeat">
+      <a:schemeClr val="accent1">
+        <a:shade val="80000"/>
+      </a:schemeClr>
+    </dgm:linClrLst>
+    <dgm:effectClrLst/>
+    <dgm:txLinClrLst/>
+    <dgm:txFillClrLst meth="repeat">
+      <a:schemeClr val="tx1"/>
+    </dgm:txFillClrLst>
+    <dgm:txEffectClrLst/>
+  </dgm:styleLbl>
+  <dgm:styleLbl name="parChTrans1D4">
+    <dgm:fillClrLst meth="repeat">
+      <a:schemeClr val="accent1"/>
+    </dgm:fillClrLst>
+    <dgm:linClrLst meth="repeat">
+      <a:schemeClr val="accent1">
+        <a:shade val="80000"/>
+      </a:schemeClr>
+    </dgm:linClrLst>
+    <dgm:effectClrLst/>
+    <dgm:txLinClrLst/>
+    <dgm:txFillClrLst meth="repeat">
+      <a:schemeClr val="tx1"/>
+    </dgm:txFillClrLst>
+    <dgm:txEffectClrLst/>
+  </dgm:styleLbl>
+  <dgm:styleLbl name="fgAcc1">
+    <dgm:fillClrLst meth="repeat">
+      <a:schemeClr val="lt1">
+        <a:alpha val="90000"/>
+      </a:schemeClr>
+    </dgm:fillClrLst>
+    <dgm:linClrLst meth="repeat">
+      <a:schemeClr val="accent1"/>
+    </dgm:linClrLst>
+    <dgm:effectClrLst/>
+    <dgm:txLinClrLst/>
+    <dgm:txFillClrLst meth="repeat">
+      <a:schemeClr val="dk1"/>
+    </dgm:txFillClrLst>
+    <dgm:txEffectClrLst/>
+  </dgm:styleLbl>
+  <dgm:styleLbl name="conFgAcc1">
+    <dgm:fillClrLst meth="repeat">
+      <a:schemeClr val="lt1">
+        <a:alpha val="90000"/>
+      </a:schemeClr>
+    </dgm:fillClrLst>
+    <dgm:linClrLst meth="repeat">
+      <a:schemeClr val="accent1"/>
+    </dgm:linClrLst>
+    <dgm:effectClrLst/>
+    <dgm:txLinClrLst/>
+    <dgm:txFillClrLst meth="repeat">
+      <a:schemeClr val="dk1"/>
+    </dgm:txFillClrLst>
+    <dgm:txEffectClrLst/>
+  </dgm:styleLbl>
+  <dgm:styleLbl name="alignAcc1">
+    <dgm:fillClrLst meth="repeat">
+      <a:schemeClr val="lt1">
+        <a:alpha val="90000"/>
+      </a:schemeClr>
+    </dgm:fillClrLst>
+    <dgm:linClrLst meth="repeat">
+      <a:schemeClr val="accent1"/>
+    </dgm:linClrLst>
+    <dgm:effectClrLst/>
+    <dgm:txLinClrLst/>
+    <dgm:txFillClrLst meth="repeat">
+      <a:schemeClr val="dk1"/>
+    </dgm:txFillClrLst>
+    <dgm:txEffectClrLst/>
+  </dgm:styleLbl>
+  <dgm:styleLbl name="trAlignAcc1">
+    <dgm:fillClrLst meth="repeat">
+      <a:schemeClr val="lt1">
+        <a:alpha val="40000"/>
+      </a:schemeClr>
+    </dgm:fillClrLst>
+    <dgm:linClrLst meth="repeat">
+      <a:schemeClr val="accent1"/>
+    </dgm:linClrLst>
+    <dgm:effectClrLst/>
+    <dgm:txLinClrLst/>
+    <dgm:txFillClrLst meth="repeat">
+      <a:schemeClr val="dk1"/>
+    </dgm:txFillClrLst>
+    <dgm:txEffectClrLst/>
+  </dgm:styleLbl>
+  <dgm:styleLbl name="bgAcc1">
+    <dgm:fillClrLst meth="repeat">
+      <a:schemeClr val="lt1">
+        <a:alpha val="90000"/>
+      </a:schemeClr>
+    </dgm:fillClrLst>
+    <dgm:linClrLst meth="repeat">
+      <a:schemeClr val="accent1"/>
+    </dgm:linClrLst>
+    <dgm:effectClrLst/>
+    <dgm:txLinClrLst/>
+    <dgm:txFillClrLst meth="repeat">
+      <a:schemeClr val="dk1"/>
+    </dgm:txFillClrLst>
+    <dgm:txEffectClrLst/>
+  </dgm:styleLbl>
+  <dgm:styleLbl name="solidFgAcc1">
+    <dgm:fillClrLst meth="repeat">
+      <a:schemeClr val="lt1"/>
+    </dgm:fillClrLst>
+    <dgm:linClrLst meth="repeat">
+      <a:schemeClr val="accent1"/>
+    </dgm:linClrLst>
+    <dgm:effectClrLst/>
+    <dgm:txLinClrLst/>
+    <dgm:txFillClrLst meth="repeat">
+      <a:schemeClr val="dk1"/>
+    </dgm:txFillClrLst>
+    <dgm:txEffectClrLst/>
+  </dgm:styleLbl>
+  <dgm:styleLbl name="solidAlignAcc1">
+    <dgm:fillClrLst meth="repeat">
+      <a:schemeClr val="lt1"/>
+    </dgm:fillClrLst>
+    <dgm:linClrLst meth="repeat">
+      <a:schemeClr val="accent1"/>
+    </dgm:linClrLst>
+    <dgm:effectClrLst/>
+    <dgm:txLinClrLst/>
+    <dgm:txFillClrLst meth="repeat">
+      <a:schemeClr val="dk1"/>
+    </dgm:txFillClrLst>
+    <dgm:txEffectClrLst/>
+  </dgm:styleLbl>
+  <dgm:styleLbl name="solidBgAcc1">
+    <dgm:fillClrLst meth="repeat">
+      <a:schemeClr val="lt1"/>
+    </dgm:fillClrLst>
+    <dgm:linClrLst meth="repeat">
+      <a:schemeClr val="accent1"/>
+    </dgm:linClrLst>
+    <dgm:effectClrLst/>
+    <dgm:txLinClrLst/>
+    <dgm:txFillClrLst meth="repeat">
+      <a:schemeClr val="dk1"/>
+    </dgm:txFillClrLst>
+    <dgm:txEffectClrLst/>
+  </dgm:styleLbl>
+  <dgm:styleLbl name="fgAccFollowNode1">
+    <dgm:fillClrLst meth="repeat">
+      <a:schemeClr val="accent1">
+        <a:alpha val="90000"/>
+        <a:tint val="40000"/>
+      </a:schemeClr>
+    </dgm:fillClrLst>
+    <dgm:linClrLst meth="repeat">
+      <a:schemeClr val="accent1">
+        <a:alpha val="90000"/>
+        <a:tint val="40000"/>
+      </a:schemeClr>
+    </dgm:linClrLst>
+    <dgm:effectClrLst/>
+    <dgm:txLinClrLst/>
+    <dgm:txFillClrLst meth="repeat">
+      <a:schemeClr val="dk1"/>
+    </dgm:txFillClrLst>
+    <dgm:txEffectClrLst/>
+  </dgm:styleLbl>
+  <dgm:styleLbl name="alignAccFollowNode1">
+    <dgm:fillClrLst meth="repeat">
+      <a:schemeClr val="accent1">
+        <a:alpha val="90000"/>
+        <a:tint val="40000"/>
+      </a:schemeClr>
+    </dgm:fillClrLst>
+    <dgm:linClrLst meth="repeat">
+      <a:schemeClr val="accent1">
+        <a:alpha val="90000"/>
+        <a:tint val="40000"/>
+      </a:schemeClr>
+    </dgm:linClrLst>
+    <dgm:effectClrLst/>
+    <dgm:txLinClrLst/>
+    <dgm:txFillClrLst meth="repeat">
+      <a:schemeClr val="dk1"/>
+    </dgm:txFillClrLst>
+    <dgm:txEffectClrLst/>
+  </dgm:styleLbl>
+  <dgm:styleLbl name="bgAccFollowNode1">
+    <dgm:fillClrLst meth="repeat">
+      <a:schemeClr val="accent1">
+        <a:alpha val="90000"/>
+        <a:tint val="40000"/>
+      </a:schemeClr>
+    </dgm:fillClrLst>
+    <dgm:linClrLst meth="repeat">
+      <a:schemeClr val="accent1">
+        <a:alpha val="90000"/>
+        <a:tint val="40000"/>
+      </a:schemeClr>
+    </dgm:linClrLst>
+    <dgm:effectClrLst/>
+    <dgm:txLinClrLst/>
+    <dgm:txFillClrLst meth="repeat">
+      <a:schemeClr val="dk1"/>
+    </dgm:txFillClrLst>
+    <dgm:txEffectClrLst/>
+  </dgm:styleLbl>
+  <dgm:styleLbl name="fgAcc0">
+    <dgm:fillClrLst meth="repeat">
+      <a:schemeClr val="lt1">
+        <a:alpha val="90000"/>
+      </a:schemeClr>
+    </dgm:fillClrLst>
+    <dgm:linClrLst meth="repeat">
+      <a:schemeClr val="accent1"/>
+    </dgm:linClrLst>
+    <dgm:effectClrLst/>
+    <dgm:txLinClrLst/>
+    <dgm:txFillClrLst meth="repeat">
+      <a:schemeClr val="dk1"/>
+    </dgm:txFillClrLst>
+    <dgm:txEffectClrLst/>
+  </dgm:styleLbl>
+  <dgm:styleLbl name="fgAcc2">
+    <dgm:fillClrLst meth="repeat">
+      <a:schemeClr val="lt1">
+        <a:alpha val="90000"/>
+      </a:schemeClr>
+    </dgm:fillClrLst>
+    <dgm:linClrLst meth="repeat">
+      <a:schemeClr val="accent1"/>
+    </dgm:linClrLst>
+    <dgm:effectClrLst/>
+    <dgm:txLinClrLst/>
+    <dgm:txFillClrLst meth="repeat">
+      <a:schemeClr val="dk1"/>
+    </dgm:txFillClrLst>
+    <dgm:txEffectClrLst/>
+  </dgm:styleLbl>
+  <dgm:styleLbl name="fgAcc3">
+    <dgm:fillClrLst meth="repeat">
+      <a:schemeClr val="lt1">
+        <a:alpha val="90000"/>
+      </a:schemeClr>
+    </dgm:fillClrLst>
+    <dgm:linClrLst meth="repeat">
+      <a:schemeClr val="accent1"/>
+    </dgm:linClrLst>
+    <dgm:effectClrLst/>
+    <dgm:txLinClrLst/>
+    <dgm:txFillClrLst meth="repeat">
+      <a:schemeClr val="dk1"/>
+    </dgm:txFillClrLst>
+    <dgm:txEffectClrLst/>
+  </dgm:styleLbl>
+  <dgm:styleLbl name="fgAcc4">
+    <dgm:fillClrLst meth="repeat">
+      <a:schemeClr val="lt1">
+        <a:alpha val="90000"/>
+      </a:schemeClr>
+    </dgm:fillClrLst>
+    <dgm:linClrLst meth="repeat">
+      <a:schemeClr val="accent1"/>
+    </dgm:linClrLst>
+    <dgm:effectClrLst/>
+    <dgm:txLinClrLst/>
+    <dgm:txFillClrLst meth="repeat">
+      <a:schemeClr val="dk1"/>
+    </dgm:txFillClrLst>
+    <dgm:txEffectClrLst/>
+  </dgm:styleLbl>
+  <dgm:styleLbl name="bgShp">
+    <dgm:fillClrLst meth="repeat">
+      <a:schemeClr val="bg1">
+        <a:lumMod val="95000"/>
+      </a:schemeClr>
+    </dgm:fillClrLst>
+    <dgm:linClrLst meth="repeat">
+      <a:schemeClr val="accent1"/>
+    </dgm:linClrLst>
+    <dgm:effectClrLst/>
+    <dgm:txLinClrLst/>
+    <dgm:txFillClrLst meth="repeat">
+      <a:schemeClr val="dk1"/>
+    </dgm:txFillClrLst>
+    <dgm:txEffectClrLst/>
+  </dgm:styleLbl>
+  <dgm:styleLbl name="dkBgShp">
+    <dgm:fillClrLst meth="repeat">
+      <a:schemeClr val="accent1">
+        <a:shade val="80000"/>
+      </a:schemeClr>
+    </dgm:fillClrLst>
+    <dgm:linClrLst meth="repeat">
+      <a:schemeClr val="accent1"/>
+    </dgm:linClrLst>
+    <dgm:effectClrLst/>
+    <dgm:txLinClrLst/>
+    <dgm:txFillClrLst meth="repeat">
+      <a:schemeClr val="lt1"/>
+    </dgm:txFillClrLst>
+    <dgm:txEffectClrLst/>
+  </dgm:styleLbl>
+  <dgm:styleLbl name="trBgShp">
+    <dgm:fillClrLst meth="repeat">
+      <a:schemeClr val="accent1">
+        <a:tint val="50000"/>
+        <a:alpha val="40000"/>
+      </a:schemeClr>
+    </dgm:fillClrLst>
+    <dgm:linClrLst meth="repeat">
+      <a:schemeClr val="accent1"/>
+    </dgm:linClrLst>
+    <dgm:effectClrLst/>
+    <dgm:txLinClrLst/>
+    <dgm:txFillClrLst meth="repeat">
+      <a:schemeClr val="lt1"/>
+    </dgm:txFillClrLst>
+    <dgm:txEffectClrLst/>
+  </dgm:styleLbl>
+  <dgm:styleLbl name="fgShp">
+    <dgm:fillClrLst meth="repeat">
+      <a:schemeClr val="accent1">
+        <a:tint val="60000"/>
+      </a:schemeClr>
+    </dgm:fillClrLst>
+    <dgm:linClrLst meth="repeat">
+      <a:schemeClr val="lt1"/>
+    </dgm:linClrLst>
+    <dgm:effectClrLst/>
+    <dgm:txLinClrLst/>
+    <dgm:txFillClrLst meth="repeat">
+      <a:schemeClr val="dk1"/>
+    </dgm:txFillClrLst>
+    <dgm:txEffectClrLst/>
+  </dgm:styleLbl>
+  <dgm:styleLbl name="revTx">
+    <dgm:fillClrLst meth="repeat">
+      <a:schemeClr val="lt1">
+        <a:alpha val="0"/>
+      </a:schemeClr>
+    </dgm:fillClrLst>
+    <dgm:linClrLst meth="repeat">
+      <a:schemeClr val="dk1">
+        <a:alpha val="0"/>
+      </a:schemeClr>
+    </dgm:linClrLst>
+    <dgm:effectClrLst/>
+    <dgm:txLinClrLst/>
+    <dgm:txFillClrLst meth="repeat">
+      <a:schemeClr val="tx1"/>
+    </dgm:txFillClrLst>
+    <dgm:txEffectClrLst/>
+  </dgm:styleLbl>
+</dgm:colorsDef>
+</file>
+
 <file path=ppt/diagrams/data1.xml><?xml version="1.0" encoding="utf-8"?>
+<dgm:dataModel xmlns:dgm="http://schemas.openxmlformats.org/drawingml/2006/diagram" xmlns:a="http://schemas.openxmlformats.org/drawingml/2006/main">
+  <dgm:ptLst>
+    <dgm:pt modelId="{13C63381-1433-4EC4-8B80-03F4EAC72431}" type="doc">
+      <dgm:prSet loTypeId="urn:microsoft.com/office/officeart/2008/layout/LinedList" loCatId="list" qsTypeId="urn:microsoft.com/office/officeart/2005/8/quickstyle/simple1" qsCatId="simple" csTypeId="urn:microsoft.com/office/officeart/2005/8/colors/accent1_2" csCatId="accent1" phldr="1"/>
+      <dgm:spPr/>
+      <dgm:t>
+        <a:bodyPr/>
+        <a:lstStyle/>
+        <a:p>
+          <a:endParaRPr lang="en-US"/>
+        </a:p>
+      </dgm:t>
+    </dgm:pt>
+    <dgm:pt modelId="{466633F3-E20E-42CC-9B05-47E9780AE958}">
+      <dgm:prSet/>
+      <dgm:spPr/>
+      <dgm:t>
+        <a:bodyPr/>
+        <a:lstStyle/>
+        <a:p>
+          <a:r>
+            <a:rPr lang="en-US"/>
+            <a:t>Containers</a:t>
+          </a:r>
+        </a:p>
+      </dgm:t>
+    </dgm:pt>
+    <dgm:pt modelId="{DE23B90B-26E2-47AC-AD4B-03D1A24757DD}" type="parTrans" cxnId="{1B413DF9-8330-4ED0-B33D-A76FA8533F13}">
+      <dgm:prSet/>
+      <dgm:spPr/>
+      <dgm:t>
+        <a:bodyPr/>
+        <a:lstStyle/>
+        <a:p>
+          <a:endParaRPr lang="en-US"/>
+        </a:p>
+      </dgm:t>
+    </dgm:pt>
+    <dgm:pt modelId="{D9C46918-7F83-41E0-9F05-E3E857F5DA0D}" type="sibTrans" cxnId="{1B413DF9-8330-4ED0-B33D-A76FA8533F13}">
+      <dgm:prSet/>
+      <dgm:spPr/>
+      <dgm:t>
+        <a:bodyPr/>
+        <a:lstStyle/>
+        <a:p>
+          <a:endParaRPr lang="en-US"/>
+        </a:p>
+      </dgm:t>
+    </dgm:pt>
+    <dgm:pt modelId="{A3F9EB98-AD38-4742-B117-85392A9E16AF}">
+      <dgm:prSet/>
+      <dgm:spPr/>
+      <dgm:t>
+        <a:bodyPr/>
+        <a:lstStyle/>
+        <a:p>
+          <a:r>
+            <a:rPr lang="en-US" dirty="0"/>
+            <a:t>Kubernetes</a:t>
+          </a:r>
+        </a:p>
+      </dgm:t>
+    </dgm:pt>
+    <dgm:pt modelId="{939C9A3E-523D-4A21-82F9-4ACEDC030EB7}" type="parTrans" cxnId="{7882D9DF-4F7E-41A5-923D-98C4320C0D6B}">
+      <dgm:prSet/>
+      <dgm:spPr/>
+      <dgm:t>
+        <a:bodyPr/>
+        <a:lstStyle/>
+        <a:p>
+          <a:endParaRPr lang="en-US"/>
+        </a:p>
+      </dgm:t>
+    </dgm:pt>
+    <dgm:pt modelId="{05D52B85-EB7B-41A2-B66F-9EE7B79EB3C5}" type="sibTrans" cxnId="{7882D9DF-4F7E-41A5-923D-98C4320C0D6B}">
+      <dgm:prSet/>
+      <dgm:spPr/>
+      <dgm:t>
+        <a:bodyPr/>
+        <a:lstStyle/>
+        <a:p>
+          <a:endParaRPr lang="en-US"/>
+        </a:p>
+      </dgm:t>
+    </dgm:pt>
+    <dgm:pt modelId="{CB4E9085-69D1-4878-8E51-C5034294A8A5}">
+      <dgm:prSet/>
+      <dgm:spPr/>
+      <dgm:t>
+        <a:bodyPr/>
+        <a:lstStyle/>
+        <a:p>
+          <a:r>
+            <a:rPr lang="en-US" dirty="0" err="1"/>
+            <a:t>GitOps</a:t>
+          </a:r>
+          <a:endParaRPr lang="en-US" dirty="0"/>
+        </a:p>
+      </dgm:t>
+    </dgm:pt>
+    <dgm:pt modelId="{10FB275B-38FB-411D-99FB-62EB97E3874C}" type="parTrans" cxnId="{EDC6EA40-3D51-4822-896D-76FDAABFA1DD}">
+      <dgm:prSet/>
+      <dgm:spPr/>
+      <dgm:t>
+        <a:bodyPr/>
+        <a:lstStyle/>
+        <a:p>
+          <a:endParaRPr lang="en-US"/>
+        </a:p>
+      </dgm:t>
+    </dgm:pt>
+    <dgm:pt modelId="{3586A377-5CF1-4AD6-8D5A-29E8AB45507A}" type="sibTrans" cxnId="{EDC6EA40-3D51-4822-896D-76FDAABFA1DD}">
+      <dgm:prSet/>
+      <dgm:spPr/>
+      <dgm:t>
+        <a:bodyPr/>
+        <a:lstStyle/>
+        <a:p>
+          <a:endParaRPr lang="en-US"/>
+        </a:p>
+      </dgm:t>
+    </dgm:pt>
+    <dgm:pt modelId="{2C5AE68E-697D-4F06-8D3B-0FC4E698B8C5}">
+      <dgm:prSet/>
+      <dgm:spPr/>
+      <dgm:t>
+        <a:bodyPr/>
+        <a:lstStyle/>
+        <a:p>
+          <a:r>
+            <a:rPr lang="en-US"/>
+            <a:t>Service Mesh</a:t>
+          </a:r>
+        </a:p>
+      </dgm:t>
+    </dgm:pt>
+    <dgm:pt modelId="{295E17B3-9D0A-461D-8ACD-37A5340E3DE9}" type="parTrans" cxnId="{BF0DDF5D-5D46-4B06-9ADA-650EF1D894A5}">
+      <dgm:prSet/>
+      <dgm:spPr/>
+      <dgm:t>
+        <a:bodyPr/>
+        <a:lstStyle/>
+        <a:p>
+          <a:endParaRPr lang="en-US"/>
+        </a:p>
+      </dgm:t>
+    </dgm:pt>
+    <dgm:pt modelId="{D4749D17-E310-47EE-9651-79FF52E068A4}" type="sibTrans" cxnId="{BF0DDF5D-5D46-4B06-9ADA-650EF1D894A5}">
+      <dgm:prSet/>
+      <dgm:spPr/>
+      <dgm:t>
+        <a:bodyPr/>
+        <a:lstStyle/>
+        <a:p>
+          <a:endParaRPr lang="en-US"/>
+        </a:p>
+      </dgm:t>
+    </dgm:pt>
+    <dgm:pt modelId="{FBF28B97-A7BA-4B9B-A2F3-BB73E0447589}">
+      <dgm:prSet/>
+      <dgm:spPr/>
+      <dgm:t>
+        <a:bodyPr/>
+        <a:lstStyle/>
+        <a:p>
+          <a:r>
+            <a:rPr lang="en-US"/>
+            <a:t>Serverless</a:t>
+          </a:r>
+        </a:p>
+      </dgm:t>
+    </dgm:pt>
+    <dgm:pt modelId="{1742CAB0-9D16-4C3F-803D-93361DCB1BDE}" type="parTrans" cxnId="{7C79AF6B-04BE-41B4-B541-942D0A12B743}">
+      <dgm:prSet/>
+      <dgm:spPr/>
+      <dgm:t>
+        <a:bodyPr/>
+        <a:lstStyle/>
+        <a:p>
+          <a:endParaRPr lang="en-US"/>
+        </a:p>
+      </dgm:t>
+    </dgm:pt>
+    <dgm:pt modelId="{ACD12ECE-66A3-4715-B621-6779FED6CB9C}" type="sibTrans" cxnId="{7C79AF6B-04BE-41B4-B541-942D0A12B743}">
+      <dgm:prSet/>
+      <dgm:spPr/>
+      <dgm:t>
+        <a:bodyPr/>
+        <a:lstStyle/>
+        <a:p>
+          <a:endParaRPr lang="en-US"/>
+        </a:p>
+      </dgm:t>
+    </dgm:pt>
+    <dgm:pt modelId="{DF6A06F7-0547-4773-A249-78C605D21110}">
+      <dgm:prSet/>
+      <dgm:spPr/>
+      <dgm:t>
+        <a:bodyPr/>
+        <a:lstStyle/>
+        <a:p>
+          <a:r>
+            <a:rPr lang="en-US" dirty="0"/>
+            <a:t>What Next?</a:t>
+          </a:r>
+        </a:p>
+      </dgm:t>
+    </dgm:pt>
+    <dgm:pt modelId="{CA3DB9E0-88EF-4B43-855F-F79339285E16}" type="parTrans" cxnId="{49BD29BE-08F5-42C3-B45E-07C331F17CFA}">
+      <dgm:prSet/>
+      <dgm:spPr/>
+      <dgm:t>
+        <a:bodyPr/>
+        <a:lstStyle/>
+        <a:p>
+          <a:endParaRPr lang="en-US"/>
+        </a:p>
+      </dgm:t>
+    </dgm:pt>
+    <dgm:pt modelId="{CEBF0B3F-7767-4468-BF6F-ECAE00153A8F}" type="sibTrans" cxnId="{49BD29BE-08F5-42C3-B45E-07C331F17CFA}">
+      <dgm:prSet/>
+      <dgm:spPr/>
+      <dgm:t>
+        <a:bodyPr/>
+        <a:lstStyle/>
+        <a:p>
+          <a:endParaRPr lang="en-US"/>
+        </a:p>
+      </dgm:t>
+    </dgm:pt>
+    <dgm:pt modelId="{02471AD7-81C0-4E6B-8864-79900510F277}" type="pres">
+      <dgm:prSet presAssocID="{13C63381-1433-4EC4-8B80-03F4EAC72431}" presName="vert0" presStyleCnt="0">
+        <dgm:presLayoutVars>
+          <dgm:dir/>
+          <dgm:animOne val="branch"/>
+          <dgm:animLvl val="lvl"/>
+        </dgm:presLayoutVars>
+      </dgm:prSet>
+      <dgm:spPr/>
+    </dgm:pt>
+    <dgm:pt modelId="{0652333E-F6CC-4073-821B-29323D683BB8}" type="pres">
+      <dgm:prSet presAssocID="{466633F3-E20E-42CC-9B05-47E9780AE958}" presName="thickLine" presStyleLbl="alignNode1" presStyleIdx="0" presStyleCnt="6"/>
+      <dgm:spPr/>
+    </dgm:pt>
+    <dgm:pt modelId="{FCBB8049-FDCC-4546-BD0A-68F956585F73}" type="pres">
+      <dgm:prSet presAssocID="{466633F3-E20E-42CC-9B05-47E9780AE958}" presName="horz1" presStyleCnt="0"/>
+      <dgm:spPr/>
+    </dgm:pt>
+    <dgm:pt modelId="{3273E10C-86C8-41BD-B622-5B7E5BACB2E3}" type="pres">
+      <dgm:prSet presAssocID="{466633F3-E20E-42CC-9B05-47E9780AE958}" presName="tx1" presStyleLbl="revTx" presStyleIdx="0" presStyleCnt="6"/>
+      <dgm:spPr/>
+    </dgm:pt>
+    <dgm:pt modelId="{2D06B67A-8D67-4A07-98AA-C4BC3A1D7C99}" type="pres">
+      <dgm:prSet presAssocID="{466633F3-E20E-42CC-9B05-47E9780AE958}" presName="vert1" presStyleCnt="0"/>
+      <dgm:spPr/>
+    </dgm:pt>
+    <dgm:pt modelId="{779270BB-E863-46E2-A6BF-8AAC1E756C7A}" type="pres">
+      <dgm:prSet presAssocID="{A3F9EB98-AD38-4742-B117-85392A9E16AF}" presName="thickLine" presStyleLbl="alignNode1" presStyleIdx="1" presStyleCnt="6"/>
+      <dgm:spPr/>
+    </dgm:pt>
+    <dgm:pt modelId="{3707E754-0403-4127-9B71-355F7285B043}" type="pres">
+      <dgm:prSet presAssocID="{A3F9EB98-AD38-4742-B117-85392A9E16AF}" presName="horz1" presStyleCnt="0"/>
+      <dgm:spPr/>
+    </dgm:pt>
+    <dgm:pt modelId="{47D2D37E-6728-4056-B90C-BCBFF177C1E1}" type="pres">
+      <dgm:prSet presAssocID="{A3F9EB98-AD38-4742-B117-85392A9E16AF}" presName="tx1" presStyleLbl="revTx" presStyleIdx="1" presStyleCnt="6"/>
+      <dgm:spPr/>
+    </dgm:pt>
+    <dgm:pt modelId="{C11491A8-C29E-4C31-8418-EBDA77DBA973}" type="pres">
+      <dgm:prSet presAssocID="{A3F9EB98-AD38-4742-B117-85392A9E16AF}" presName="vert1" presStyleCnt="0"/>
+      <dgm:spPr/>
+    </dgm:pt>
+    <dgm:pt modelId="{6034907C-D2BC-4918-8EC5-664542E1312E}" type="pres">
+      <dgm:prSet presAssocID="{CB4E9085-69D1-4878-8E51-C5034294A8A5}" presName="thickLine" presStyleLbl="alignNode1" presStyleIdx="2" presStyleCnt="6"/>
+      <dgm:spPr/>
+    </dgm:pt>
+    <dgm:pt modelId="{11257945-7E5F-4FC7-BAF0-B2ED0F47B93A}" type="pres">
+      <dgm:prSet presAssocID="{CB4E9085-69D1-4878-8E51-C5034294A8A5}" presName="horz1" presStyleCnt="0"/>
+      <dgm:spPr/>
+    </dgm:pt>
+    <dgm:pt modelId="{D93285A6-91AA-4A8B-8659-ED1CA6CFBC31}" type="pres">
+      <dgm:prSet presAssocID="{CB4E9085-69D1-4878-8E51-C5034294A8A5}" presName="tx1" presStyleLbl="revTx" presStyleIdx="2" presStyleCnt="6"/>
+      <dgm:spPr/>
+    </dgm:pt>
+    <dgm:pt modelId="{BC2FECA7-3114-4D06-8CCB-9CA41A73DBE3}" type="pres">
+      <dgm:prSet presAssocID="{CB4E9085-69D1-4878-8E51-C5034294A8A5}" presName="vert1" presStyleCnt="0"/>
+      <dgm:spPr/>
+    </dgm:pt>
+    <dgm:pt modelId="{620CEAD9-44E7-4492-ADBF-AE1B807F2C02}" type="pres">
+      <dgm:prSet presAssocID="{2C5AE68E-697D-4F06-8D3B-0FC4E698B8C5}" presName="thickLine" presStyleLbl="alignNode1" presStyleIdx="3" presStyleCnt="6"/>
+      <dgm:spPr/>
+    </dgm:pt>
+    <dgm:pt modelId="{90A57E0C-9AAB-408C-8920-3B92DEB8B084}" type="pres">
+      <dgm:prSet presAssocID="{2C5AE68E-697D-4F06-8D3B-0FC4E698B8C5}" presName="horz1" presStyleCnt="0"/>
+      <dgm:spPr/>
+    </dgm:pt>
+    <dgm:pt modelId="{CE06ACB5-1846-4D1C-8DAB-0A2A44C1E3A3}" type="pres">
+      <dgm:prSet presAssocID="{2C5AE68E-697D-4F06-8D3B-0FC4E698B8C5}" presName="tx1" presStyleLbl="revTx" presStyleIdx="3" presStyleCnt="6"/>
+      <dgm:spPr/>
+    </dgm:pt>
+    <dgm:pt modelId="{4618209E-FFB8-4B87-B824-7A29386B09A2}" type="pres">
+      <dgm:prSet presAssocID="{2C5AE68E-697D-4F06-8D3B-0FC4E698B8C5}" presName="vert1" presStyleCnt="0"/>
+      <dgm:spPr/>
+    </dgm:pt>
+    <dgm:pt modelId="{EC342443-76DD-4566-B517-E88A896701C2}" type="pres">
+      <dgm:prSet presAssocID="{FBF28B97-A7BA-4B9B-A2F3-BB73E0447589}" presName="thickLine" presStyleLbl="alignNode1" presStyleIdx="4" presStyleCnt="6"/>
+      <dgm:spPr/>
+    </dgm:pt>
+    <dgm:pt modelId="{E89DF91E-D7DF-484D-A3D4-BA1A845BADE6}" type="pres">
+      <dgm:prSet presAssocID="{FBF28B97-A7BA-4B9B-A2F3-BB73E0447589}" presName="horz1" presStyleCnt="0"/>
+      <dgm:spPr/>
+    </dgm:pt>
+    <dgm:pt modelId="{61A4B1B8-D7B4-4B83-A68E-23487444738D}" type="pres">
+      <dgm:prSet presAssocID="{FBF28B97-A7BA-4B9B-A2F3-BB73E0447589}" presName="tx1" presStyleLbl="revTx" presStyleIdx="4" presStyleCnt="6"/>
+      <dgm:spPr/>
+    </dgm:pt>
+    <dgm:pt modelId="{45ACBFB4-2DB9-4A87-A269-A2845A90CB55}" type="pres">
+      <dgm:prSet presAssocID="{FBF28B97-A7BA-4B9B-A2F3-BB73E0447589}" presName="vert1" presStyleCnt="0"/>
+      <dgm:spPr/>
+    </dgm:pt>
+    <dgm:pt modelId="{2D6D15E9-19D6-45B7-8606-BADE06F3D126}" type="pres">
+      <dgm:prSet presAssocID="{DF6A06F7-0547-4773-A249-78C605D21110}" presName="thickLine" presStyleLbl="alignNode1" presStyleIdx="5" presStyleCnt="6"/>
+      <dgm:spPr/>
+    </dgm:pt>
+    <dgm:pt modelId="{ECB66629-29BF-4816-8B0F-FCD2AB80EED7}" type="pres">
+      <dgm:prSet presAssocID="{DF6A06F7-0547-4773-A249-78C605D21110}" presName="horz1" presStyleCnt="0"/>
+      <dgm:spPr/>
+    </dgm:pt>
+    <dgm:pt modelId="{E01DC721-F700-425A-BE60-D0A8DCC1E08A}" type="pres">
+      <dgm:prSet presAssocID="{DF6A06F7-0547-4773-A249-78C605D21110}" presName="tx1" presStyleLbl="revTx" presStyleIdx="5" presStyleCnt="6"/>
+      <dgm:spPr/>
+    </dgm:pt>
+    <dgm:pt modelId="{6F205C96-6B6E-47BE-BC16-90B1F0A7141E}" type="pres">
+      <dgm:prSet presAssocID="{DF6A06F7-0547-4773-A249-78C605D21110}" presName="vert1" presStyleCnt="0"/>
+      <dgm:spPr/>
+    </dgm:pt>
+  </dgm:ptLst>
+  <dgm:cxnLst>
+    <dgm:cxn modelId="{437BE732-ECBE-42D1-A6E2-47ABA51BA93A}" type="presOf" srcId="{13C63381-1433-4EC4-8B80-03F4EAC72431}" destId="{02471AD7-81C0-4E6B-8864-79900510F277}" srcOrd="0" destOrd="0" presId="urn:microsoft.com/office/officeart/2008/layout/LinedList"/>
+    <dgm:cxn modelId="{EDC6EA40-3D51-4822-896D-76FDAABFA1DD}" srcId="{13C63381-1433-4EC4-8B80-03F4EAC72431}" destId="{CB4E9085-69D1-4878-8E51-C5034294A8A5}" srcOrd="2" destOrd="0" parTransId="{10FB275B-38FB-411D-99FB-62EB97E3874C}" sibTransId="{3586A377-5CF1-4AD6-8D5A-29E8AB45507A}"/>
+    <dgm:cxn modelId="{BF0DDF5D-5D46-4B06-9ADA-650EF1D894A5}" srcId="{13C63381-1433-4EC4-8B80-03F4EAC72431}" destId="{2C5AE68E-697D-4F06-8D3B-0FC4E698B8C5}" srcOrd="3" destOrd="0" parTransId="{295E17B3-9D0A-461D-8ACD-37A5340E3DE9}" sibTransId="{D4749D17-E310-47EE-9651-79FF52E068A4}"/>
+    <dgm:cxn modelId="{7C79AF6B-04BE-41B4-B541-942D0A12B743}" srcId="{13C63381-1433-4EC4-8B80-03F4EAC72431}" destId="{FBF28B97-A7BA-4B9B-A2F3-BB73E0447589}" srcOrd="4" destOrd="0" parTransId="{1742CAB0-9D16-4C3F-803D-93361DCB1BDE}" sibTransId="{ACD12ECE-66A3-4715-B621-6779FED6CB9C}"/>
+    <dgm:cxn modelId="{448AE64F-121C-43AA-A8CD-099E9C367F70}" type="presOf" srcId="{FBF28B97-A7BA-4B9B-A2F3-BB73E0447589}" destId="{61A4B1B8-D7B4-4B83-A68E-23487444738D}" srcOrd="0" destOrd="0" presId="urn:microsoft.com/office/officeart/2008/layout/LinedList"/>
+    <dgm:cxn modelId="{E7B94587-5C0D-43EF-8CFF-5BEFC75ABC08}" type="presOf" srcId="{DF6A06F7-0547-4773-A249-78C605D21110}" destId="{E01DC721-F700-425A-BE60-D0A8DCC1E08A}" srcOrd="0" destOrd="0" presId="urn:microsoft.com/office/officeart/2008/layout/LinedList"/>
+    <dgm:cxn modelId="{51DB9790-ACB2-4165-B6BB-91DD5B4ECA05}" type="presOf" srcId="{A3F9EB98-AD38-4742-B117-85392A9E16AF}" destId="{47D2D37E-6728-4056-B90C-BCBFF177C1E1}" srcOrd="0" destOrd="0" presId="urn:microsoft.com/office/officeart/2008/layout/LinedList"/>
+    <dgm:cxn modelId="{CB66BE97-7B6B-46FB-A0D0-CFA490FFBFF2}" type="presOf" srcId="{CB4E9085-69D1-4878-8E51-C5034294A8A5}" destId="{D93285A6-91AA-4A8B-8659-ED1CA6CFBC31}" srcOrd="0" destOrd="0" presId="urn:microsoft.com/office/officeart/2008/layout/LinedList"/>
+    <dgm:cxn modelId="{49BD29BE-08F5-42C3-B45E-07C331F17CFA}" srcId="{13C63381-1433-4EC4-8B80-03F4EAC72431}" destId="{DF6A06F7-0547-4773-A249-78C605D21110}" srcOrd="5" destOrd="0" parTransId="{CA3DB9E0-88EF-4B43-855F-F79339285E16}" sibTransId="{CEBF0B3F-7767-4468-BF6F-ECAE00153A8F}"/>
+    <dgm:cxn modelId="{734EFBD9-260B-406B-8A00-69F02D1E5EAA}" type="presOf" srcId="{466633F3-E20E-42CC-9B05-47E9780AE958}" destId="{3273E10C-86C8-41BD-B622-5B7E5BACB2E3}" srcOrd="0" destOrd="0" presId="urn:microsoft.com/office/officeart/2008/layout/LinedList"/>
+    <dgm:cxn modelId="{7882D9DF-4F7E-41A5-923D-98C4320C0D6B}" srcId="{13C63381-1433-4EC4-8B80-03F4EAC72431}" destId="{A3F9EB98-AD38-4742-B117-85392A9E16AF}" srcOrd="1" destOrd="0" parTransId="{939C9A3E-523D-4A21-82F9-4ACEDC030EB7}" sibTransId="{05D52B85-EB7B-41A2-B66F-9EE7B79EB3C5}"/>
+    <dgm:cxn modelId="{0C9095F2-8E5C-4042-8DC5-A14B2A2CDA0B}" type="presOf" srcId="{2C5AE68E-697D-4F06-8D3B-0FC4E698B8C5}" destId="{CE06ACB5-1846-4D1C-8DAB-0A2A44C1E3A3}" srcOrd="0" destOrd="0" presId="urn:microsoft.com/office/officeart/2008/layout/LinedList"/>
+    <dgm:cxn modelId="{1B413DF9-8330-4ED0-B33D-A76FA8533F13}" srcId="{13C63381-1433-4EC4-8B80-03F4EAC72431}" destId="{466633F3-E20E-42CC-9B05-47E9780AE958}" srcOrd="0" destOrd="0" parTransId="{DE23B90B-26E2-47AC-AD4B-03D1A24757DD}" sibTransId="{D9C46918-7F83-41E0-9F05-E3E857F5DA0D}"/>
+    <dgm:cxn modelId="{66B21EED-84B9-431D-8A65-A39A135A718D}" type="presParOf" srcId="{02471AD7-81C0-4E6B-8864-79900510F277}" destId="{0652333E-F6CC-4073-821B-29323D683BB8}" srcOrd="0" destOrd="0" presId="urn:microsoft.com/office/officeart/2008/layout/LinedList"/>
+    <dgm:cxn modelId="{C98C8C37-8838-4D09-BAD3-56EE750323CC}" type="presParOf" srcId="{02471AD7-81C0-4E6B-8864-79900510F277}" destId="{FCBB8049-FDCC-4546-BD0A-68F956585F73}" srcOrd="1" destOrd="0" presId="urn:microsoft.com/office/officeart/2008/layout/LinedList"/>
+    <dgm:cxn modelId="{D3B221F7-9105-4553-8D25-46C046E7651A}" type="presParOf" srcId="{FCBB8049-FDCC-4546-BD0A-68F956585F73}" destId="{3273E10C-86C8-41BD-B622-5B7E5BACB2E3}" srcOrd="0" destOrd="0" presId="urn:microsoft.com/office/officeart/2008/layout/LinedList"/>
+    <dgm:cxn modelId="{A7C60B2A-D746-44FE-892A-5B81B5D34E7D}" type="presParOf" srcId="{FCBB8049-FDCC-4546-BD0A-68F956585F73}" destId="{2D06B67A-8D67-4A07-98AA-C4BC3A1D7C99}" srcOrd="1" destOrd="0" presId="urn:microsoft.com/office/officeart/2008/layout/LinedList"/>
+    <dgm:cxn modelId="{290242C0-A1E3-4653-B502-FE6292D55EBF}" type="presParOf" srcId="{02471AD7-81C0-4E6B-8864-79900510F277}" destId="{779270BB-E863-46E2-A6BF-8AAC1E756C7A}" srcOrd="2" destOrd="0" presId="urn:microsoft.com/office/officeart/2008/layout/LinedList"/>
+    <dgm:cxn modelId="{E8D68569-B745-4472-A34E-337F71944605}" type="presParOf" srcId="{02471AD7-81C0-4E6B-8864-79900510F277}" destId="{3707E754-0403-4127-9B71-355F7285B043}" srcOrd="3" destOrd="0" presId="urn:microsoft.com/office/officeart/2008/layout/LinedList"/>
+    <dgm:cxn modelId="{689081A7-DA0A-4C29-AD9E-FB455C3642A2}" type="presParOf" srcId="{3707E754-0403-4127-9B71-355F7285B043}" destId="{47D2D37E-6728-4056-B90C-BCBFF177C1E1}" srcOrd="0" destOrd="0" presId="urn:microsoft.com/office/officeart/2008/layout/LinedList"/>
+    <dgm:cxn modelId="{821C6DD3-FE0F-457F-A586-DC6F66EDA258}" type="presParOf" srcId="{3707E754-0403-4127-9B71-355F7285B043}" destId="{C11491A8-C29E-4C31-8418-EBDA77DBA973}" srcOrd="1" destOrd="0" presId="urn:microsoft.com/office/officeart/2008/layout/LinedList"/>
+    <dgm:cxn modelId="{FE77E348-B8FB-4330-BEE8-25EBEF563EBC}" type="presParOf" srcId="{02471AD7-81C0-4E6B-8864-79900510F277}" destId="{6034907C-D2BC-4918-8EC5-664542E1312E}" srcOrd="4" destOrd="0" presId="urn:microsoft.com/office/officeart/2008/layout/LinedList"/>
+    <dgm:cxn modelId="{0DC42474-33DF-4114-9302-837A16653AF8}" type="presParOf" srcId="{02471AD7-81C0-4E6B-8864-79900510F277}" destId="{11257945-7E5F-4FC7-BAF0-B2ED0F47B93A}" srcOrd="5" destOrd="0" presId="urn:microsoft.com/office/officeart/2008/layout/LinedList"/>
+    <dgm:cxn modelId="{F28BAFCB-516E-41D6-AAE7-4ED12910B85E}" type="presParOf" srcId="{11257945-7E5F-4FC7-BAF0-B2ED0F47B93A}" destId="{D93285A6-91AA-4A8B-8659-ED1CA6CFBC31}" srcOrd="0" destOrd="0" presId="urn:microsoft.com/office/officeart/2008/layout/LinedList"/>
+    <dgm:cxn modelId="{837CBE99-A8F1-4D82-B8F8-90ACF0DBA2A5}" type="presParOf" srcId="{11257945-7E5F-4FC7-BAF0-B2ED0F47B93A}" destId="{BC2FECA7-3114-4D06-8CCB-9CA41A73DBE3}" srcOrd="1" destOrd="0" presId="urn:microsoft.com/office/officeart/2008/layout/LinedList"/>
+    <dgm:cxn modelId="{239DEF1E-76BB-4EFA-8895-88D28FAC9DED}" type="presParOf" srcId="{02471AD7-81C0-4E6B-8864-79900510F277}" destId="{620CEAD9-44E7-4492-ADBF-AE1B807F2C02}" srcOrd="6" destOrd="0" presId="urn:microsoft.com/office/officeart/2008/layout/LinedList"/>
+    <dgm:cxn modelId="{44DF74D0-9D8F-4877-9D72-BD0F5C2E4717}" type="presParOf" srcId="{02471AD7-81C0-4E6B-8864-79900510F277}" destId="{90A57E0C-9AAB-408C-8920-3B92DEB8B084}" srcOrd="7" destOrd="0" presId="urn:microsoft.com/office/officeart/2008/layout/LinedList"/>
+    <dgm:cxn modelId="{4111DE4C-22AE-4CF2-A46F-0A3706CF7B5D}" type="presParOf" srcId="{90A57E0C-9AAB-408C-8920-3B92DEB8B084}" destId="{CE06ACB5-1846-4D1C-8DAB-0A2A44C1E3A3}" srcOrd="0" destOrd="0" presId="urn:microsoft.com/office/officeart/2008/layout/LinedList"/>
+    <dgm:cxn modelId="{FF0AD6AB-C1ED-49B9-928C-17C845478228}" type="presParOf" srcId="{90A57E0C-9AAB-408C-8920-3B92DEB8B084}" destId="{4618209E-FFB8-4B87-B824-7A29386B09A2}" srcOrd="1" destOrd="0" presId="urn:microsoft.com/office/officeart/2008/layout/LinedList"/>
+    <dgm:cxn modelId="{E44AAC22-7435-4502-B851-47D09FC4D369}" type="presParOf" srcId="{02471AD7-81C0-4E6B-8864-79900510F277}" destId="{EC342443-76DD-4566-B517-E88A896701C2}" srcOrd="8" destOrd="0" presId="urn:microsoft.com/office/officeart/2008/layout/LinedList"/>
+    <dgm:cxn modelId="{54F23B7A-2D24-498F-959C-9C86AA1C581E}" type="presParOf" srcId="{02471AD7-81C0-4E6B-8864-79900510F277}" destId="{E89DF91E-D7DF-484D-A3D4-BA1A845BADE6}" srcOrd="9" destOrd="0" presId="urn:microsoft.com/office/officeart/2008/layout/LinedList"/>
+    <dgm:cxn modelId="{DB8921C1-46DE-4A06-9410-4D08F411832E}" type="presParOf" srcId="{E89DF91E-D7DF-484D-A3D4-BA1A845BADE6}" destId="{61A4B1B8-D7B4-4B83-A68E-23487444738D}" srcOrd="0" destOrd="0" presId="urn:microsoft.com/office/officeart/2008/layout/LinedList"/>
+    <dgm:cxn modelId="{E4EF4EF1-BED9-47AD-8BFB-B49E23E61222}" type="presParOf" srcId="{E89DF91E-D7DF-484D-A3D4-BA1A845BADE6}" destId="{45ACBFB4-2DB9-4A87-A269-A2845A90CB55}" srcOrd="1" destOrd="0" presId="urn:microsoft.com/office/officeart/2008/layout/LinedList"/>
+    <dgm:cxn modelId="{4ADD5123-F93E-4E3F-B91E-6BC4D562657A}" type="presParOf" srcId="{02471AD7-81C0-4E6B-8864-79900510F277}" destId="{2D6D15E9-19D6-45B7-8606-BADE06F3D126}" srcOrd="10" destOrd="0" presId="urn:microsoft.com/office/officeart/2008/layout/LinedList"/>
+    <dgm:cxn modelId="{B9022502-5A10-4938-96F2-B9ED9D95A8E9}" type="presParOf" srcId="{02471AD7-81C0-4E6B-8864-79900510F277}" destId="{ECB66629-29BF-4816-8B0F-FCD2AB80EED7}" srcOrd="11" destOrd="0" presId="urn:microsoft.com/office/officeart/2008/layout/LinedList"/>
+    <dgm:cxn modelId="{FB3C0684-B3C7-4503-B609-EEE75338FD5C}" type="presParOf" srcId="{ECB66629-29BF-4816-8B0F-FCD2AB80EED7}" destId="{E01DC721-F700-425A-BE60-D0A8DCC1E08A}" srcOrd="0" destOrd="0" presId="urn:microsoft.com/office/officeart/2008/layout/LinedList"/>
+    <dgm:cxn modelId="{2CA396E9-4C6C-410C-A07D-47D782303089}" type="presParOf" srcId="{ECB66629-29BF-4816-8B0F-FCD2AB80EED7}" destId="{6F205C96-6B6E-47BE-BC16-90B1F0A7141E}" srcOrd="1" destOrd="0" presId="urn:microsoft.com/office/officeart/2008/layout/LinedList"/>
+  </dgm:cxnLst>
+  <dgm:bg/>
+  <dgm:whole/>
+  <dgm:extLst>
+    <a:ext uri="http://schemas.microsoft.com/office/drawing/2008/diagram">
+      <dsp:dataModelExt xmlns:dsp="http://schemas.microsoft.com/office/drawing/2008/diagram" relId="rId6" minVer="http://schemas.openxmlformats.org/drawingml/2006/diagram"/>
+    </a:ext>
+  </dgm:extLst>
+</dgm:dataModel>
+</file>
+
+<file path=ppt/diagrams/data2.xml><?xml version="1.0" encoding="utf-8"?>
 <dgm:dataModel xmlns:dgm="http://schemas.openxmlformats.org/drawingml/2006/diagram" xmlns:a="http://schemas.openxmlformats.org/drawingml/2006/main">
   <dgm:ptLst>
     <dgm:pt modelId="{9B71EC56-4720-44B7-84C9-0F922D83D3A9}" type="doc">
@@ -1704,7 +2840,7 @@
         <a:p>
           <a:r>
             <a:rPr lang="en-US" dirty="0"/>
-            <a:t>Run container (from repo)</a:t>
+            <a:t>Run container</a:t>
           </a:r>
         </a:p>
       </dgm:t>
@@ -1731,6 +2867,42 @@
         </a:p>
       </dgm:t>
     </dgm:pt>
+    <dgm:pt modelId="{A82C501E-9647-4F8C-876A-95F4C42BE0D3}">
+      <dgm:prSet/>
+      <dgm:spPr/>
+      <dgm:t>
+        <a:bodyPr/>
+        <a:lstStyle/>
+        <a:p>
+          <a:r>
+            <a:rPr lang="en-US" dirty="0"/>
+            <a:t>Security, vulnerability scanning</a:t>
+          </a:r>
+        </a:p>
+      </dgm:t>
+    </dgm:pt>
+    <dgm:pt modelId="{1AAA2FF6-3FFA-4D3C-8250-E744C65AC31A}" type="parTrans" cxnId="{B974C46D-7F4B-43F9-A081-871A43E8FA3F}">
+      <dgm:prSet/>
+      <dgm:spPr/>
+      <dgm:t>
+        <a:bodyPr/>
+        <a:lstStyle/>
+        <a:p>
+          <a:endParaRPr lang="en-US"/>
+        </a:p>
+      </dgm:t>
+    </dgm:pt>
+    <dgm:pt modelId="{3C99647E-1596-417B-B019-EA35B0DD19F2}" type="sibTrans" cxnId="{B974C46D-7F4B-43F9-A081-871A43E8FA3F}">
+      <dgm:prSet/>
+      <dgm:spPr/>
+      <dgm:t>
+        <a:bodyPr/>
+        <a:lstStyle/>
+        <a:p>
+          <a:endParaRPr lang="en-US"/>
+        </a:p>
+      </dgm:t>
+    </dgm:pt>
     <dgm:pt modelId="{C33B6F79-85DD-4CA4-8F16-787E387F2041}" type="pres">
       <dgm:prSet presAssocID="{9B71EC56-4720-44B7-84C9-0F922D83D3A9}" presName="Name0" presStyleCnt="0">
         <dgm:presLayoutVars>
@@ -1741,7 +2913,7 @@
       <dgm:spPr/>
     </dgm:pt>
     <dgm:pt modelId="{E7407B6D-0C27-4BFC-8C6F-8F149FB2F343}" type="pres">
-      <dgm:prSet presAssocID="{D100BB1C-1708-4941-8DD3-231B1E8CEF5E}" presName="node" presStyleLbl="node1" presStyleIdx="0" presStyleCnt="3">
+      <dgm:prSet presAssocID="{D100BB1C-1708-4941-8DD3-231B1E8CEF5E}" presName="node" presStyleLbl="node1" presStyleIdx="0" presStyleCnt="4">
         <dgm:presLayoutVars>
           <dgm:bulletEnabled val="1"/>
         </dgm:presLayoutVars>
@@ -1749,15 +2921,15 @@
       <dgm:spPr/>
     </dgm:pt>
     <dgm:pt modelId="{5B4F5853-CCD7-4D55-9E07-BBFD7236041C}" type="pres">
-      <dgm:prSet presAssocID="{C091EBF1-01D8-4E1B-BF1C-97C4160A71D0}" presName="sibTrans" presStyleLbl="sibTrans2D1" presStyleIdx="0" presStyleCnt="2"/>
+      <dgm:prSet presAssocID="{C091EBF1-01D8-4E1B-BF1C-97C4160A71D0}" presName="sibTrans" presStyleLbl="sibTrans2D1" presStyleIdx="0" presStyleCnt="3"/>
       <dgm:spPr/>
     </dgm:pt>
     <dgm:pt modelId="{CD7256EF-C463-4FC6-AA7D-FA65A8918F7B}" type="pres">
-      <dgm:prSet presAssocID="{C091EBF1-01D8-4E1B-BF1C-97C4160A71D0}" presName="connectorText" presStyleLbl="sibTrans2D1" presStyleIdx="0" presStyleCnt="2"/>
+      <dgm:prSet presAssocID="{C091EBF1-01D8-4E1B-BF1C-97C4160A71D0}" presName="connectorText" presStyleLbl="sibTrans2D1" presStyleIdx="0" presStyleCnt="3"/>
       <dgm:spPr/>
     </dgm:pt>
     <dgm:pt modelId="{C6872888-E6B8-4D6A-8070-ACE2392B7A29}" type="pres">
-      <dgm:prSet presAssocID="{0E3E498B-FEE3-417B-8EB9-8B8318661D3D}" presName="node" presStyleLbl="node1" presStyleIdx="1" presStyleCnt="3">
+      <dgm:prSet presAssocID="{0E3E498B-FEE3-417B-8EB9-8B8318661D3D}" presName="node" presStyleLbl="node1" presStyleIdx="1" presStyleCnt="4">
         <dgm:presLayoutVars>
           <dgm:bulletEnabled val="1"/>
         </dgm:presLayoutVars>
@@ -1765,15 +2937,31 @@
       <dgm:spPr/>
     </dgm:pt>
     <dgm:pt modelId="{BBAEDD4C-FD49-473D-B1D9-15F54151F655}" type="pres">
-      <dgm:prSet presAssocID="{819B96B5-B64F-4E8C-9BCE-3B20B3D16F4A}" presName="sibTrans" presStyleLbl="sibTrans2D1" presStyleIdx="1" presStyleCnt="2"/>
+      <dgm:prSet presAssocID="{819B96B5-B64F-4E8C-9BCE-3B20B3D16F4A}" presName="sibTrans" presStyleLbl="sibTrans2D1" presStyleIdx="1" presStyleCnt="3"/>
       <dgm:spPr/>
     </dgm:pt>
     <dgm:pt modelId="{E409753E-D856-4FF7-A8A7-08C9FB1A05A2}" type="pres">
-      <dgm:prSet presAssocID="{819B96B5-B64F-4E8C-9BCE-3B20B3D16F4A}" presName="connectorText" presStyleLbl="sibTrans2D1" presStyleIdx="1" presStyleCnt="2"/>
+      <dgm:prSet presAssocID="{819B96B5-B64F-4E8C-9BCE-3B20B3D16F4A}" presName="connectorText" presStyleLbl="sibTrans2D1" presStyleIdx="1" presStyleCnt="3"/>
+      <dgm:spPr/>
+    </dgm:pt>
+    <dgm:pt modelId="{041ACFAA-665C-4140-A908-4E855F4605B9}" type="pres">
+      <dgm:prSet presAssocID="{A82C501E-9647-4F8C-876A-95F4C42BE0D3}" presName="node" presStyleLbl="node1" presStyleIdx="2" presStyleCnt="4">
+        <dgm:presLayoutVars>
+          <dgm:bulletEnabled val="1"/>
+        </dgm:presLayoutVars>
+      </dgm:prSet>
+      <dgm:spPr/>
+    </dgm:pt>
+    <dgm:pt modelId="{AC9F5475-608F-4102-8781-47371FAB49EE}" type="pres">
+      <dgm:prSet presAssocID="{3C99647E-1596-417B-B019-EA35B0DD19F2}" presName="sibTrans" presStyleLbl="sibTrans2D1" presStyleIdx="2" presStyleCnt="3"/>
+      <dgm:spPr/>
+    </dgm:pt>
+    <dgm:pt modelId="{29A4AFDB-174F-4293-A0C2-C3C69C75495B}" type="pres">
+      <dgm:prSet presAssocID="{3C99647E-1596-417B-B019-EA35B0DD19F2}" presName="connectorText" presStyleLbl="sibTrans2D1" presStyleIdx="2" presStyleCnt="3"/>
       <dgm:spPr/>
     </dgm:pt>
     <dgm:pt modelId="{55A7AD11-494B-4C2A-BF26-C2747E28F90E}" type="pres">
-      <dgm:prSet presAssocID="{4A4F6799-61C6-4141-A60C-22C72F0F7DE8}" presName="node" presStyleLbl="node1" presStyleIdx="2" presStyleCnt="3">
+      <dgm:prSet presAssocID="{4A4F6799-61C6-4141-A60C-22C72F0F7DE8}" presName="node" presStyleLbl="node1" presStyleIdx="3" presStyleCnt="4">
         <dgm:presLayoutVars>
           <dgm:bulletEnabled val="1"/>
         </dgm:presLayoutVars>
@@ -1784,12 +2972,16 @@
   <dgm:cxnLst>
     <dgm:cxn modelId="{8676993D-BCE1-495C-AC10-DBFFF6B89626}" type="presOf" srcId="{0E3E498B-FEE3-417B-8EB9-8B8318661D3D}" destId="{C6872888-E6B8-4D6A-8070-ACE2392B7A29}" srcOrd="0" destOrd="0" presId="urn:microsoft.com/office/officeart/2005/8/layout/process1"/>
     <dgm:cxn modelId="{B1DE715F-BDBC-430B-B72E-0C74DDF8A195}" type="presOf" srcId="{C091EBF1-01D8-4E1B-BF1C-97C4160A71D0}" destId="{CD7256EF-C463-4FC6-AA7D-FA65A8918F7B}" srcOrd="1" destOrd="0" presId="urn:microsoft.com/office/officeart/2005/8/layout/process1"/>
+    <dgm:cxn modelId="{EB308643-083C-4643-BBFD-2DB212B73BB1}" type="presOf" srcId="{A82C501E-9647-4F8C-876A-95F4C42BE0D3}" destId="{041ACFAA-665C-4140-A908-4E855F4605B9}" srcOrd="0" destOrd="0" presId="urn:microsoft.com/office/officeart/2005/8/layout/process1"/>
     <dgm:cxn modelId="{1607C646-452F-4AA8-9516-CC5E80A11F03}" type="presOf" srcId="{819B96B5-B64F-4E8C-9BCE-3B20B3D16F4A}" destId="{BBAEDD4C-FD49-473D-B1D9-15F54151F655}" srcOrd="0" destOrd="0" presId="urn:microsoft.com/office/officeart/2005/8/layout/process1"/>
     <dgm:cxn modelId="{83179D48-FA08-41D7-A5DB-8685ADBB26E7}" type="presOf" srcId="{4A4F6799-61C6-4141-A60C-22C72F0F7DE8}" destId="{55A7AD11-494B-4C2A-BF26-C2747E28F90E}" srcOrd="0" destOrd="0" presId="urn:microsoft.com/office/officeart/2005/8/layout/process1"/>
-    <dgm:cxn modelId="{741B1E4E-FC42-40AA-8C42-37F005EB35D5}" srcId="{9B71EC56-4720-44B7-84C9-0F922D83D3A9}" destId="{4A4F6799-61C6-4141-A60C-22C72F0F7DE8}" srcOrd="2" destOrd="0" parTransId="{EF1BEDBE-EDDC-4E76-B35A-8B2D6D10FA2A}" sibTransId="{D9724287-B48F-4577-BD94-1D85C550DEDF}"/>
+    <dgm:cxn modelId="{B974C46D-7F4B-43F9-A081-871A43E8FA3F}" srcId="{9B71EC56-4720-44B7-84C9-0F922D83D3A9}" destId="{A82C501E-9647-4F8C-876A-95F4C42BE0D3}" srcOrd="2" destOrd="0" parTransId="{1AAA2FF6-3FFA-4D3C-8250-E744C65AC31A}" sibTransId="{3C99647E-1596-417B-B019-EA35B0DD19F2}"/>
+    <dgm:cxn modelId="{741B1E4E-FC42-40AA-8C42-37F005EB35D5}" srcId="{9B71EC56-4720-44B7-84C9-0F922D83D3A9}" destId="{4A4F6799-61C6-4141-A60C-22C72F0F7DE8}" srcOrd="3" destOrd="0" parTransId="{EF1BEDBE-EDDC-4E76-B35A-8B2D6D10FA2A}" sibTransId="{D9724287-B48F-4577-BD94-1D85C550DEDF}"/>
     <dgm:cxn modelId="{D7FBEA92-6494-428C-8688-14F59885260A}" type="presOf" srcId="{819B96B5-B64F-4E8C-9BCE-3B20B3D16F4A}" destId="{E409753E-D856-4FF7-A8A7-08C9FB1A05A2}" srcOrd="1" destOrd="0" presId="urn:microsoft.com/office/officeart/2005/8/layout/process1"/>
+    <dgm:cxn modelId="{39B4B4B7-373D-4BBA-B19F-5F1A74E22DAC}" type="presOf" srcId="{3C99647E-1596-417B-B019-EA35B0DD19F2}" destId="{29A4AFDB-174F-4293-A0C2-C3C69C75495B}" srcOrd="1" destOrd="0" presId="urn:microsoft.com/office/officeart/2005/8/layout/process1"/>
     <dgm:cxn modelId="{FEDE2CC1-5271-4184-83D5-9D36BEA01AF5}" type="presOf" srcId="{C091EBF1-01D8-4E1B-BF1C-97C4160A71D0}" destId="{5B4F5853-CCD7-4D55-9E07-BBFD7236041C}" srcOrd="0" destOrd="0" presId="urn:microsoft.com/office/officeart/2005/8/layout/process1"/>
     <dgm:cxn modelId="{87915ECA-D4E2-45A3-8BA6-C2165AE882E2}" type="presOf" srcId="{D100BB1C-1708-4941-8DD3-231B1E8CEF5E}" destId="{E7407B6D-0C27-4BFC-8C6F-8F149FB2F343}" srcOrd="0" destOrd="0" presId="urn:microsoft.com/office/officeart/2005/8/layout/process1"/>
+    <dgm:cxn modelId="{39AF27D3-A8ED-45D6-AEA9-CBC5E6A2CCDD}" type="presOf" srcId="{3C99647E-1596-417B-B019-EA35B0DD19F2}" destId="{AC9F5475-608F-4102-8781-47371FAB49EE}" srcOrd="0" destOrd="0" presId="urn:microsoft.com/office/officeart/2005/8/layout/process1"/>
     <dgm:cxn modelId="{5E88F0D3-0D57-4C65-92F2-C974D7920273}" srcId="{9B71EC56-4720-44B7-84C9-0F922D83D3A9}" destId="{D100BB1C-1708-4941-8DD3-231B1E8CEF5E}" srcOrd="0" destOrd="0" parTransId="{E7245061-0E5D-4D61-AA35-6CC075B05E7F}" sibTransId="{C091EBF1-01D8-4E1B-BF1C-97C4160A71D0}"/>
     <dgm:cxn modelId="{BFF6F4D9-422C-42F0-BCBD-449D45BA38C1}" srcId="{9B71EC56-4720-44B7-84C9-0F922D83D3A9}" destId="{0E3E498B-FEE3-417B-8EB9-8B8318661D3D}" srcOrd="1" destOrd="0" parTransId="{62D166E0-827B-4715-9ECD-91E35BA07FEA}" sibTransId="{819B96B5-B64F-4E8C-9BCE-3B20B3D16F4A}"/>
     <dgm:cxn modelId="{9A7267F8-947F-4E19-8687-F3E986B2E28B}" type="presOf" srcId="{9B71EC56-4720-44B7-84C9-0F922D83D3A9}" destId="{C33B6F79-85DD-4CA4-8F16-787E387F2041}" srcOrd="0" destOrd="0" presId="urn:microsoft.com/office/officeart/2005/8/layout/process1"/>
@@ -1799,7 +2991,10 @@
     <dgm:cxn modelId="{4DB4E3BE-BE27-4EDB-8ACE-7FC61C2BC492}" type="presParOf" srcId="{C33B6F79-85DD-4CA4-8F16-787E387F2041}" destId="{C6872888-E6B8-4D6A-8070-ACE2392B7A29}" srcOrd="2" destOrd="0" presId="urn:microsoft.com/office/officeart/2005/8/layout/process1"/>
     <dgm:cxn modelId="{C796F859-68DD-4100-9581-79A9C7D1E712}" type="presParOf" srcId="{C33B6F79-85DD-4CA4-8F16-787E387F2041}" destId="{BBAEDD4C-FD49-473D-B1D9-15F54151F655}" srcOrd="3" destOrd="0" presId="urn:microsoft.com/office/officeart/2005/8/layout/process1"/>
     <dgm:cxn modelId="{8003FABB-B19A-497F-9235-692C02FD6062}" type="presParOf" srcId="{BBAEDD4C-FD49-473D-B1D9-15F54151F655}" destId="{E409753E-D856-4FF7-A8A7-08C9FB1A05A2}" srcOrd="0" destOrd="0" presId="urn:microsoft.com/office/officeart/2005/8/layout/process1"/>
-    <dgm:cxn modelId="{3F269588-5F7B-46E6-A905-2ADF22189890}" type="presParOf" srcId="{C33B6F79-85DD-4CA4-8F16-787E387F2041}" destId="{55A7AD11-494B-4C2A-BF26-C2747E28F90E}" srcOrd="4" destOrd="0" presId="urn:microsoft.com/office/officeart/2005/8/layout/process1"/>
+    <dgm:cxn modelId="{7B4827DE-913E-4D13-8BBA-317D585F2697}" type="presParOf" srcId="{C33B6F79-85DD-4CA4-8F16-787E387F2041}" destId="{041ACFAA-665C-4140-A908-4E855F4605B9}" srcOrd="4" destOrd="0" presId="urn:microsoft.com/office/officeart/2005/8/layout/process1"/>
+    <dgm:cxn modelId="{C5C031C8-81DC-4F60-8C25-2C51BCAEC410}" type="presParOf" srcId="{C33B6F79-85DD-4CA4-8F16-787E387F2041}" destId="{AC9F5475-608F-4102-8781-47371FAB49EE}" srcOrd="5" destOrd="0" presId="urn:microsoft.com/office/officeart/2005/8/layout/process1"/>
+    <dgm:cxn modelId="{9734DD31-E414-4581-ADB3-48E8BF013539}" type="presParOf" srcId="{AC9F5475-608F-4102-8781-47371FAB49EE}" destId="{29A4AFDB-174F-4293-A0C2-C3C69C75495B}" srcOrd="0" destOrd="0" presId="urn:microsoft.com/office/officeart/2005/8/layout/process1"/>
+    <dgm:cxn modelId="{3F269588-5F7B-46E6-A905-2ADF22189890}" type="presParOf" srcId="{C33B6F79-85DD-4CA4-8F16-787E387F2041}" destId="{55A7AD11-494B-4C2A-BF26-C2747E28F90E}" srcOrd="6" destOrd="0" presId="urn:microsoft.com/office/officeart/2005/8/layout/process1"/>
   </dgm:cxnLst>
   <dgm:bg/>
   <dgm:whole/>
@@ -1811,63 +3006,11 @@
 </dgm:dataModel>
 </file>
 
-<file path=ppt/diagrams/data2.xml><?xml version="1.0" encoding="utf-8"?>
+<file path=ppt/diagrams/data3.xml><?xml version="1.0" encoding="utf-8"?>
 <dgm:dataModel xmlns:dgm="http://schemas.openxmlformats.org/drawingml/2006/diagram" xmlns:a="http://schemas.openxmlformats.org/drawingml/2006/main">
   <dgm:ptLst>
     <dgm:pt modelId="{39EB3BFA-6EC9-4BCE-A661-08D1928E098D}" type="doc">
       <dgm:prSet loTypeId="urn:microsoft.com/office/officeart/2018/2/layout/IconLabelList" loCatId="icon" qsTypeId="urn:microsoft.com/office/officeart/2005/8/quickstyle/simple1" qsCatId="simple" csTypeId="urn:microsoft.com/office/officeart/2018/5/colors/Iconchunking_neutralbg_accent1_2" csCatId="accent1" phldr="1"/>
-      <dgm:spPr/>
-      <dgm:t>
-        <a:bodyPr/>
-        <a:lstStyle/>
-        <a:p>
-          <a:endParaRPr lang="en-US"/>
-        </a:p>
-      </dgm:t>
-    </dgm:pt>
-    <dgm:pt modelId="{6A79F510-7C02-477D-A075-4D56E1613AF5}">
-      <dgm:prSet/>
-      <dgm:spPr/>
-      <dgm:t>
-        <a:bodyPr/>
-        <a:lstStyle/>
-        <a:p>
-          <a:pPr algn="l">
-            <a:lnSpc>
-              <a:spcPct val="100000"/>
-            </a:lnSpc>
-          </a:pPr>
-          <a:r>
-            <a:rPr lang="en-US" dirty="0"/>
-            <a:t>- Docker supports OCI Standard</a:t>
-          </a:r>
-          <a:br>
-            <a:rPr lang="en-US" dirty="0"/>
-          </a:br>
-          <a:r>
-            <a:rPr lang="en-US" dirty="0"/>
-            <a:t>- Kubernetes uses different container runtime but </a:t>
-          </a:r>
-          <a:r>
-            <a:rPr lang="en-US"/>
-            <a:t>OCI images</a:t>
-          </a:r>
-        </a:p>
-      </dgm:t>
-    </dgm:pt>
-    <dgm:pt modelId="{2FBD3AC1-9AF8-4A6A-856A-727985B076CF}" type="parTrans" cxnId="{62FA8E82-7CE8-44E6-8B99-29A3594B6FBB}">
-      <dgm:prSet/>
-      <dgm:spPr/>
-      <dgm:t>
-        <a:bodyPr/>
-        <a:lstStyle/>
-        <a:p>
-          <a:endParaRPr lang="en-US"/>
-        </a:p>
-      </dgm:t>
-    </dgm:pt>
-    <dgm:pt modelId="{7A8F92AA-67A1-422A-8EE7-133BDED9B748}" type="sibTrans" cxnId="{62FA8E82-7CE8-44E6-8B99-29A3594B6FBB}">
-      <dgm:prSet/>
       <dgm:spPr/>
       <dgm:t>
         <a:bodyPr/>
@@ -1927,12 +3070,12 @@
       </dgm:prSet>
       <dgm:spPr/>
     </dgm:pt>
-    <dgm:pt modelId="{BF055F4A-ED1A-4FD3-BA99-10C84E15A5C9}" type="pres">
-      <dgm:prSet presAssocID="{6A79F510-7C02-477D-A075-4D56E1613AF5}" presName="compNode" presStyleCnt="0"/>
+    <dgm:pt modelId="{890CA4DB-A3E0-4A17-860F-4061CFE2CB65}" type="pres">
+      <dgm:prSet presAssocID="{0557F73D-417C-40C9-97D3-91BD96C9B0CD}" presName="compNode" presStyleCnt="0"/>
       <dgm:spPr/>
     </dgm:pt>
-    <dgm:pt modelId="{BF8245C2-5E2D-4DBB-849F-53E6FC7B8D1B}" type="pres">
-      <dgm:prSet presAssocID="{6A79F510-7C02-477D-A075-4D56E1613AF5}" presName="iconRect" presStyleLbl="node1" presStyleIdx="0" presStyleCnt="2"/>
+    <dgm:pt modelId="{CBFD29D4-A2B4-4C25-B7E6-7B5D0F69D3EF}" type="pres">
+      <dgm:prSet presAssocID="{0557F73D-417C-40C9-97D3-91BD96C9B0CD}" presName="iconRect" presStyleLbl="node1" presStyleIdx="0" presStyleCnt="1"/>
       <dgm:spPr>
         <a:blipFill>
           <a:blip xmlns:r="http://schemas.openxmlformats.org/officeDocument/2006/relationships" r:embed="rId1">
@@ -1955,55 +3098,6 @@
       </dgm:spPr>
       <dgm:extLst>
         <a:ext uri="{E40237B7-FDA0-4F09-8148-C483321AD2D9}">
-          <dgm14:cNvPr xmlns:dgm14="http://schemas.microsoft.com/office/drawing/2010/diagram" id="0" name="" descr="Bulldozer"/>
-        </a:ext>
-      </dgm:extLst>
-    </dgm:pt>
-    <dgm:pt modelId="{F9AF1796-0164-474B-9FED-136A4CCB5493}" type="pres">
-      <dgm:prSet presAssocID="{6A79F510-7C02-477D-A075-4D56E1613AF5}" presName="spaceRect" presStyleCnt="0"/>
-      <dgm:spPr/>
-    </dgm:pt>
-    <dgm:pt modelId="{7A7E39BC-A6AB-4E76-AD61-A98D22695260}" type="pres">
-      <dgm:prSet presAssocID="{6A79F510-7C02-477D-A075-4D56E1613AF5}" presName="textRect" presStyleLbl="revTx" presStyleIdx="0" presStyleCnt="2" custScaleX="113867" custScaleY="210415">
-        <dgm:presLayoutVars>
-          <dgm:chMax val="1"/>
-          <dgm:chPref val="1"/>
-        </dgm:presLayoutVars>
-      </dgm:prSet>
-      <dgm:spPr/>
-    </dgm:pt>
-    <dgm:pt modelId="{4CC7176F-B681-4819-A32D-FF7B4C093A11}" type="pres">
-      <dgm:prSet presAssocID="{7A8F92AA-67A1-422A-8EE7-133BDED9B748}" presName="sibTrans" presStyleCnt="0"/>
-      <dgm:spPr/>
-    </dgm:pt>
-    <dgm:pt modelId="{890CA4DB-A3E0-4A17-860F-4061CFE2CB65}" type="pres">
-      <dgm:prSet presAssocID="{0557F73D-417C-40C9-97D3-91BD96C9B0CD}" presName="compNode" presStyleCnt="0"/>
-      <dgm:spPr/>
-    </dgm:pt>
-    <dgm:pt modelId="{CBFD29D4-A2B4-4C25-B7E6-7B5D0F69D3EF}" type="pres">
-      <dgm:prSet presAssocID="{0557F73D-417C-40C9-97D3-91BD96C9B0CD}" presName="iconRect" presStyleLbl="node1" presStyleIdx="1" presStyleCnt="2"/>
-      <dgm:spPr>
-        <a:blipFill>
-          <a:blip xmlns:r="http://schemas.openxmlformats.org/officeDocument/2006/relationships" r:embed="rId3">
-            <a:extLst>
-              <a:ext uri="{28A0092B-C50C-407E-A947-70E740481C1C}">
-                <a14:useLocalDpi xmlns:a14="http://schemas.microsoft.com/office/drawing/2010/main" val="0"/>
-              </a:ext>
-              <a:ext uri="{96DAC541-7B7A-43D3-8B79-37D633B846F1}">
-                <asvg:svgBlip xmlns:asvg="http://schemas.microsoft.com/office/drawing/2016/SVG/main" r:embed="rId4"/>
-              </a:ext>
-            </a:extLst>
-          </a:blip>
-          <a:stretch>
-            <a:fillRect/>
-          </a:stretch>
-        </a:blipFill>
-        <a:ln>
-          <a:noFill/>
-        </a:ln>
-      </dgm:spPr>
-      <dgm:extLst>
-        <a:ext uri="{E40237B7-FDA0-4F09-8148-C483321AD2D9}">
           <dgm14:cNvPr xmlns:dgm14="http://schemas.microsoft.com/office/drawing/2010/diagram" id="0" name="" descr="Play"/>
         </a:ext>
       </dgm:extLst>
@@ -2013,7 +3107,7 @@
       <dgm:spPr/>
     </dgm:pt>
     <dgm:pt modelId="{8D849BA0-BC4B-4D3B-A81E-49F030CA18B9}" type="pres">
-      <dgm:prSet presAssocID="{0557F73D-417C-40C9-97D3-91BD96C9B0CD}" presName="textRect" presStyleLbl="revTx" presStyleIdx="1" presStyleCnt="2">
+      <dgm:prSet presAssocID="{0557F73D-417C-40C9-97D3-91BD96C9B0CD}" presName="textRect" presStyleLbl="revTx" presStyleIdx="0" presStyleCnt="1">
         <dgm:presLayoutVars>
           <dgm:chMax val="1"/>
           <dgm:chPref val="1"/>
@@ -2024,16 +3118,9 @@
   </dgm:ptLst>
   <dgm:cxnLst>
     <dgm:cxn modelId="{CB6B7669-BFE2-41E9-855C-5FB164FEBE17}" type="presOf" srcId="{39EB3BFA-6EC9-4BCE-A661-08D1928E098D}" destId="{CFA1BE30-752B-4ED1-9682-5F0DE36D6D9C}" srcOrd="0" destOrd="0" presId="urn:microsoft.com/office/officeart/2018/2/layout/IconLabelList"/>
-    <dgm:cxn modelId="{62FA8E82-7CE8-44E6-8B99-29A3594B6FBB}" srcId="{39EB3BFA-6EC9-4BCE-A661-08D1928E098D}" destId="{6A79F510-7C02-477D-A075-4D56E1613AF5}" srcOrd="0" destOrd="0" parTransId="{2FBD3AC1-9AF8-4A6A-856A-727985B076CF}" sibTransId="{7A8F92AA-67A1-422A-8EE7-133BDED9B748}"/>
     <dgm:cxn modelId="{B00C6885-3EB9-497E-985F-B6CCFC3D7C95}" type="presOf" srcId="{0557F73D-417C-40C9-97D3-91BD96C9B0CD}" destId="{8D849BA0-BC4B-4D3B-A81E-49F030CA18B9}" srcOrd="0" destOrd="0" presId="urn:microsoft.com/office/officeart/2018/2/layout/IconLabelList"/>
-    <dgm:cxn modelId="{00F10BCB-E96A-46F9-B72F-B7CC19188428}" srcId="{39EB3BFA-6EC9-4BCE-A661-08D1928E098D}" destId="{0557F73D-417C-40C9-97D3-91BD96C9B0CD}" srcOrd="1" destOrd="0" parTransId="{93FE0FD3-799F-4EB9-A0DA-961464109F59}" sibTransId="{BA13F336-25E5-4E32-BC0E-26E74B24957D}"/>
-    <dgm:cxn modelId="{F9692DCF-A5AC-469F-9EC0-0091F0FA8DD6}" type="presOf" srcId="{6A79F510-7C02-477D-A075-4D56E1613AF5}" destId="{7A7E39BC-A6AB-4E76-AD61-A98D22695260}" srcOrd="0" destOrd="0" presId="urn:microsoft.com/office/officeart/2018/2/layout/IconLabelList"/>
-    <dgm:cxn modelId="{8EF3A90B-B216-490E-9A8B-B69098285D67}" type="presParOf" srcId="{CFA1BE30-752B-4ED1-9682-5F0DE36D6D9C}" destId="{BF055F4A-ED1A-4FD3-BA99-10C84E15A5C9}" srcOrd="0" destOrd="0" presId="urn:microsoft.com/office/officeart/2018/2/layout/IconLabelList"/>
-    <dgm:cxn modelId="{40FD146A-19A8-4C2F-BDD4-AC3402919C75}" type="presParOf" srcId="{BF055F4A-ED1A-4FD3-BA99-10C84E15A5C9}" destId="{BF8245C2-5E2D-4DBB-849F-53E6FC7B8D1B}" srcOrd="0" destOrd="0" presId="urn:microsoft.com/office/officeart/2018/2/layout/IconLabelList"/>
-    <dgm:cxn modelId="{0168E05D-32B4-45C3-9AFF-F1F30BF2906A}" type="presParOf" srcId="{BF055F4A-ED1A-4FD3-BA99-10C84E15A5C9}" destId="{F9AF1796-0164-474B-9FED-136A4CCB5493}" srcOrd="1" destOrd="0" presId="urn:microsoft.com/office/officeart/2018/2/layout/IconLabelList"/>
-    <dgm:cxn modelId="{B2411BFF-1D3A-4062-802C-54996C74AB31}" type="presParOf" srcId="{BF055F4A-ED1A-4FD3-BA99-10C84E15A5C9}" destId="{7A7E39BC-A6AB-4E76-AD61-A98D22695260}" srcOrd="2" destOrd="0" presId="urn:microsoft.com/office/officeart/2018/2/layout/IconLabelList"/>
-    <dgm:cxn modelId="{EE9B1C88-24C2-460D-B1AB-8C730527546B}" type="presParOf" srcId="{CFA1BE30-752B-4ED1-9682-5F0DE36D6D9C}" destId="{4CC7176F-B681-4819-A32D-FF7B4C093A11}" srcOrd="1" destOrd="0" presId="urn:microsoft.com/office/officeart/2018/2/layout/IconLabelList"/>
-    <dgm:cxn modelId="{A297DDCC-09E0-4F7D-A9A2-A68F1B10F048}" type="presParOf" srcId="{CFA1BE30-752B-4ED1-9682-5F0DE36D6D9C}" destId="{890CA4DB-A3E0-4A17-860F-4061CFE2CB65}" srcOrd="2" destOrd="0" presId="urn:microsoft.com/office/officeart/2018/2/layout/IconLabelList"/>
+    <dgm:cxn modelId="{00F10BCB-E96A-46F9-B72F-B7CC19188428}" srcId="{39EB3BFA-6EC9-4BCE-A661-08D1928E098D}" destId="{0557F73D-417C-40C9-97D3-91BD96C9B0CD}" srcOrd="0" destOrd="0" parTransId="{93FE0FD3-799F-4EB9-A0DA-961464109F59}" sibTransId="{BA13F336-25E5-4E32-BC0E-26E74B24957D}"/>
+    <dgm:cxn modelId="{A297DDCC-09E0-4F7D-A9A2-A68F1B10F048}" type="presParOf" srcId="{CFA1BE30-752B-4ED1-9682-5F0DE36D6D9C}" destId="{890CA4DB-A3E0-4A17-860F-4061CFE2CB65}" srcOrd="0" destOrd="0" presId="urn:microsoft.com/office/officeart/2018/2/layout/IconLabelList"/>
     <dgm:cxn modelId="{E04C6416-2396-4FAF-93B1-A3FBD05703B2}" type="presParOf" srcId="{890CA4DB-A3E0-4A17-860F-4061CFE2CB65}" destId="{CBFD29D4-A2B4-4C25-B7E6-7B5D0F69D3EF}" srcOrd="0" destOrd="0" presId="urn:microsoft.com/office/officeart/2018/2/layout/IconLabelList"/>
     <dgm:cxn modelId="{97D0BF19-346F-4B94-AF56-54B2C9FA7F56}" type="presParOf" srcId="{890CA4DB-A3E0-4A17-860F-4061CFE2CB65}" destId="{EEDEFEB5-E185-4FC0-B9DB-C764F1FE5302}" srcOrd="1" destOrd="0" presId="urn:microsoft.com/office/officeart/2018/2/layout/IconLabelList"/>
     <dgm:cxn modelId="{AB565F33-9E74-4A3D-97A3-AE22730A535F}" type="presParOf" srcId="{890CA4DB-A3E0-4A17-860F-4061CFE2CB65}" destId="{8D849BA0-BC4B-4D3B-A81E-49F030CA18B9}" srcOrd="2" destOrd="0" presId="urn:microsoft.com/office/officeart/2018/2/layout/IconLabelList"/>
@@ -2056,6 +3143,679 @@
       <dsp:cNvGrpSpPr/>
     </dsp:nvGrpSpPr>
     <dsp:grpSpPr/>
+    <dsp:sp modelId="{0652333E-F6CC-4073-821B-29323D683BB8}">
+      <dsp:nvSpPr>
+        <dsp:cNvPr id="0" name=""/>
+        <dsp:cNvSpPr/>
+      </dsp:nvSpPr>
+      <dsp:spPr>
+        <a:xfrm>
+          <a:off x="0" y="2708"/>
+          <a:ext cx="4862446" cy="0"/>
+        </a:xfrm>
+        <a:prstGeom prst="line">
+          <a:avLst/>
+        </a:prstGeom>
+        <a:solidFill>
+          <a:schemeClr val="accent1">
+            <a:hueOff val="0"/>
+            <a:satOff val="0"/>
+            <a:lumOff val="0"/>
+            <a:alphaOff val="0"/>
+          </a:schemeClr>
+        </a:solidFill>
+        <a:ln w="12700" cap="flat" cmpd="sng" algn="ctr">
+          <a:solidFill>
+            <a:schemeClr val="accent1">
+              <a:hueOff val="0"/>
+              <a:satOff val="0"/>
+              <a:lumOff val="0"/>
+              <a:alphaOff val="0"/>
+            </a:schemeClr>
+          </a:solidFill>
+          <a:prstDash val="solid"/>
+          <a:miter lim="800000"/>
+        </a:ln>
+        <a:effectLst/>
+      </dsp:spPr>
+      <dsp:style>
+        <a:lnRef idx="2">
+          <a:scrgbClr r="0" g="0" b="0"/>
+        </a:lnRef>
+        <a:fillRef idx="1">
+          <a:scrgbClr r="0" g="0" b="0"/>
+        </a:fillRef>
+        <a:effectRef idx="0">
+          <a:scrgbClr r="0" g="0" b="0"/>
+        </a:effectRef>
+        <a:fontRef idx="minor">
+          <a:schemeClr val="lt1"/>
+        </a:fontRef>
+      </dsp:style>
+    </dsp:sp>
+    <dsp:sp modelId="{3273E10C-86C8-41BD-B622-5B7E5BACB2E3}">
+      <dsp:nvSpPr>
+        <dsp:cNvPr id="0" name=""/>
+        <dsp:cNvSpPr/>
+      </dsp:nvSpPr>
+      <dsp:spPr>
+        <a:xfrm>
+          <a:off x="0" y="2708"/>
+          <a:ext cx="4862446" cy="923438"/>
+        </a:xfrm>
+        <a:prstGeom prst="rect">
+          <a:avLst/>
+        </a:prstGeom>
+        <a:noFill/>
+        <a:ln>
+          <a:noFill/>
+        </a:ln>
+        <a:effectLst/>
+      </dsp:spPr>
+      <dsp:style>
+        <a:lnRef idx="0">
+          <a:scrgbClr r="0" g="0" b="0"/>
+        </a:lnRef>
+        <a:fillRef idx="0">
+          <a:scrgbClr r="0" g="0" b="0"/>
+        </a:fillRef>
+        <a:effectRef idx="0">
+          <a:scrgbClr r="0" g="0" b="0"/>
+        </a:effectRef>
+        <a:fontRef idx="minor"/>
+      </dsp:style>
+      <dsp:txBody>
+        <a:bodyPr spcFirstLastPara="0" vert="horz" wrap="square" lIns="160020" tIns="160020" rIns="160020" bIns="160020" numCol="1" spcCol="1270" anchor="t" anchorCtr="0">
+          <a:noAutofit/>
+        </a:bodyPr>
+        <a:lstStyle/>
+        <a:p>
+          <a:pPr marL="0" lvl="0" indent="0" algn="l" defTabSz="1866900">
+            <a:lnSpc>
+              <a:spcPct val="90000"/>
+            </a:lnSpc>
+            <a:spcBef>
+              <a:spcPct val="0"/>
+            </a:spcBef>
+            <a:spcAft>
+              <a:spcPct val="35000"/>
+            </a:spcAft>
+            <a:buNone/>
+          </a:pPr>
+          <a:r>
+            <a:rPr lang="en-US" sz="4200" kern="1200"/>
+            <a:t>Containers</a:t>
+          </a:r>
+        </a:p>
+      </dsp:txBody>
+      <dsp:txXfrm>
+        <a:off x="0" y="2708"/>
+        <a:ext cx="4862446" cy="923438"/>
+      </dsp:txXfrm>
+    </dsp:sp>
+    <dsp:sp modelId="{779270BB-E863-46E2-A6BF-8AAC1E756C7A}">
+      <dsp:nvSpPr>
+        <dsp:cNvPr id="0" name=""/>
+        <dsp:cNvSpPr/>
+      </dsp:nvSpPr>
+      <dsp:spPr>
+        <a:xfrm>
+          <a:off x="0" y="926146"/>
+          <a:ext cx="4862446" cy="0"/>
+        </a:xfrm>
+        <a:prstGeom prst="line">
+          <a:avLst/>
+        </a:prstGeom>
+        <a:solidFill>
+          <a:schemeClr val="accent1">
+            <a:hueOff val="0"/>
+            <a:satOff val="0"/>
+            <a:lumOff val="0"/>
+            <a:alphaOff val="0"/>
+          </a:schemeClr>
+        </a:solidFill>
+        <a:ln w="12700" cap="flat" cmpd="sng" algn="ctr">
+          <a:solidFill>
+            <a:schemeClr val="accent1">
+              <a:hueOff val="0"/>
+              <a:satOff val="0"/>
+              <a:lumOff val="0"/>
+              <a:alphaOff val="0"/>
+            </a:schemeClr>
+          </a:solidFill>
+          <a:prstDash val="solid"/>
+          <a:miter lim="800000"/>
+        </a:ln>
+        <a:effectLst/>
+      </dsp:spPr>
+      <dsp:style>
+        <a:lnRef idx="2">
+          <a:scrgbClr r="0" g="0" b="0"/>
+        </a:lnRef>
+        <a:fillRef idx="1">
+          <a:scrgbClr r="0" g="0" b="0"/>
+        </a:fillRef>
+        <a:effectRef idx="0">
+          <a:scrgbClr r="0" g="0" b="0"/>
+        </a:effectRef>
+        <a:fontRef idx="minor">
+          <a:schemeClr val="lt1"/>
+        </a:fontRef>
+      </dsp:style>
+    </dsp:sp>
+    <dsp:sp modelId="{47D2D37E-6728-4056-B90C-BCBFF177C1E1}">
+      <dsp:nvSpPr>
+        <dsp:cNvPr id="0" name=""/>
+        <dsp:cNvSpPr/>
+      </dsp:nvSpPr>
+      <dsp:spPr>
+        <a:xfrm>
+          <a:off x="0" y="926146"/>
+          <a:ext cx="4862446" cy="923438"/>
+        </a:xfrm>
+        <a:prstGeom prst="rect">
+          <a:avLst/>
+        </a:prstGeom>
+        <a:noFill/>
+        <a:ln>
+          <a:noFill/>
+        </a:ln>
+        <a:effectLst/>
+      </dsp:spPr>
+      <dsp:style>
+        <a:lnRef idx="0">
+          <a:scrgbClr r="0" g="0" b="0"/>
+        </a:lnRef>
+        <a:fillRef idx="0">
+          <a:scrgbClr r="0" g="0" b="0"/>
+        </a:fillRef>
+        <a:effectRef idx="0">
+          <a:scrgbClr r="0" g="0" b="0"/>
+        </a:effectRef>
+        <a:fontRef idx="minor"/>
+      </dsp:style>
+      <dsp:txBody>
+        <a:bodyPr spcFirstLastPara="0" vert="horz" wrap="square" lIns="160020" tIns="160020" rIns="160020" bIns="160020" numCol="1" spcCol="1270" anchor="t" anchorCtr="0">
+          <a:noAutofit/>
+        </a:bodyPr>
+        <a:lstStyle/>
+        <a:p>
+          <a:pPr marL="0" lvl="0" indent="0" algn="l" defTabSz="1866900">
+            <a:lnSpc>
+              <a:spcPct val="90000"/>
+            </a:lnSpc>
+            <a:spcBef>
+              <a:spcPct val="0"/>
+            </a:spcBef>
+            <a:spcAft>
+              <a:spcPct val="35000"/>
+            </a:spcAft>
+            <a:buNone/>
+          </a:pPr>
+          <a:r>
+            <a:rPr lang="en-US" sz="4200" kern="1200" dirty="0"/>
+            <a:t>Kubernetes</a:t>
+          </a:r>
+        </a:p>
+      </dsp:txBody>
+      <dsp:txXfrm>
+        <a:off x="0" y="926146"/>
+        <a:ext cx="4862446" cy="923438"/>
+      </dsp:txXfrm>
+    </dsp:sp>
+    <dsp:sp modelId="{6034907C-D2BC-4918-8EC5-664542E1312E}">
+      <dsp:nvSpPr>
+        <dsp:cNvPr id="0" name=""/>
+        <dsp:cNvSpPr/>
+      </dsp:nvSpPr>
+      <dsp:spPr>
+        <a:xfrm>
+          <a:off x="0" y="1849585"/>
+          <a:ext cx="4862446" cy="0"/>
+        </a:xfrm>
+        <a:prstGeom prst="line">
+          <a:avLst/>
+        </a:prstGeom>
+        <a:solidFill>
+          <a:schemeClr val="accent1">
+            <a:hueOff val="0"/>
+            <a:satOff val="0"/>
+            <a:lumOff val="0"/>
+            <a:alphaOff val="0"/>
+          </a:schemeClr>
+        </a:solidFill>
+        <a:ln w="12700" cap="flat" cmpd="sng" algn="ctr">
+          <a:solidFill>
+            <a:schemeClr val="accent1">
+              <a:hueOff val="0"/>
+              <a:satOff val="0"/>
+              <a:lumOff val="0"/>
+              <a:alphaOff val="0"/>
+            </a:schemeClr>
+          </a:solidFill>
+          <a:prstDash val="solid"/>
+          <a:miter lim="800000"/>
+        </a:ln>
+        <a:effectLst/>
+      </dsp:spPr>
+      <dsp:style>
+        <a:lnRef idx="2">
+          <a:scrgbClr r="0" g="0" b="0"/>
+        </a:lnRef>
+        <a:fillRef idx="1">
+          <a:scrgbClr r="0" g="0" b="0"/>
+        </a:fillRef>
+        <a:effectRef idx="0">
+          <a:scrgbClr r="0" g="0" b="0"/>
+        </a:effectRef>
+        <a:fontRef idx="minor">
+          <a:schemeClr val="lt1"/>
+        </a:fontRef>
+      </dsp:style>
+    </dsp:sp>
+    <dsp:sp modelId="{D93285A6-91AA-4A8B-8659-ED1CA6CFBC31}">
+      <dsp:nvSpPr>
+        <dsp:cNvPr id="0" name=""/>
+        <dsp:cNvSpPr/>
+      </dsp:nvSpPr>
+      <dsp:spPr>
+        <a:xfrm>
+          <a:off x="0" y="1849585"/>
+          <a:ext cx="4862446" cy="923438"/>
+        </a:xfrm>
+        <a:prstGeom prst="rect">
+          <a:avLst/>
+        </a:prstGeom>
+        <a:noFill/>
+        <a:ln>
+          <a:noFill/>
+        </a:ln>
+        <a:effectLst/>
+      </dsp:spPr>
+      <dsp:style>
+        <a:lnRef idx="0">
+          <a:scrgbClr r="0" g="0" b="0"/>
+        </a:lnRef>
+        <a:fillRef idx="0">
+          <a:scrgbClr r="0" g="0" b="0"/>
+        </a:fillRef>
+        <a:effectRef idx="0">
+          <a:scrgbClr r="0" g="0" b="0"/>
+        </a:effectRef>
+        <a:fontRef idx="minor"/>
+      </dsp:style>
+      <dsp:txBody>
+        <a:bodyPr spcFirstLastPara="0" vert="horz" wrap="square" lIns="160020" tIns="160020" rIns="160020" bIns="160020" numCol="1" spcCol="1270" anchor="t" anchorCtr="0">
+          <a:noAutofit/>
+        </a:bodyPr>
+        <a:lstStyle/>
+        <a:p>
+          <a:pPr marL="0" lvl="0" indent="0" algn="l" defTabSz="1866900">
+            <a:lnSpc>
+              <a:spcPct val="90000"/>
+            </a:lnSpc>
+            <a:spcBef>
+              <a:spcPct val="0"/>
+            </a:spcBef>
+            <a:spcAft>
+              <a:spcPct val="35000"/>
+            </a:spcAft>
+            <a:buNone/>
+          </a:pPr>
+          <a:r>
+            <a:rPr lang="en-US" sz="4200" kern="1200" dirty="0" err="1"/>
+            <a:t>GitOps</a:t>
+          </a:r>
+          <a:endParaRPr lang="en-US" sz="4200" kern="1200" dirty="0"/>
+        </a:p>
+      </dsp:txBody>
+      <dsp:txXfrm>
+        <a:off x="0" y="1849585"/>
+        <a:ext cx="4862446" cy="923438"/>
+      </dsp:txXfrm>
+    </dsp:sp>
+    <dsp:sp modelId="{620CEAD9-44E7-4492-ADBF-AE1B807F2C02}">
+      <dsp:nvSpPr>
+        <dsp:cNvPr id="0" name=""/>
+        <dsp:cNvSpPr/>
+      </dsp:nvSpPr>
+      <dsp:spPr>
+        <a:xfrm>
+          <a:off x="0" y="2773023"/>
+          <a:ext cx="4862446" cy="0"/>
+        </a:xfrm>
+        <a:prstGeom prst="line">
+          <a:avLst/>
+        </a:prstGeom>
+        <a:solidFill>
+          <a:schemeClr val="accent1">
+            <a:hueOff val="0"/>
+            <a:satOff val="0"/>
+            <a:lumOff val="0"/>
+            <a:alphaOff val="0"/>
+          </a:schemeClr>
+        </a:solidFill>
+        <a:ln w="12700" cap="flat" cmpd="sng" algn="ctr">
+          <a:solidFill>
+            <a:schemeClr val="accent1">
+              <a:hueOff val="0"/>
+              <a:satOff val="0"/>
+              <a:lumOff val="0"/>
+              <a:alphaOff val="0"/>
+            </a:schemeClr>
+          </a:solidFill>
+          <a:prstDash val="solid"/>
+          <a:miter lim="800000"/>
+        </a:ln>
+        <a:effectLst/>
+      </dsp:spPr>
+      <dsp:style>
+        <a:lnRef idx="2">
+          <a:scrgbClr r="0" g="0" b="0"/>
+        </a:lnRef>
+        <a:fillRef idx="1">
+          <a:scrgbClr r="0" g="0" b="0"/>
+        </a:fillRef>
+        <a:effectRef idx="0">
+          <a:scrgbClr r="0" g="0" b="0"/>
+        </a:effectRef>
+        <a:fontRef idx="minor">
+          <a:schemeClr val="lt1"/>
+        </a:fontRef>
+      </dsp:style>
+    </dsp:sp>
+    <dsp:sp modelId="{CE06ACB5-1846-4D1C-8DAB-0A2A44C1E3A3}">
+      <dsp:nvSpPr>
+        <dsp:cNvPr id="0" name=""/>
+        <dsp:cNvSpPr/>
+      </dsp:nvSpPr>
+      <dsp:spPr>
+        <a:xfrm>
+          <a:off x="0" y="2773023"/>
+          <a:ext cx="4862446" cy="923438"/>
+        </a:xfrm>
+        <a:prstGeom prst="rect">
+          <a:avLst/>
+        </a:prstGeom>
+        <a:noFill/>
+        <a:ln>
+          <a:noFill/>
+        </a:ln>
+        <a:effectLst/>
+      </dsp:spPr>
+      <dsp:style>
+        <a:lnRef idx="0">
+          <a:scrgbClr r="0" g="0" b="0"/>
+        </a:lnRef>
+        <a:fillRef idx="0">
+          <a:scrgbClr r="0" g="0" b="0"/>
+        </a:fillRef>
+        <a:effectRef idx="0">
+          <a:scrgbClr r="0" g="0" b="0"/>
+        </a:effectRef>
+        <a:fontRef idx="minor"/>
+      </dsp:style>
+      <dsp:txBody>
+        <a:bodyPr spcFirstLastPara="0" vert="horz" wrap="square" lIns="160020" tIns="160020" rIns="160020" bIns="160020" numCol="1" spcCol="1270" anchor="t" anchorCtr="0">
+          <a:noAutofit/>
+        </a:bodyPr>
+        <a:lstStyle/>
+        <a:p>
+          <a:pPr marL="0" lvl="0" indent="0" algn="l" defTabSz="1866900">
+            <a:lnSpc>
+              <a:spcPct val="90000"/>
+            </a:lnSpc>
+            <a:spcBef>
+              <a:spcPct val="0"/>
+            </a:spcBef>
+            <a:spcAft>
+              <a:spcPct val="35000"/>
+            </a:spcAft>
+            <a:buNone/>
+          </a:pPr>
+          <a:r>
+            <a:rPr lang="en-US" sz="4200" kern="1200"/>
+            <a:t>Service Mesh</a:t>
+          </a:r>
+        </a:p>
+      </dsp:txBody>
+      <dsp:txXfrm>
+        <a:off x="0" y="2773023"/>
+        <a:ext cx="4862446" cy="923438"/>
+      </dsp:txXfrm>
+    </dsp:sp>
+    <dsp:sp modelId="{EC342443-76DD-4566-B517-E88A896701C2}">
+      <dsp:nvSpPr>
+        <dsp:cNvPr id="0" name=""/>
+        <dsp:cNvSpPr/>
+      </dsp:nvSpPr>
+      <dsp:spPr>
+        <a:xfrm>
+          <a:off x="0" y="3696461"/>
+          <a:ext cx="4862446" cy="0"/>
+        </a:xfrm>
+        <a:prstGeom prst="line">
+          <a:avLst/>
+        </a:prstGeom>
+        <a:solidFill>
+          <a:schemeClr val="accent1">
+            <a:hueOff val="0"/>
+            <a:satOff val="0"/>
+            <a:lumOff val="0"/>
+            <a:alphaOff val="0"/>
+          </a:schemeClr>
+        </a:solidFill>
+        <a:ln w="12700" cap="flat" cmpd="sng" algn="ctr">
+          <a:solidFill>
+            <a:schemeClr val="accent1">
+              <a:hueOff val="0"/>
+              <a:satOff val="0"/>
+              <a:lumOff val="0"/>
+              <a:alphaOff val="0"/>
+            </a:schemeClr>
+          </a:solidFill>
+          <a:prstDash val="solid"/>
+          <a:miter lim="800000"/>
+        </a:ln>
+        <a:effectLst/>
+      </dsp:spPr>
+      <dsp:style>
+        <a:lnRef idx="2">
+          <a:scrgbClr r="0" g="0" b="0"/>
+        </a:lnRef>
+        <a:fillRef idx="1">
+          <a:scrgbClr r="0" g="0" b="0"/>
+        </a:fillRef>
+        <a:effectRef idx="0">
+          <a:scrgbClr r="0" g="0" b="0"/>
+        </a:effectRef>
+        <a:fontRef idx="minor">
+          <a:schemeClr val="lt1"/>
+        </a:fontRef>
+      </dsp:style>
+    </dsp:sp>
+    <dsp:sp modelId="{61A4B1B8-D7B4-4B83-A68E-23487444738D}">
+      <dsp:nvSpPr>
+        <dsp:cNvPr id="0" name=""/>
+        <dsp:cNvSpPr/>
+      </dsp:nvSpPr>
+      <dsp:spPr>
+        <a:xfrm>
+          <a:off x="0" y="3696461"/>
+          <a:ext cx="4862446" cy="923438"/>
+        </a:xfrm>
+        <a:prstGeom prst="rect">
+          <a:avLst/>
+        </a:prstGeom>
+        <a:noFill/>
+        <a:ln>
+          <a:noFill/>
+        </a:ln>
+        <a:effectLst/>
+      </dsp:spPr>
+      <dsp:style>
+        <a:lnRef idx="0">
+          <a:scrgbClr r="0" g="0" b="0"/>
+        </a:lnRef>
+        <a:fillRef idx="0">
+          <a:scrgbClr r="0" g="0" b="0"/>
+        </a:fillRef>
+        <a:effectRef idx="0">
+          <a:scrgbClr r="0" g="0" b="0"/>
+        </a:effectRef>
+        <a:fontRef idx="minor"/>
+      </dsp:style>
+      <dsp:txBody>
+        <a:bodyPr spcFirstLastPara="0" vert="horz" wrap="square" lIns="160020" tIns="160020" rIns="160020" bIns="160020" numCol="1" spcCol="1270" anchor="t" anchorCtr="0">
+          <a:noAutofit/>
+        </a:bodyPr>
+        <a:lstStyle/>
+        <a:p>
+          <a:pPr marL="0" lvl="0" indent="0" algn="l" defTabSz="1866900">
+            <a:lnSpc>
+              <a:spcPct val="90000"/>
+            </a:lnSpc>
+            <a:spcBef>
+              <a:spcPct val="0"/>
+            </a:spcBef>
+            <a:spcAft>
+              <a:spcPct val="35000"/>
+            </a:spcAft>
+            <a:buNone/>
+          </a:pPr>
+          <a:r>
+            <a:rPr lang="en-US" sz="4200" kern="1200"/>
+            <a:t>Serverless</a:t>
+          </a:r>
+        </a:p>
+      </dsp:txBody>
+      <dsp:txXfrm>
+        <a:off x="0" y="3696461"/>
+        <a:ext cx="4862446" cy="923438"/>
+      </dsp:txXfrm>
+    </dsp:sp>
+    <dsp:sp modelId="{2D6D15E9-19D6-45B7-8606-BADE06F3D126}">
+      <dsp:nvSpPr>
+        <dsp:cNvPr id="0" name=""/>
+        <dsp:cNvSpPr/>
+      </dsp:nvSpPr>
+      <dsp:spPr>
+        <a:xfrm>
+          <a:off x="0" y="4619900"/>
+          <a:ext cx="4862446" cy="0"/>
+        </a:xfrm>
+        <a:prstGeom prst="line">
+          <a:avLst/>
+        </a:prstGeom>
+        <a:solidFill>
+          <a:schemeClr val="accent1">
+            <a:hueOff val="0"/>
+            <a:satOff val="0"/>
+            <a:lumOff val="0"/>
+            <a:alphaOff val="0"/>
+          </a:schemeClr>
+        </a:solidFill>
+        <a:ln w="12700" cap="flat" cmpd="sng" algn="ctr">
+          <a:solidFill>
+            <a:schemeClr val="accent1">
+              <a:hueOff val="0"/>
+              <a:satOff val="0"/>
+              <a:lumOff val="0"/>
+              <a:alphaOff val="0"/>
+            </a:schemeClr>
+          </a:solidFill>
+          <a:prstDash val="solid"/>
+          <a:miter lim="800000"/>
+        </a:ln>
+        <a:effectLst/>
+      </dsp:spPr>
+      <dsp:style>
+        <a:lnRef idx="2">
+          <a:scrgbClr r="0" g="0" b="0"/>
+        </a:lnRef>
+        <a:fillRef idx="1">
+          <a:scrgbClr r="0" g="0" b="0"/>
+        </a:fillRef>
+        <a:effectRef idx="0">
+          <a:scrgbClr r="0" g="0" b="0"/>
+        </a:effectRef>
+        <a:fontRef idx="minor">
+          <a:schemeClr val="lt1"/>
+        </a:fontRef>
+      </dsp:style>
+    </dsp:sp>
+    <dsp:sp modelId="{E01DC721-F700-425A-BE60-D0A8DCC1E08A}">
+      <dsp:nvSpPr>
+        <dsp:cNvPr id="0" name=""/>
+        <dsp:cNvSpPr/>
+      </dsp:nvSpPr>
+      <dsp:spPr>
+        <a:xfrm>
+          <a:off x="0" y="4619900"/>
+          <a:ext cx="4862446" cy="923438"/>
+        </a:xfrm>
+        <a:prstGeom prst="rect">
+          <a:avLst/>
+        </a:prstGeom>
+        <a:noFill/>
+        <a:ln>
+          <a:noFill/>
+        </a:ln>
+        <a:effectLst/>
+      </dsp:spPr>
+      <dsp:style>
+        <a:lnRef idx="0">
+          <a:scrgbClr r="0" g="0" b="0"/>
+        </a:lnRef>
+        <a:fillRef idx="0">
+          <a:scrgbClr r="0" g="0" b="0"/>
+        </a:fillRef>
+        <a:effectRef idx="0">
+          <a:scrgbClr r="0" g="0" b="0"/>
+        </a:effectRef>
+        <a:fontRef idx="minor"/>
+      </dsp:style>
+      <dsp:txBody>
+        <a:bodyPr spcFirstLastPara="0" vert="horz" wrap="square" lIns="160020" tIns="160020" rIns="160020" bIns="160020" numCol="1" spcCol="1270" anchor="t" anchorCtr="0">
+          <a:noAutofit/>
+        </a:bodyPr>
+        <a:lstStyle/>
+        <a:p>
+          <a:pPr marL="0" lvl="0" indent="0" algn="l" defTabSz="1866900">
+            <a:lnSpc>
+              <a:spcPct val="90000"/>
+            </a:lnSpc>
+            <a:spcBef>
+              <a:spcPct val="0"/>
+            </a:spcBef>
+            <a:spcAft>
+              <a:spcPct val="35000"/>
+            </a:spcAft>
+            <a:buNone/>
+          </a:pPr>
+          <a:r>
+            <a:rPr lang="en-US" sz="4200" kern="1200" dirty="0"/>
+            <a:t>What Next?</a:t>
+          </a:r>
+        </a:p>
+      </dsp:txBody>
+      <dsp:txXfrm>
+        <a:off x="0" y="4619900"/>
+        <a:ext cx="4862446" cy="923438"/>
+      </dsp:txXfrm>
+    </dsp:sp>
+  </dsp:spTree>
+</dsp:drawing>
+</file>
+
+<file path=ppt/diagrams/drawing2.xml><?xml version="1.0" encoding="utf-8"?>
+<dsp:drawing xmlns:dgm="http://schemas.openxmlformats.org/drawingml/2006/diagram" xmlns:dsp="http://schemas.microsoft.com/office/drawing/2008/diagram" xmlns:a="http://schemas.openxmlformats.org/drawingml/2006/main">
+  <dsp:spTree>
+    <dsp:nvGrpSpPr>
+      <dsp:cNvPr id="0" name=""/>
+      <dsp:cNvGrpSpPr/>
+    </dsp:nvGrpSpPr>
+    <dsp:grpSpPr/>
     <dsp:sp modelId="{E7407B6D-0C27-4BFC-8C6F-8F149FB2F343}">
       <dsp:nvSpPr>
         <dsp:cNvPr id="0" name=""/>
@@ -2063,8 +3823,8 @@
       </dsp:nvSpPr>
       <dsp:spPr>
         <a:xfrm>
-          <a:off x="9242" y="1346949"/>
-          <a:ext cx="2762398" cy="1657439"/>
+          <a:off x="4621" y="1569532"/>
+          <a:ext cx="2020453" cy="1212272"/>
         </a:xfrm>
         <a:prstGeom prst="roundRect">
           <a:avLst>
@@ -2108,12 +3868,12 @@
         </a:fontRef>
       </dsp:style>
       <dsp:txBody>
-        <a:bodyPr spcFirstLastPara="0" vert="horz" wrap="square" lIns="125730" tIns="125730" rIns="125730" bIns="125730" numCol="1" spcCol="1270" anchor="ctr" anchorCtr="0">
+        <a:bodyPr spcFirstLastPara="0" vert="horz" wrap="square" lIns="87630" tIns="87630" rIns="87630" bIns="87630" numCol="1" spcCol="1270" anchor="ctr" anchorCtr="0">
           <a:noAutofit/>
         </a:bodyPr>
         <a:lstStyle/>
         <a:p>
-          <a:pPr marL="0" lvl="0" indent="0" algn="ctr" defTabSz="1466850">
+          <a:pPr marL="0" lvl="0" indent="0" algn="ctr" defTabSz="1022350">
             <a:lnSpc>
               <a:spcPct val="90000"/>
             </a:lnSpc>
@@ -2126,14 +3886,14 @@
             <a:buNone/>
           </a:pPr>
           <a:r>
-            <a:rPr lang="en-US" sz="3300" kern="1200" dirty="0"/>
+            <a:rPr lang="en-US" sz="2300" kern="1200" dirty="0"/>
             <a:t>Build images</a:t>
           </a:r>
         </a:p>
       </dsp:txBody>
       <dsp:txXfrm>
-        <a:off x="57787" y="1395494"/>
-        <a:ext cx="2665308" cy="1560349"/>
+        <a:off x="40127" y="1605038"/>
+        <a:ext cx="1949441" cy="1141260"/>
       </dsp:txXfrm>
     </dsp:sp>
     <dsp:sp modelId="{5B4F5853-CCD7-4D55-9E07-BBFD7236041C}">
@@ -2143,8 +3903,8 @@
       </dsp:nvSpPr>
       <dsp:spPr>
         <a:xfrm>
-          <a:off x="3047880" y="1833131"/>
-          <a:ext cx="585628" cy="685074"/>
+          <a:off x="2227119" y="1925132"/>
+          <a:ext cx="428336" cy="501072"/>
         </a:xfrm>
         <a:prstGeom prst="rightArrow">
           <a:avLst>
@@ -2186,7 +3946,7 @@
         </a:bodyPr>
         <a:lstStyle/>
         <a:p>
-          <a:pPr marL="0" lvl="0" indent="0" algn="ctr" defTabSz="1155700">
+          <a:pPr marL="0" lvl="0" indent="0" algn="ctr" defTabSz="844550">
             <a:lnSpc>
               <a:spcPct val="90000"/>
             </a:lnSpc>
@@ -2198,12 +3958,12 @@
             </a:spcAft>
             <a:buNone/>
           </a:pPr>
-          <a:endParaRPr lang="en-US" sz="2600" kern="1200"/>
+          <a:endParaRPr lang="en-US" sz="1900" kern="1200"/>
         </a:p>
       </dsp:txBody>
       <dsp:txXfrm>
-        <a:off x="3047880" y="1970146"/>
-        <a:ext cx="409940" cy="411044"/>
+        <a:off x="2227119" y="2025346"/>
+        <a:ext cx="299835" cy="300644"/>
       </dsp:txXfrm>
     </dsp:sp>
     <dsp:sp modelId="{C6872888-E6B8-4D6A-8070-ACE2392B7A29}">
@@ -2213,8 +3973,8 @@
       </dsp:nvSpPr>
       <dsp:spPr>
         <a:xfrm>
-          <a:off x="3876600" y="1346949"/>
-          <a:ext cx="2762398" cy="1657439"/>
+          <a:off x="2833255" y="1569532"/>
+          <a:ext cx="2020453" cy="1212272"/>
         </a:xfrm>
         <a:prstGeom prst="roundRect">
           <a:avLst>
@@ -2258,12 +4018,12 @@
         </a:fontRef>
       </dsp:style>
       <dsp:txBody>
-        <a:bodyPr spcFirstLastPara="0" vert="horz" wrap="square" lIns="125730" tIns="125730" rIns="125730" bIns="125730" numCol="1" spcCol="1270" anchor="ctr" anchorCtr="0">
+        <a:bodyPr spcFirstLastPara="0" vert="horz" wrap="square" lIns="87630" tIns="87630" rIns="87630" bIns="87630" numCol="1" spcCol="1270" anchor="ctr" anchorCtr="0">
           <a:noAutofit/>
         </a:bodyPr>
         <a:lstStyle/>
         <a:p>
-          <a:pPr marL="0" lvl="0" indent="0" algn="ctr" defTabSz="1466850">
+          <a:pPr marL="0" lvl="0" indent="0" algn="ctr" defTabSz="1022350">
             <a:lnSpc>
               <a:spcPct val="90000"/>
             </a:lnSpc>
@@ -2276,14 +4036,14 @@
             <a:buNone/>
           </a:pPr>
           <a:r>
-            <a:rPr lang="en-US" sz="3300" kern="1200" dirty="0"/>
+            <a:rPr lang="en-US" sz="2300" kern="1200" dirty="0"/>
             <a:t>Push into image registry</a:t>
           </a:r>
         </a:p>
       </dsp:txBody>
       <dsp:txXfrm>
-        <a:off x="3925145" y="1395494"/>
-        <a:ext cx="2665308" cy="1560349"/>
+        <a:off x="2868761" y="1605038"/>
+        <a:ext cx="1949441" cy="1141260"/>
       </dsp:txXfrm>
     </dsp:sp>
     <dsp:sp modelId="{BBAEDD4C-FD49-473D-B1D9-15F54151F655}">
@@ -2293,8 +4053,8 @@
       </dsp:nvSpPr>
       <dsp:spPr>
         <a:xfrm>
-          <a:off x="6915239" y="1833131"/>
-          <a:ext cx="585628" cy="685074"/>
+          <a:off x="5055754" y="1925132"/>
+          <a:ext cx="428336" cy="501072"/>
         </a:xfrm>
         <a:prstGeom prst="rightArrow">
           <a:avLst>
@@ -2336,7 +4096,7 @@
         </a:bodyPr>
         <a:lstStyle/>
         <a:p>
-          <a:pPr marL="0" lvl="0" indent="0" algn="ctr" defTabSz="1155700">
+          <a:pPr marL="0" lvl="0" indent="0" algn="ctr" defTabSz="844550">
             <a:lnSpc>
               <a:spcPct val="90000"/>
             </a:lnSpc>
@@ -2348,23 +4108,23 @@
             </a:spcAft>
             <a:buNone/>
           </a:pPr>
-          <a:endParaRPr lang="en-US" sz="2600" kern="1200"/>
+          <a:endParaRPr lang="en-US" sz="1900" kern="1200"/>
         </a:p>
       </dsp:txBody>
       <dsp:txXfrm>
-        <a:off x="6915239" y="1970146"/>
-        <a:ext cx="409940" cy="411044"/>
+        <a:off x="5055754" y="2025346"/>
+        <a:ext cx="299835" cy="300644"/>
       </dsp:txXfrm>
     </dsp:sp>
-    <dsp:sp modelId="{55A7AD11-494B-4C2A-BF26-C2747E28F90E}">
+    <dsp:sp modelId="{041ACFAA-665C-4140-A908-4E855F4605B9}">
       <dsp:nvSpPr>
         <dsp:cNvPr id="0" name=""/>
         <dsp:cNvSpPr/>
       </dsp:nvSpPr>
       <dsp:spPr>
         <a:xfrm>
-          <a:off x="7743958" y="1346949"/>
-          <a:ext cx="2762398" cy="1657439"/>
+          <a:off x="5661890" y="1569532"/>
+          <a:ext cx="2020453" cy="1212272"/>
         </a:xfrm>
         <a:prstGeom prst="roundRect">
           <a:avLst>
@@ -2408,12 +4168,12 @@
         </a:fontRef>
       </dsp:style>
       <dsp:txBody>
-        <a:bodyPr spcFirstLastPara="0" vert="horz" wrap="square" lIns="125730" tIns="125730" rIns="125730" bIns="125730" numCol="1" spcCol="1270" anchor="ctr" anchorCtr="0">
+        <a:bodyPr spcFirstLastPara="0" vert="horz" wrap="square" lIns="87630" tIns="87630" rIns="87630" bIns="87630" numCol="1" spcCol="1270" anchor="ctr" anchorCtr="0">
           <a:noAutofit/>
         </a:bodyPr>
         <a:lstStyle/>
         <a:p>
-          <a:pPr marL="0" lvl="0" indent="0" algn="ctr" defTabSz="1466850">
+          <a:pPr marL="0" lvl="0" indent="0" algn="ctr" defTabSz="1022350">
             <a:lnSpc>
               <a:spcPct val="90000"/>
             </a:lnSpc>
@@ -2426,21 +4186,171 @@
             <a:buNone/>
           </a:pPr>
           <a:r>
-            <a:rPr lang="en-US" sz="3300" kern="1200" dirty="0"/>
-            <a:t>Run container (from repo)</a:t>
+            <a:rPr lang="en-US" sz="2300" kern="1200" dirty="0"/>
+            <a:t>Security, vulnerability scanning</a:t>
           </a:r>
         </a:p>
       </dsp:txBody>
       <dsp:txXfrm>
-        <a:off x="7792503" y="1395494"/>
-        <a:ext cx="2665308" cy="1560349"/>
+        <a:off x="5697396" y="1605038"/>
+        <a:ext cx="1949441" cy="1141260"/>
+      </dsp:txXfrm>
+    </dsp:sp>
+    <dsp:sp modelId="{AC9F5475-608F-4102-8781-47371FAB49EE}">
+      <dsp:nvSpPr>
+        <dsp:cNvPr id="0" name=""/>
+        <dsp:cNvSpPr/>
+      </dsp:nvSpPr>
+      <dsp:spPr>
+        <a:xfrm>
+          <a:off x="7884389" y="1925132"/>
+          <a:ext cx="428336" cy="501072"/>
+        </a:xfrm>
+        <a:prstGeom prst="rightArrow">
+          <a:avLst>
+            <a:gd name="adj1" fmla="val 60000"/>
+            <a:gd name="adj2" fmla="val 50000"/>
+          </a:avLst>
+        </a:prstGeom>
+        <a:solidFill>
+          <a:schemeClr val="accent1">
+            <a:tint val="60000"/>
+            <a:hueOff val="0"/>
+            <a:satOff val="0"/>
+            <a:lumOff val="0"/>
+            <a:alphaOff val="0"/>
+          </a:schemeClr>
+        </a:solidFill>
+        <a:ln>
+          <a:noFill/>
+        </a:ln>
+        <a:effectLst/>
+      </dsp:spPr>
+      <dsp:style>
+        <a:lnRef idx="0">
+          <a:scrgbClr r="0" g="0" b="0"/>
+        </a:lnRef>
+        <a:fillRef idx="1">
+          <a:scrgbClr r="0" g="0" b="0"/>
+        </a:fillRef>
+        <a:effectRef idx="0">
+          <a:scrgbClr r="0" g="0" b="0"/>
+        </a:effectRef>
+        <a:fontRef idx="minor">
+          <a:schemeClr val="lt1"/>
+        </a:fontRef>
+      </dsp:style>
+      <dsp:txBody>
+        <a:bodyPr spcFirstLastPara="0" vert="horz" wrap="square" lIns="0" tIns="0" rIns="0" bIns="0" numCol="1" spcCol="1270" anchor="ctr" anchorCtr="0">
+          <a:noAutofit/>
+        </a:bodyPr>
+        <a:lstStyle/>
+        <a:p>
+          <a:pPr marL="0" lvl="0" indent="0" algn="ctr" defTabSz="844550">
+            <a:lnSpc>
+              <a:spcPct val="90000"/>
+            </a:lnSpc>
+            <a:spcBef>
+              <a:spcPct val="0"/>
+            </a:spcBef>
+            <a:spcAft>
+              <a:spcPct val="35000"/>
+            </a:spcAft>
+            <a:buNone/>
+          </a:pPr>
+          <a:endParaRPr lang="en-US" sz="1900" kern="1200"/>
+        </a:p>
+      </dsp:txBody>
+      <dsp:txXfrm>
+        <a:off x="7884389" y="2025346"/>
+        <a:ext cx="299835" cy="300644"/>
+      </dsp:txXfrm>
+    </dsp:sp>
+    <dsp:sp modelId="{55A7AD11-494B-4C2A-BF26-C2747E28F90E}">
+      <dsp:nvSpPr>
+        <dsp:cNvPr id="0" name=""/>
+        <dsp:cNvSpPr/>
+      </dsp:nvSpPr>
+      <dsp:spPr>
+        <a:xfrm>
+          <a:off x="8490525" y="1569532"/>
+          <a:ext cx="2020453" cy="1212272"/>
+        </a:xfrm>
+        <a:prstGeom prst="roundRect">
+          <a:avLst>
+            <a:gd name="adj" fmla="val 10000"/>
+          </a:avLst>
+        </a:prstGeom>
+        <a:solidFill>
+          <a:schemeClr val="accent1">
+            <a:hueOff val="0"/>
+            <a:satOff val="0"/>
+            <a:lumOff val="0"/>
+            <a:alphaOff val="0"/>
+          </a:schemeClr>
+        </a:solidFill>
+        <a:ln w="12700" cap="flat" cmpd="sng" algn="ctr">
+          <a:solidFill>
+            <a:schemeClr val="lt1">
+              <a:hueOff val="0"/>
+              <a:satOff val="0"/>
+              <a:lumOff val="0"/>
+              <a:alphaOff val="0"/>
+            </a:schemeClr>
+          </a:solidFill>
+          <a:prstDash val="solid"/>
+          <a:miter lim="800000"/>
+        </a:ln>
+        <a:effectLst/>
+      </dsp:spPr>
+      <dsp:style>
+        <a:lnRef idx="2">
+          <a:scrgbClr r="0" g="0" b="0"/>
+        </a:lnRef>
+        <a:fillRef idx="1">
+          <a:scrgbClr r="0" g="0" b="0"/>
+        </a:fillRef>
+        <a:effectRef idx="0">
+          <a:scrgbClr r="0" g="0" b="0"/>
+        </a:effectRef>
+        <a:fontRef idx="minor">
+          <a:schemeClr val="lt1"/>
+        </a:fontRef>
+      </dsp:style>
+      <dsp:txBody>
+        <a:bodyPr spcFirstLastPara="0" vert="horz" wrap="square" lIns="87630" tIns="87630" rIns="87630" bIns="87630" numCol="1" spcCol="1270" anchor="ctr" anchorCtr="0">
+          <a:noAutofit/>
+        </a:bodyPr>
+        <a:lstStyle/>
+        <a:p>
+          <a:pPr marL="0" lvl="0" indent="0" algn="ctr" defTabSz="1022350">
+            <a:lnSpc>
+              <a:spcPct val="90000"/>
+            </a:lnSpc>
+            <a:spcBef>
+              <a:spcPct val="0"/>
+            </a:spcBef>
+            <a:spcAft>
+              <a:spcPct val="35000"/>
+            </a:spcAft>
+            <a:buNone/>
+          </a:pPr>
+          <a:r>
+            <a:rPr lang="en-US" sz="2300" kern="1200" dirty="0"/>
+            <a:t>Run container</a:t>
+          </a:r>
+        </a:p>
+      </dsp:txBody>
+      <dsp:txXfrm>
+        <a:off x="8526031" y="1605038"/>
+        <a:ext cx="1949441" cy="1141260"/>
       </dsp:txXfrm>
     </dsp:sp>
   </dsp:spTree>
 </dsp:drawing>
 </file>
 
-<file path=ppt/diagrams/drawing2.xml><?xml version="1.0" encoding="utf-8"?>
+<file path=ppt/diagrams/drawing3.xml><?xml version="1.0" encoding="utf-8"?>
 <dsp:drawing xmlns:dgm="http://schemas.openxmlformats.org/drawingml/2006/diagram" xmlns:dsp="http://schemas.microsoft.com/office/drawing/2008/diagram" xmlns:a="http://schemas.openxmlformats.org/drawingml/2006/main">
   <dsp:spTree>
     <dsp:nvGrpSpPr>
@@ -2448,14 +4358,14 @@
       <dsp:cNvGrpSpPr/>
     </dsp:nvGrpSpPr>
     <dsp:grpSpPr/>
-    <dsp:sp modelId="{BF8245C2-5E2D-4DBB-849F-53E6FC7B8D1B}">
+    <dsp:sp modelId="{CBFD29D4-A2B4-4C25-B7E6-7B5D0F69D3EF}">
       <dsp:nvSpPr>
         <dsp:cNvPr id="0" name=""/>
         <dsp:cNvSpPr/>
       </dsp:nvSpPr>
       <dsp:spPr>
         <a:xfrm>
-          <a:off x="1953914" y="330547"/>
+          <a:off x="1829520" y="703272"/>
           <a:ext cx="1944000" cy="1944000"/>
         </a:xfrm>
         <a:prstGeom prst="rect">
@@ -2498,127 +4408,6 @@
         </a:fontRef>
       </dsp:style>
     </dsp:sp>
-    <dsp:sp modelId="{7A7E39BC-A6AB-4E76-AD61-A98D22695260}">
-      <dsp:nvSpPr>
-        <dsp:cNvPr id="0" name=""/>
-        <dsp:cNvSpPr/>
-      </dsp:nvSpPr>
-      <dsp:spPr>
-        <a:xfrm>
-          <a:off x="466387" y="2347269"/>
-          <a:ext cx="4919054" cy="1514988"/>
-        </a:xfrm>
-        <a:prstGeom prst="rect">
-          <a:avLst/>
-        </a:prstGeom>
-        <a:noFill/>
-        <a:ln>
-          <a:noFill/>
-        </a:ln>
-        <a:effectLst/>
-      </dsp:spPr>
-      <dsp:style>
-        <a:lnRef idx="0">
-          <a:scrgbClr r="0" g="0" b="0"/>
-        </a:lnRef>
-        <a:fillRef idx="0">
-          <a:scrgbClr r="0" g="0" b="0"/>
-        </a:fillRef>
-        <a:effectRef idx="0">
-          <a:scrgbClr r="0" g="0" b="0"/>
-        </a:effectRef>
-        <a:fontRef idx="minor"/>
-      </dsp:style>
-      <dsp:txBody>
-        <a:bodyPr spcFirstLastPara="0" vert="horz" wrap="square" lIns="0" tIns="0" rIns="0" bIns="0" numCol="1" spcCol="1270" anchor="t" anchorCtr="0">
-          <a:noAutofit/>
-        </a:bodyPr>
-        <a:lstStyle/>
-        <a:p>
-          <a:pPr marL="0" lvl="0" indent="0" algn="l" defTabSz="1200150">
-            <a:lnSpc>
-              <a:spcPct val="100000"/>
-            </a:lnSpc>
-            <a:spcBef>
-              <a:spcPct val="0"/>
-            </a:spcBef>
-            <a:spcAft>
-              <a:spcPct val="35000"/>
-            </a:spcAft>
-            <a:buNone/>
-          </a:pPr>
-          <a:r>
-            <a:rPr lang="en-US" sz="2700" kern="1200" dirty="0"/>
-            <a:t>- Docker supports OCI Standard</a:t>
-          </a:r>
-          <a:br>
-            <a:rPr lang="en-US" sz="2700" kern="1200" dirty="0"/>
-          </a:br>
-          <a:r>
-            <a:rPr lang="en-US" sz="2700" kern="1200" dirty="0"/>
-            <a:t>- Kubernetes uses different container runtime but </a:t>
-          </a:r>
-          <a:r>
-            <a:rPr lang="en-US" sz="2700" kern="1200"/>
-            <a:t>OCI images</a:t>
-          </a:r>
-        </a:p>
-      </dsp:txBody>
-      <dsp:txXfrm>
-        <a:off x="466387" y="2347269"/>
-        <a:ext cx="4919054" cy="1514988"/>
-      </dsp:txXfrm>
-    </dsp:sp>
-    <dsp:sp modelId="{CBFD29D4-A2B4-4C25-B7E6-7B5D0F69D3EF}">
-      <dsp:nvSpPr>
-        <dsp:cNvPr id="0" name=""/>
-        <dsp:cNvSpPr/>
-      </dsp:nvSpPr>
-      <dsp:spPr>
-        <a:xfrm>
-          <a:off x="7329441" y="529294"/>
-          <a:ext cx="1944000" cy="1944000"/>
-        </a:xfrm>
-        <a:prstGeom prst="rect">
-          <a:avLst/>
-        </a:prstGeom>
-        <a:blipFill>
-          <a:blip xmlns:r="http://schemas.openxmlformats.org/officeDocument/2006/relationships" r:embed="rId3">
-            <a:extLst>
-              <a:ext uri="{28A0092B-C50C-407E-A947-70E740481C1C}">
-                <a14:useLocalDpi xmlns:a14="http://schemas.microsoft.com/office/drawing/2010/main" val="0"/>
-              </a:ext>
-              <a:ext uri="{96DAC541-7B7A-43D3-8B79-37D633B846F1}">
-                <asvg:svgBlip xmlns:asvg="http://schemas.microsoft.com/office/drawing/2016/SVG/main" r:embed="rId4"/>
-              </a:ext>
-            </a:extLst>
-          </a:blip>
-          <a:stretch>
-            <a:fillRect/>
-          </a:stretch>
-        </a:blipFill>
-        <a:ln w="12700" cap="flat" cmpd="sng" algn="ctr">
-          <a:noFill/>
-          <a:prstDash val="solid"/>
-          <a:miter lim="800000"/>
-        </a:ln>
-        <a:effectLst/>
-      </dsp:spPr>
-      <dsp:style>
-        <a:lnRef idx="2">
-          <a:scrgbClr r="0" g="0" b="0"/>
-        </a:lnRef>
-        <a:fillRef idx="1">
-          <a:scrgbClr r="0" g="0" b="0"/>
-        </a:fillRef>
-        <a:effectRef idx="0">
-          <a:scrgbClr r="0" g="0" b="0"/>
-        </a:effectRef>
-        <a:fontRef idx="minor">
-          <a:schemeClr val="lt1"/>
-        </a:fontRef>
-      </dsp:style>
-    </dsp:sp>
     <dsp:sp modelId="{8D849BA0-BC4B-4D3B-A81E-49F030CA18B9}">
       <dsp:nvSpPr>
         <dsp:cNvPr id="0" name=""/>
@@ -2626,7 +4415,7 @@
       </dsp:nvSpPr>
       <dsp:spPr>
         <a:xfrm>
-          <a:off x="6141441" y="2943510"/>
+          <a:off x="641520" y="3117390"/>
           <a:ext cx="4320000" cy="720000"/>
         </a:xfrm>
         <a:prstGeom prst="rect">
@@ -2656,7 +4445,7 @@
         </a:bodyPr>
         <a:lstStyle/>
         <a:p>
-          <a:pPr marL="0" lvl="0" indent="0" algn="ctr" defTabSz="1200150">
+          <a:pPr marL="0" lvl="0" indent="0" algn="ctr" defTabSz="2044700">
             <a:lnSpc>
               <a:spcPct val="100000"/>
             </a:lnSpc>
@@ -2669,13 +4458,13 @@
             <a:buNone/>
           </a:pPr>
           <a:r>
-            <a:rPr lang="en-US" sz="2700" kern="1200" dirty="0"/>
+            <a:rPr lang="en-US" sz="4600" kern="1200" dirty="0"/>
             <a:t>Demo</a:t>
           </a:r>
         </a:p>
       </dsp:txBody>
       <dsp:txXfrm>
-        <a:off x="6141441" y="2943510"/>
+        <a:off x="641520" y="3117390"/>
         <a:ext cx="4320000" cy="720000"/>
       </dsp:txXfrm>
     </dsp:sp>
@@ -2684,6 +4473,472 @@
 </file>
 
 <file path=ppt/diagrams/layout1.xml><?xml version="1.0" encoding="utf-8"?>
+<dgm:layoutDef xmlns:dgm="http://schemas.openxmlformats.org/drawingml/2006/diagram" xmlns:a="http://schemas.openxmlformats.org/drawingml/2006/main" uniqueId="urn:microsoft.com/office/officeart/2008/layout/LinedList">
+  <dgm:title val=""/>
+  <dgm:desc val=""/>
+  <dgm:catLst>
+    <dgm:cat type="hierarchy" pri="8000"/>
+    <dgm:cat type="list" pri="2500"/>
+  </dgm:catLst>
+  <dgm:sampData>
+    <dgm:dataModel>
+      <dgm:ptLst>
+        <dgm:pt modelId="0" type="doc"/>
+        <dgm:pt modelId="1">
+          <dgm:prSet phldr="1"/>
+        </dgm:pt>
+        <dgm:pt modelId="11">
+          <dgm:prSet phldr="1"/>
+        </dgm:pt>
+        <dgm:pt modelId="12">
+          <dgm:prSet phldr="1"/>
+        </dgm:pt>
+        <dgm:pt modelId="13">
+          <dgm:prSet phldr="1"/>
+        </dgm:pt>
+      </dgm:ptLst>
+      <dgm:cxnLst>
+        <dgm:cxn modelId="2" srcId="0" destId="1" srcOrd="0" destOrd="0"/>
+        <dgm:cxn modelId="3" srcId="1" destId="11" srcOrd="0" destOrd="0"/>
+        <dgm:cxn modelId="4" srcId="1" destId="12" srcOrd="1" destOrd="0"/>
+        <dgm:cxn modelId="5" srcId="1" destId="13" srcOrd="2" destOrd="0"/>
+      </dgm:cxnLst>
+      <dgm:bg/>
+      <dgm:whole/>
+    </dgm:dataModel>
+  </dgm:sampData>
+  <dgm:styleData>
+    <dgm:dataModel>
+      <dgm:ptLst>
+        <dgm:pt modelId="0" type="doc"/>
+        <dgm:pt modelId="1">
+          <dgm:prSet phldr="1"/>
+        </dgm:pt>
+        <dgm:pt modelId="11">
+          <dgm:prSet phldr="1"/>
+        </dgm:pt>
+        <dgm:pt modelId="12">
+          <dgm:prSet phldr="1"/>
+        </dgm:pt>
+      </dgm:ptLst>
+      <dgm:cxnLst>
+        <dgm:cxn modelId="2" srcId="0" destId="1" srcOrd="0" destOrd="0"/>
+        <dgm:cxn modelId="3" srcId="1" destId="11" srcOrd="0" destOrd="0"/>
+        <dgm:cxn modelId="4" srcId="1" destId="12" srcOrd="1" destOrd="0"/>
+      </dgm:cxnLst>
+      <dgm:bg/>
+      <dgm:whole/>
+    </dgm:dataModel>
+  </dgm:styleData>
+  <dgm:clrData>
+    <dgm:dataModel>
+      <dgm:ptLst>
+        <dgm:pt modelId="0" type="doc"/>
+        <dgm:pt modelId="1">
+          <dgm:prSet phldr="1"/>
+        </dgm:pt>
+        <dgm:pt modelId="11">
+          <dgm:prSet phldr="1"/>
+        </dgm:pt>
+        <dgm:pt modelId="12">
+          <dgm:prSet phldr="1"/>
+        </dgm:pt>
+      </dgm:ptLst>
+      <dgm:cxnLst>
+        <dgm:cxn modelId="2" srcId="0" destId="1" srcOrd="0" destOrd="0"/>
+        <dgm:cxn modelId="3" srcId="1" destId="11" srcOrd="0" destOrd="0"/>
+        <dgm:cxn modelId="4" srcId="1" destId="12" srcOrd="1" destOrd="0"/>
+      </dgm:cxnLst>
+      <dgm:bg/>
+      <dgm:whole/>
+    </dgm:dataModel>
+  </dgm:clrData>
+  <dgm:layoutNode name="vert0">
+    <dgm:varLst>
+      <dgm:dir/>
+      <dgm:animOne val="branch"/>
+      <dgm:animLvl val="lvl"/>
+    </dgm:varLst>
+    <dgm:choose name="Name0">
+      <dgm:if name="Name1" func="var" arg="dir" op="equ" val="norm">
+        <dgm:alg type="lin">
+          <dgm:param type="linDir" val="fromT"/>
+          <dgm:param type="nodeHorzAlign" val="l"/>
+        </dgm:alg>
+      </dgm:if>
+      <dgm:else name="Name2">
+        <dgm:alg type="lin">
+          <dgm:param type="linDir" val="fromT"/>
+          <dgm:param type="nodeHorzAlign" val="r"/>
+        </dgm:alg>
+      </dgm:else>
+    </dgm:choose>
+    <dgm:shape xmlns:r="http://schemas.openxmlformats.org/officeDocument/2006/relationships" r:blip="">
+      <dgm:adjLst/>
+    </dgm:shape>
+    <dgm:presOf/>
+    <dgm:constrLst>
+      <dgm:constr type="w" for="ch" forName="horz1" refType="w"/>
+      <dgm:constr type="h" for="ch" forName="horz1" refType="h"/>
+      <dgm:constr type="h" for="des" forName="vert1" refType="h"/>
+      <dgm:constr type="h" for="des" forName="tx1" refType="h"/>
+      <dgm:constr type="h" for="des" forName="horz2" refType="h"/>
+      <dgm:constr type="h" for="des" forName="vert2" refType="h"/>
+      <dgm:constr type="h" for="des" forName="horz3" refType="h"/>
+      <dgm:constr type="h" for="des" forName="vert3" refType="h"/>
+      <dgm:constr type="h" for="des" forName="horz4" refType="h"/>
+      <dgm:constr type="h" for="des" ptType="node" refType="h"/>
+      <dgm:constr type="primFontSz" for="des" forName="tx1" op="equ" val="65"/>
+      <dgm:constr type="primFontSz" for="des" forName="tx2" op="equ" val="65"/>
+      <dgm:constr type="primFontSz" for="des" forName="tx3" op="equ" val="65"/>
+      <dgm:constr type="primFontSz" for="des" forName="tx4" op="equ" val="65"/>
+      <dgm:constr type="w" for="des" forName="thickLine" refType="w"/>
+      <dgm:constr type="h" for="des" forName="thickLine"/>
+      <dgm:constr type="h" for="des" forName="thinLine1"/>
+      <dgm:constr type="h" for="des" forName="thinLine2b"/>
+      <dgm:constr type="h" for="des" forName="thinLine3"/>
+      <dgm:constr type="h" for="des" forName="vertSpace2a" refType="h" fact="0.05"/>
+      <dgm:constr type="h" for="des" forName="vertSpace2b" refType="h" refFor="des" refForName="vertSpace2a"/>
+    </dgm:constrLst>
+    <dgm:forEach name="Name3" axis="ch" ptType="node">
+      <dgm:layoutNode name="thickLine" styleLbl="alignNode1">
+        <dgm:alg type="sp"/>
+        <dgm:shape xmlns:r="http://schemas.openxmlformats.org/officeDocument/2006/relationships" type="line" r:blip="">
+          <dgm:adjLst/>
+        </dgm:shape>
+        <dgm:presOf/>
+      </dgm:layoutNode>
+      <dgm:layoutNode name="horz1">
+        <dgm:choose name="Name4">
+          <dgm:if name="Name5" func="var" arg="dir" op="equ" val="norm">
+            <dgm:alg type="lin">
+              <dgm:param type="linDir" val="fromL"/>
+              <dgm:param type="nodeVertAlign" val="t"/>
+            </dgm:alg>
+          </dgm:if>
+          <dgm:else name="Name6">
+            <dgm:alg type="lin">
+              <dgm:param type="linDir" val="fromR"/>
+              <dgm:param type="nodeVertAlign" val="t"/>
+            </dgm:alg>
+          </dgm:else>
+        </dgm:choose>
+        <dgm:shape xmlns:r="http://schemas.openxmlformats.org/officeDocument/2006/relationships" r:blip="">
+          <dgm:adjLst/>
+        </dgm:shape>
+        <dgm:presOf/>
+        <dgm:choose name="Name7">
+          <dgm:if name="Name8" axis="root des" func="maxDepth" op="equ" val="1">
+            <dgm:constrLst>
+              <dgm:constr type="w" for="ch" forName="tx1" refType="w"/>
+            </dgm:constrLst>
+          </dgm:if>
+          <dgm:if name="Name9" axis="root des" func="maxDepth" op="equ" val="2">
+            <dgm:constrLst>
+              <dgm:constr type="w" for="ch" forName="tx1" refType="w" fact="0.2"/>
+              <dgm:constr type="w" for="des" forName="tx2" refType="w" fact="0.785"/>
+              <dgm:constr type="w" for="des" forName="horzSpace2" refType="w" fact="0.015"/>
+              <dgm:constr type="w" for="des" forName="thinLine2b" refType="w" fact="0.8"/>
+            </dgm:constrLst>
+          </dgm:if>
+          <dgm:if name="Name10" axis="root des" func="maxDepth" op="equ" val="3">
+            <dgm:constrLst>
+              <dgm:constr type="w" for="ch" forName="tx1" refType="w" fact="0.2"/>
+              <dgm:constr type="w" for="des" forName="tx2" refType="w" fact="0.385"/>
+              <dgm:constr type="w" for="des" forName="tx3" refType="w" fact="0.385"/>
+              <dgm:constr type="w" for="des" forName="horzSpace2" refType="w" fact="0.015"/>
+              <dgm:constr type="w" for="des" forName="horzSpace3" refType="w" fact="0.015"/>
+              <dgm:constr type="w" for="des" forName="thinLine2b" refType="w" fact="0.8"/>
+              <dgm:constr type="w" for="des" forName="thinLine3" refType="w" fact="0.385"/>
+            </dgm:constrLst>
+          </dgm:if>
+          <dgm:if name="Name11" axis="root des" func="maxDepth" op="gte" val="4">
+            <dgm:constrLst>
+              <dgm:constr type="w" for="ch" forName="tx1" refType="w" fact="0.2"/>
+              <dgm:constr type="w" for="des" forName="tx2" refType="w" fact="0.2516"/>
+              <dgm:constr type="w" for="des" forName="tx3" refType="w" fact="0.2516"/>
+              <dgm:constr type="w" for="des" forName="tx4" refType="w" fact="0.2516"/>
+              <dgm:constr type="w" for="des" forName="horzSpace2" refType="w" fact="0.015"/>
+              <dgm:constr type="w" for="des" forName="horzSpace3" refType="w" fact="0.015"/>
+              <dgm:constr type="w" for="des" forName="horzSpace4" refType="w" fact="0.015"/>
+              <dgm:constr type="w" for="des" forName="thinLine2b" refType="w" fact="0.8"/>
+              <dgm:constr type="w" for="des" forName="thinLine3" refType="w" fact="0.5332"/>
+            </dgm:constrLst>
+          </dgm:if>
+          <dgm:else name="Name12"/>
+        </dgm:choose>
+        <dgm:layoutNode name="tx1" styleLbl="revTx">
+          <dgm:alg type="tx">
+            <dgm:param type="parTxLTRAlign" val="l"/>
+            <dgm:param type="parTxRTLAlign" val="r"/>
+            <dgm:param type="txAnchorVert" val="t"/>
+          </dgm:alg>
+          <dgm:shape xmlns:r="http://schemas.openxmlformats.org/officeDocument/2006/relationships" type="rect" r:blip="">
+            <dgm:adjLst/>
+          </dgm:shape>
+          <dgm:presOf axis="self"/>
+          <dgm:constrLst>
+            <dgm:constr type="tMarg" refType="primFontSz" fact="0.3"/>
+            <dgm:constr type="bMarg" refType="primFontSz" fact="0.3"/>
+            <dgm:constr type="lMarg" refType="primFontSz" fact="0.3"/>
+            <dgm:constr type="rMarg" refType="primFontSz" fact="0.3"/>
+          </dgm:constrLst>
+          <dgm:ruleLst>
+            <dgm:rule type="primFontSz" val="5" fact="NaN" max="NaN"/>
+          </dgm:ruleLst>
+        </dgm:layoutNode>
+        <dgm:layoutNode name="vert1">
+          <dgm:choose name="Name13">
+            <dgm:if name="Name14" func="var" arg="dir" op="equ" val="norm">
+              <dgm:alg type="lin">
+                <dgm:param type="linDir" val="fromT"/>
+                <dgm:param type="nodeHorzAlign" val="l"/>
+              </dgm:alg>
+            </dgm:if>
+            <dgm:else name="Name15">
+              <dgm:alg type="lin">
+                <dgm:param type="linDir" val="fromT"/>
+                <dgm:param type="nodeHorzAlign" val="r"/>
+              </dgm:alg>
+            </dgm:else>
+          </dgm:choose>
+          <dgm:shape xmlns:r="http://schemas.openxmlformats.org/officeDocument/2006/relationships" r:blip="">
+            <dgm:adjLst/>
+          </dgm:shape>
+          <dgm:presOf/>
+          <dgm:forEach name="Name16" axis="ch" ptType="node">
+            <dgm:choose name="Name17">
+              <dgm:if name="Name18" axis="self" ptType="node" func="pos" op="equ" val="1">
+                <dgm:layoutNode name="vertSpace2a">
+                  <dgm:alg type="sp"/>
+                  <dgm:shape xmlns:r="http://schemas.openxmlformats.org/officeDocument/2006/relationships" r:blip="">
+                    <dgm:adjLst/>
+                  </dgm:shape>
+                  <dgm:presOf/>
+                </dgm:layoutNode>
+              </dgm:if>
+              <dgm:else name="Name19"/>
+            </dgm:choose>
+            <dgm:layoutNode name="horz2">
+              <dgm:choose name="Name20">
+                <dgm:if name="Name21" func="var" arg="dir" op="equ" val="norm">
+                  <dgm:alg type="lin">
+                    <dgm:param type="linDir" val="fromL"/>
+                    <dgm:param type="nodeVertAlign" val="t"/>
+                  </dgm:alg>
+                </dgm:if>
+                <dgm:else name="Name22">
+                  <dgm:alg type="lin">
+                    <dgm:param type="linDir" val="fromR"/>
+                    <dgm:param type="nodeVertAlign" val="t"/>
+                  </dgm:alg>
+                </dgm:else>
+              </dgm:choose>
+              <dgm:shape xmlns:r="http://schemas.openxmlformats.org/officeDocument/2006/relationships" r:blip="">
+                <dgm:adjLst/>
+              </dgm:shape>
+              <dgm:presOf/>
+              <dgm:layoutNode name="horzSpace2">
+                <dgm:alg type="sp"/>
+                <dgm:shape xmlns:r="http://schemas.openxmlformats.org/officeDocument/2006/relationships" r:blip="">
+                  <dgm:adjLst/>
+                </dgm:shape>
+                <dgm:presOf/>
+              </dgm:layoutNode>
+              <dgm:layoutNode name="tx2" styleLbl="revTx">
+                <dgm:alg type="tx">
+                  <dgm:param type="parTxLTRAlign" val="l"/>
+                  <dgm:param type="parTxRTLAlign" val="r"/>
+                  <dgm:param type="txAnchorVert" val="t"/>
+                </dgm:alg>
+                <dgm:shape xmlns:r="http://schemas.openxmlformats.org/officeDocument/2006/relationships" type="rect" r:blip="">
+                  <dgm:adjLst/>
+                </dgm:shape>
+                <dgm:presOf axis="self"/>
+                <dgm:constrLst>
+                  <dgm:constr type="tMarg" refType="primFontSz" fact="0.3"/>
+                  <dgm:constr type="bMarg" refType="primFontSz" fact="0.3"/>
+                  <dgm:constr type="lMarg" refType="primFontSz" fact="0.3"/>
+                  <dgm:constr type="rMarg" refType="primFontSz" fact="0.3"/>
+                </dgm:constrLst>
+                <dgm:ruleLst>
+                  <dgm:rule type="primFontSz" val="5" fact="NaN" max="NaN"/>
+                </dgm:ruleLst>
+              </dgm:layoutNode>
+              <dgm:layoutNode name="vert2">
+                <dgm:choose name="Name23">
+                  <dgm:if name="Name24" func="var" arg="dir" op="equ" val="norm">
+                    <dgm:alg type="lin">
+                      <dgm:param type="linDir" val="fromT"/>
+                      <dgm:param type="nodeHorzAlign" val="l"/>
+                    </dgm:alg>
+                  </dgm:if>
+                  <dgm:else name="Name25">
+                    <dgm:alg type="lin">
+                      <dgm:param type="linDir" val="fromT"/>
+                      <dgm:param type="nodeHorzAlign" val="r"/>
+                    </dgm:alg>
+                  </dgm:else>
+                </dgm:choose>
+                <dgm:shape xmlns:r="http://schemas.openxmlformats.org/officeDocument/2006/relationships" r:blip="">
+                  <dgm:adjLst/>
+                </dgm:shape>
+                <dgm:presOf/>
+                <dgm:forEach name="Name26" axis="ch" ptType="node">
+                  <dgm:layoutNode name="horz3">
+                    <dgm:choose name="Name27">
+                      <dgm:if name="Name28" func="var" arg="dir" op="equ" val="norm">
+                        <dgm:alg type="lin">
+                          <dgm:param type="linDir" val="fromL"/>
+                          <dgm:param type="nodeVertAlign" val="t"/>
+                        </dgm:alg>
+                      </dgm:if>
+                      <dgm:else name="Name29">
+                        <dgm:alg type="lin">
+                          <dgm:param type="linDir" val="fromR"/>
+                          <dgm:param type="nodeVertAlign" val="t"/>
+                        </dgm:alg>
+                      </dgm:else>
+                    </dgm:choose>
+                    <dgm:shape xmlns:r="http://schemas.openxmlformats.org/officeDocument/2006/relationships" r:blip="">
+                      <dgm:adjLst/>
+                    </dgm:shape>
+                    <dgm:presOf/>
+                    <dgm:layoutNode name="horzSpace3">
+                      <dgm:alg type="sp"/>
+                      <dgm:shape xmlns:r="http://schemas.openxmlformats.org/officeDocument/2006/relationships" r:blip="">
+                        <dgm:adjLst/>
+                      </dgm:shape>
+                      <dgm:presOf/>
+                    </dgm:layoutNode>
+                    <dgm:layoutNode name="tx3" styleLbl="revTx">
+                      <dgm:alg type="tx">
+                        <dgm:param type="parTxLTRAlign" val="l"/>
+                        <dgm:param type="parTxRTLAlign" val="r"/>
+                        <dgm:param type="txAnchorVert" val="t"/>
+                      </dgm:alg>
+                      <dgm:shape xmlns:r="http://schemas.openxmlformats.org/officeDocument/2006/relationships" type="rect" r:blip="">
+                        <dgm:adjLst/>
+                      </dgm:shape>
+                      <dgm:presOf axis="self"/>
+                      <dgm:constrLst>
+                        <dgm:constr type="tMarg" refType="primFontSz" fact="0.3"/>
+                        <dgm:constr type="bMarg" refType="primFontSz" fact="0.3"/>
+                        <dgm:constr type="lMarg" refType="primFontSz" fact="0.3"/>
+                        <dgm:constr type="rMarg" refType="primFontSz" fact="0.3"/>
+                      </dgm:constrLst>
+                      <dgm:ruleLst>
+                        <dgm:rule type="primFontSz" val="5" fact="NaN" max="NaN"/>
+                      </dgm:ruleLst>
+                    </dgm:layoutNode>
+                    <dgm:layoutNode name="vert3">
+                      <dgm:choose name="Name30">
+                        <dgm:if name="Name31" func="var" arg="dir" op="equ" val="norm">
+                          <dgm:alg type="lin">
+                            <dgm:param type="linDir" val="fromT"/>
+                            <dgm:param type="nodeHorzAlign" val="l"/>
+                          </dgm:alg>
+                        </dgm:if>
+                        <dgm:else name="Name32">
+                          <dgm:alg type="lin">
+                            <dgm:param type="linDir" val="fromT"/>
+                            <dgm:param type="nodeHorzAlign" val="r"/>
+                          </dgm:alg>
+                        </dgm:else>
+                      </dgm:choose>
+                      <dgm:shape xmlns:r="http://schemas.openxmlformats.org/officeDocument/2006/relationships" r:blip="">
+                        <dgm:adjLst/>
+                      </dgm:shape>
+                      <dgm:presOf/>
+                      <dgm:forEach name="Name33" axis="ch" ptType="node">
+                        <dgm:layoutNode name="horz4">
+                          <dgm:choose name="Name34">
+                            <dgm:if name="Name35" func="var" arg="dir" op="equ" val="norm">
+                              <dgm:alg type="lin">
+                                <dgm:param type="linDir" val="fromL"/>
+                                <dgm:param type="nodeVertAlign" val="t"/>
+                              </dgm:alg>
+                            </dgm:if>
+                            <dgm:else name="Name36">
+                              <dgm:alg type="lin">
+                                <dgm:param type="linDir" val="fromR"/>
+                                <dgm:param type="nodeVertAlign" val="t"/>
+                              </dgm:alg>
+                            </dgm:else>
+                          </dgm:choose>
+                          <dgm:shape xmlns:r="http://schemas.openxmlformats.org/officeDocument/2006/relationships" r:blip="">
+                            <dgm:adjLst/>
+                          </dgm:shape>
+                          <dgm:presOf/>
+                          <dgm:layoutNode name="horzSpace4">
+                            <dgm:alg type="sp"/>
+                            <dgm:shape xmlns:r="http://schemas.openxmlformats.org/officeDocument/2006/relationships" r:blip="">
+                              <dgm:adjLst/>
+                            </dgm:shape>
+                            <dgm:presOf/>
+                          </dgm:layoutNode>
+                          <dgm:layoutNode name="tx4" styleLbl="revTx">
+                            <dgm:varLst>
+                              <dgm:bulletEnabled val="1"/>
+                            </dgm:varLst>
+                            <dgm:alg type="tx">
+                              <dgm:param type="parTxLTRAlign" val="l"/>
+                              <dgm:param type="parTxRTLAlign" val="r"/>
+                              <dgm:param type="txAnchorVert" val="t"/>
+                            </dgm:alg>
+                            <dgm:shape xmlns:r="http://schemas.openxmlformats.org/officeDocument/2006/relationships" type="rect" r:blip="">
+                              <dgm:adjLst/>
+                            </dgm:shape>
+                            <dgm:presOf axis="desOrSelf" ptType="node"/>
+                            <dgm:constrLst>
+                              <dgm:constr type="tMarg" refType="primFontSz" fact="0.3"/>
+                              <dgm:constr type="bMarg" refType="primFontSz" fact="0.3"/>
+                              <dgm:constr type="lMarg" refType="primFontSz" fact="0.3"/>
+                              <dgm:constr type="rMarg" refType="primFontSz" fact="0.3"/>
+                            </dgm:constrLst>
+                            <dgm:ruleLst>
+                              <dgm:rule type="primFontSz" val="5" fact="NaN" max="NaN"/>
+                            </dgm:ruleLst>
+                          </dgm:layoutNode>
+                        </dgm:layoutNode>
+                      </dgm:forEach>
+                    </dgm:layoutNode>
+                  </dgm:layoutNode>
+                  <dgm:forEach name="Name37" axis="followSib" ptType="sibTrans" cnt="1">
+                    <dgm:layoutNode name="thinLine3" styleLbl="callout">
+                      <dgm:alg type="sp"/>
+                      <dgm:shape xmlns:r="http://schemas.openxmlformats.org/officeDocument/2006/relationships" type="line" r:blip="">
+                        <dgm:adjLst/>
+                      </dgm:shape>
+                      <dgm:presOf/>
+                    </dgm:layoutNode>
+                  </dgm:forEach>
+                </dgm:forEach>
+              </dgm:layoutNode>
+            </dgm:layoutNode>
+            <dgm:layoutNode name="thinLine2b" styleLbl="callout">
+              <dgm:alg type="sp"/>
+              <dgm:shape xmlns:r="http://schemas.openxmlformats.org/officeDocument/2006/relationships" type="line" r:blip="">
+                <dgm:adjLst/>
+              </dgm:shape>
+              <dgm:presOf/>
+            </dgm:layoutNode>
+            <dgm:layoutNode name="vertSpace2b">
+              <dgm:alg type="sp"/>
+              <dgm:shape xmlns:r="http://schemas.openxmlformats.org/officeDocument/2006/relationships" r:blip="">
+                <dgm:adjLst/>
+              </dgm:shape>
+              <dgm:presOf/>
+            </dgm:layoutNode>
+          </dgm:forEach>
+        </dgm:layoutNode>
+      </dgm:layoutNode>
+    </dgm:forEach>
+  </dgm:layoutNode>
+</dgm:layoutDef>
+</file>
+
+<file path=ppt/diagrams/layout2.xml><?xml version="1.0" encoding="utf-8"?>
 <dgm:layoutDef xmlns:dgm="http://schemas.openxmlformats.org/drawingml/2006/diagram" xmlns:a="http://schemas.openxmlformats.org/drawingml/2006/main" uniqueId="urn:microsoft.com/office/officeart/2005/8/layout/process1">
   <dgm:title val=""/>
   <dgm:desc val=""/>
@@ -2829,7 +5084,7 @@
 </dgm:layoutDef>
 </file>
 
-<file path=ppt/diagrams/layout2.xml><?xml version="1.0" encoding="utf-8"?>
+<file path=ppt/diagrams/layout3.xml><?xml version="1.0" encoding="utf-8"?>
 <dgm:layoutDef xmlns:dgm="http://schemas.openxmlformats.org/drawingml/2006/diagram" xmlns:a="http://schemas.openxmlformats.org/drawingml/2006/main" uniqueId="urn:microsoft.com/office/officeart/2018/2/layout/IconLabelList">
   <dgm:title val="Icon Label List"/>
   <dgm:desc val="Use to show non-sequential or grouped chunks of information accompanied by a related visuals. Works best with icons or small pictures with short text captions."/>
@@ -4054,6 +6309,1040 @@
 </file>
 
 <file path=ppt/diagrams/quickStyle2.xml><?xml version="1.0" encoding="utf-8"?>
+<dgm:styleDef xmlns:dgm="http://schemas.openxmlformats.org/drawingml/2006/diagram" xmlns:a="http://schemas.openxmlformats.org/drawingml/2006/main" uniqueId="urn:microsoft.com/office/officeart/2005/8/quickstyle/simple1">
+  <dgm:title val=""/>
+  <dgm:desc val=""/>
+  <dgm:catLst>
+    <dgm:cat type="simple" pri="10100"/>
+  </dgm:catLst>
+  <dgm:scene3d>
+    <a:camera prst="orthographicFront"/>
+    <a:lightRig rig="threePt" dir="t"/>
+  </dgm:scene3d>
+  <dgm:styleLbl name="node0">
+    <dgm:scene3d>
+      <a:camera prst="orthographicFront"/>
+      <a:lightRig rig="threePt" dir="t"/>
+    </dgm:scene3d>
+    <dgm:sp3d/>
+    <dgm:txPr/>
+    <dgm:style>
+      <a:lnRef idx="2">
+        <a:scrgbClr r="0" g="0" b="0"/>
+      </a:lnRef>
+      <a:fillRef idx="1">
+        <a:scrgbClr r="0" g="0" b="0"/>
+      </a:fillRef>
+      <a:effectRef idx="0">
+        <a:scrgbClr r="0" g="0" b="0"/>
+      </a:effectRef>
+      <a:fontRef idx="minor">
+        <a:schemeClr val="lt1"/>
+      </a:fontRef>
+    </dgm:style>
+  </dgm:styleLbl>
+  <dgm:styleLbl name="lnNode1">
+    <dgm:scene3d>
+      <a:camera prst="orthographicFront"/>
+      <a:lightRig rig="threePt" dir="t"/>
+    </dgm:scene3d>
+    <dgm:sp3d/>
+    <dgm:txPr/>
+    <dgm:style>
+      <a:lnRef idx="2">
+        <a:scrgbClr r="0" g="0" b="0"/>
+      </a:lnRef>
+      <a:fillRef idx="1">
+        <a:scrgbClr r="0" g="0" b="0"/>
+      </a:fillRef>
+      <a:effectRef idx="0">
+        <a:scrgbClr r="0" g="0" b="0"/>
+      </a:effectRef>
+      <a:fontRef idx="minor">
+        <a:schemeClr val="lt1"/>
+      </a:fontRef>
+    </dgm:style>
+  </dgm:styleLbl>
+  <dgm:styleLbl name="vennNode1">
+    <dgm:scene3d>
+      <a:camera prst="orthographicFront"/>
+      <a:lightRig rig="threePt" dir="t"/>
+    </dgm:scene3d>
+    <dgm:sp3d/>
+    <dgm:txPr/>
+    <dgm:style>
+      <a:lnRef idx="2">
+        <a:scrgbClr r="0" g="0" b="0"/>
+      </a:lnRef>
+      <a:fillRef idx="1">
+        <a:scrgbClr r="0" g="0" b="0"/>
+      </a:fillRef>
+      <a:effectRef idx="0">
+        <a:scrgbClr r="0" g="0" b="0"/>
+      </a:effectRef>
+      <a:fontRef idx="minor">
+        <a:schemeClr val="tx1"/>
+      </a:fontRef>
+    </dgm:style>
+  </dgm:styleLbl>
+  <dgm:styleLbl name="alignNode1">
+    <dgm:scene3d>
+      <a:camera prst="orthographicFront"/>
+      <a:lightRig rig="threePt" dir="t"/>
+    </dgm:scene3d>
+    <dgm:sp3d/>
+    <dgm:txPr/>
+    <dgm:style>
+      <a:lnRef idx="2">
+        <a:scrgbClr r="0" g="0" b="0"/>
+      </a:lnRef>
+      <a:fillRef idx="1">
+        <a:scrgbClr r="0" g="0" b="0"/>
+      </a:fillRef>
+      <a:effectRef idx="0">
+        <a:scrgbClr r="0" g="0" b="0"/>
+      </a:effectRef>
+      <a:fontRef idx="minor">
+        <a:schemeClr val="lt1"/>
+      </a:fontRef>
+    </dgm:style>
+  </dgm:styleLbl>
+  <dgm:styleLbl name="node1">
+    <dgm:scene3d>
+      <a:camera prst="orthographicFront"/>
+      <a:lightRig rig="threePt" dir="t"/>
+    </dgm:scene3d>
+    <dgm:sp3d/>
+    <dgm:txPr/>
+    <dgm:style>
+      <a:lnRef idx="2">
+        <a:scrgbClr r="0" g="0" b="0"/>
+      </a:lnRef>
+      <a:fillRef idx="1">
+        <a:scrgbClr r="0" g="0" b="0"/>
+      </a:fillRef>
+      <a:effectRef idx="0">
+        <a:scrgbClr r="0" g="0" b="0"/>
+      </a:effectRef>
+      <a:fontRef idx="minor">
+        <a:schemeClr val="lt1"/>
+      </a:fontRef>
+    </dgm:style>
+  </dgm:styleLbl>
+  <dgm:styleLbl name="node2">
+    <dgm:scene3d>
+      <a:camera prst="orthographicFront"/>
+      <a:lightRig rig="threePt" dir="t"/>
+    </dgm:scene3d>
+    <dgm:sp3d/>
+    <dgm:txPr/>
+    <dgm:style>
+      <a:lnRef idx="2">
+        <a:scrgbClr r="0" g="0" b="0"/>
+      </a:lnRef>
+      <a:fillRef idx="1">
+        <a:scrgbClr r="0" g="0" b="0"/>
+      </a:fillRef>
+      <a:effectRef idx="0">
+        <a:scrgbClr r="0" g="0" b="0"/>
+      </a:effectRef>
+      <a:fontRef idx="minor">
+        <a:schemeClr val="lt1"/>
+      </a:fontRef>
+    </dgm:style>
+  </dgm:styleLbl>
+  <dgm:styleLbl name="node3">
+    <dgm:scene3d>
+      <a:camera prst="orthographicFront"/>
+      <a:lightRig rig="threePt" dir="t"/>
+    </dgm:scene3d>
+    <dgm:sp3d/>
+    <dgm:txPr/>
+    <dgm:style>
+      <a:lnRef idx="2">
+        <a:scrgbClr r="0" g="0" b="0"/>
+      </a:lnRef>
+      <a:fillRef idx="1">
+        <a:scrgbClr r="0" g="0" b="0"/>
+      </a:fillRef>
+      <a:effectRef idx="0">
+        <a:scrgbClr r="0" g="0" b="0"/>
+      </a:effectRef>
+      <a:fontRef idx="minor">
+        <a:schemeClr val="lt1"/>
+      </a:fontRef>
+    </dgm:style>
+  </dgm:styleLbl>
+  <dgm:styleLbl name="node4">
+    <dgm:scene3d>
+      <a:camera prst="orthographicFront"/>
+      <a:lightRig rig="threePt" dir="t"/>
+    </dgm:scene3d>
+    <dgm:sp3d/>
+    <dgm:txPr/>
+    <dgm:style>
+      <a:lnRef idx="2">
+        <a:scrgbClr r="0" g="0" b="0"/>
+      </a:lnRef>
+      <a:fillRef idx="1">
+        <a:scrgbClr r="0" g="0" b="0"/>
+      </a:fillRef>
+      <a:effectRef idx="0">
+        <a:scrgbClr r="0" g="0" b="0"/>
+      </a:effectRef>
+      <a:fontRef idx="minor">
+        <a:schemeClr val="lt1"/>
+      </a:fontRef>
+    </dgm:style>
+  </dgm:styleLbl>
+  <dgm:styleLbl name="fgImgPlace1">
+    <dgm:scene3d>
+      <a:camera prst="orthographicFront"/>
+      <a:lightRig rig="threePt" dir="t"/>
+    </dgm:scene3d>
+    <dgm:sp3d/>
+    <dgm:txPr/>
+    <dgm:style>
+      <a:lnRef idx="2">
+        <a:scrgbClr r="0" g="0" b="0"/>
+      </a:lnRef>
+      <a:fillRef idx="1">
+        <a:scrgbClr r="0" g="0" b="0"/>
+      </a:fillRef>
+      <a:effectRef idx="0">
+        <a:scrgbClr r="0" g="0" b="0"/>
+      </a:effectRef>
+      <a:fontRef idx="minor"/>
+    </dgm:style>
+  </dgm:styleLbl>
+  <dgm:styleLbl name="alignImgPlace1">
+    <dgm:scene3d>
+      <a:camera prst="orthographicFront"/>
+      <a:lightRig rig="threePt" dir="t"/>
+    </dgm:scene3d>
+    <dgm:sp3d/>
+    <dgm:txPr/>
+    <dgm:style>
+      <a:lnRef idx="2">
+        <a:scrgbClr r="0" g="0" b="0"/>
+      </a:lnRef>
+      <a:fillRef idx="1">
+        <a:scrgbClr r="0" g="0" b="0"/>
+      </a:fillRef>
+      <a:effectRef idx="0">
+        <a:scrgbClr r="0" g="0" b="0"/>
+      </a:effectRef>
+      <a:fontRef idx="minor"/>
+    </dgm:style>
+  </dgm:styleLbl>
+  <dgm:styleLbl name="bgImgPlace1">
+    <dgm:scene3d>
+      <a:camera prst="orthographicFront"/>
+      <a:lightRig rig="threePt" dir="t"/>
+    </dgm:scene3d>
+    <dgm:sp3d/>
+    <dgm:txPr/>
+    <dgm:style>
+      <a:lnRef idx="2">
+        <a:scrgbClr r="0" g="0" b="0"/>
+      </a:lnRef>
+      <a:fillRef idx="1">
+        <a:scrgbClr r="0" g="0" b="0"/>
+      </a:fillRef>
+      <a:effectRef idx="0">
+        <a:scrgbClr r="0" g="0" b="0"/>
+      </a:effectRef>
+      <a:fontRef idx="minor"/>
+    </dgm:style>
+  </dgm:styleLbl>
+  <dgm:styleLbl name="sibTrans2D1">
+    <dgm:scene3d>
+      <a:camera prst="orthographicFront"/>
+      <a:lightRig rig="threePt" dir="t"/>
+    </dgm:scene3d>
+    <dgm:sp3d/>
+    <dgm:txPr/>
+    <dgm:style>
+      <a:lnRef idx="0">
+        <a:scrgbClr r="0" g="0" b="0"/>
+      </a:lnRef>
+      <a:fillRef idx="1">
+        <a:scrgbClr r="0" g="0" b="0"/>
+      </a:fillRef>
+      <a:effectRef idx="0">
+        <a:scrgbClr r="0" g="0" b="0"/>
+      </a:effectRef>
+      <a:fontRef idx="minor">
+        <a:schemeClr val="lt1"/>
+      </a:fontRef>
+    </dgm:style>
+  </dgm:styleLbl>
+  <dgm:styleLbl name="fgSibTrans2D1">
+    <dgm:scene3d>
+      <a:camera prst="orthographicFront"/>
+      <a:lightRig rig="threePt" dir="t"/>
+    </dgm:scene3d>
+    <dgm:sp3d/>
+    <dgm:txPr/>
+    <dgm:style>
+      <a:lnRef idx="0">
+        <a:scrgbClr r="0" g="0" b="0"/>
+      </a:lnRef>
+      <a:fillRef idx="1">
+        <a:scrgbClr r="0" g="0" b="0"/>
+      </a:fillRef>
+      <a:effectRef idx="0">
+        <a:scrgbClr r="0" g="0" b="0"/>
+      </a:effectRef>
+      <a:fontRef idx="minor">
+        <a:schemeClr val="lt1"/>
+      </a:fontRef>
+    </dgm:style>
+  </dgm:styleLbl>
+  <dgm:styleLbl name="bgSibTrans2D1">
+    <dgm:scene3d>
+      <a:camera prst="orthographicFront"/>
+      <a:lightRig rig="threePt" dir="t"/>
+    </dgm:scene3d>
+    <dgm:sp3d/>
+    <dgm:txPr/>
+    <dgm:style>
+      <a:lnRef idx="0">
+        <a:scrgbClr r="0" g="0" b="0"/>
+      </a:lnRef>
+      <a:fillRef idx="1">
+        <a:scrgbClr r="0" g="0" b="0"/>
+      </a:fillRef>
+      <a:effectRef idx="0">
+        <a:scrgbClr r="0" g="0" b="0"/>
+      </a:effectRef>
+      <a:fontRef idx="minor">
+        <a:schemeClr val="lt1"/>
+      </a:fontRef>
+    </dgm:style>
+  </dgm:styleLbl>
+  <dgm:styleLbl name="sibTrans1D1">
+    <dgm:scene3d>
+      <a:camera prst="orthographicFront"/>
+      <a:lightRig rig="threePt" dir="t"/>
+    </dgm:scene3d>
+    <dgm:sp3d/>
+    <dgm:txPr/>
+    <dgm:style>
+      <a:lnRef idx="1">
+        <a:scrgbClr r="0" g="0" b="0"/>
+      </a:lnRef>
+      <a:fillRef idx="0">
+        <a:scrgbClr r="0" g="0" b="0"/>
+      </a:fillRef>
+      <a:effectRef idx="0">
+        <a:scrgbClr r="0" g="0" b="0"/>
+      </a:effectRef>
+      <a:fontRef idx="minor"/>
+    </dgm:style>
+  </dgm:styleLbl>
+  <dgm:styleLbl name="callout">
+    <dgm:scene3d>
+      <a:camera prst="orthographicFront"/>
+      <a:lightRig rig="threePt" dir="t"/>
+    </dgm:scene3d>
+    <dgm:sp3d/>
+    <dgm:txPr/>
+    <dgm:style>
+      <a:lnRef idx="2">
+        <a:scrgbClr r="0" g="0" b="0"/>
+      </a:lnRef>
+      <a:fillRef idx="1">
+        <a:scrgbClr r="0" g="0" b="0"/>
+      </a:fillRef>
+      <a:effectRef idx="0">
+        <a:scrgbClr r="0" g="0" b="0"/>
+      </a:effectRef>
+      <a:fontRef idx="minor"/>
+    </dgm:style>
+  </dgm:styleLbl>
+  <dgm:styleLbl name="asst0">
+    <dgm:scene3d>
+      <a:camera prst="orthographicFront"/>
+      <a:lightRig rig="threePt" dir="t"/>
+    </dgm:scene3d>
+    <dgm:sp3d/>
+    <dgm:txPr/>
+    <dgm:style>
+      <a:lnRef idx="2">
+        <a:scrgbClr r="0" g="0" b="0"/>
+      </a:lnRef>
+      <a:fillRef idx="1">
+        <a:scrgbClr r="0" g="0" b="0"/>
+      </a:fillRef>
+      <a:effectRef idx="0">
+        <a:scrgbClr r="0" g="0" b="0"/>
+      </a:effectRef>
+      <a:fontRef idx="minor">
+        <a:schemeClr val="lt1"/>
+      </a:fontRef>
+    </dgm:style>
+  </dgm:styleLbl>
+  <dgm:styleLbl name="asst1">
+    <dgm:scene3d>
+      <a:camera prst="orthographicFront"/>
+      <a:lightRig rig="threePt" dir="t"/>
+    </dgm:scene3d>
+    <dgm:sp3d/>
+    <dgm:txPr/>
+    <dgm:style>
+      <a:lnRef idx="2">
+        <a:scrgbClr r="0" g="0" b="0"/>
+      </a:lnRef>
+      <a:fillRef idx="1">
+        <a:scrgbClr r="0" g="0" b="0"/>
+      </a:fillRef>
+      <a:effectRef idx="0">
+        <a:scrgbClr r="0" g="0" b="0"/>
+      </a:effectRef>
+      <a:fontRef idx="minor">
+        <a:schemeClr val="lt1"/>
+      </a:fontRef>
+    </dgm:style>
+  </dgm:styleLbl>
+  <dgm:styleLbl name="asst2">
+    <dgm:scene3d>
+      <a:camera prst="orthographicFront"/>
+      <a:lightRig rig="threePt" dir="t"/>
+    </dgm:scene3d>
+    <dgm:sp3d/>
+    <dgm:txPr/>
+    <dgm:style>
+      <a:lnRef idx="2">
+        <a:scrgbClr r="0" g="0" b="0"/>
+      </a:lnRef>
+      <a:fillRef idx="1">
+        <a:scrgbClr r="0" g="0" b="0"/>
+      </a:fillRef>
+      <a:effectRef idx="0">
+        <a:scrgbClr r="0" g="0" b="0"/>
+      </a:effectRef>
+      <a:fontRef idx="minor">
+        <a:schemeClr val="lt1"/>
+      </a:fontRef>
+    </dgm:style>
+  </dgm:styleLbl>
+  <dgm:styleLbl name="asst3">
+    <dgm:scene3d>
+      <a:camera prst="orthographicFront"/>
+      <a:lightRig rig="threePt" dir="t"/>
+    </dgm:scene3d>
+    <dgm:sp3d/>
+    <dgm:txPr/>
+    <dgm:style>
+      <a:lnRef idx="2">
+        <a:scrgbClr r="0" g="0" b="0"/>
+      </a:lnRef>
+      <a:fillRef idx="1">
+        <a:scrgbClr r="0" g="0" b="0"/>
+      </a:fillRef>
+      <a:effectRef idx="0">
+        <a:scrgbClr r="0" g="0" b="0"/>
+      </a:effectRef>
+      <a:fontRef idx="minor">
+        <a:schemeClr val="lt1"/>
+      </a:fontRef>
+    </dgm:style>
+  </dgm:styleLbl>
+  <dgm:styleLbl name="asst4">
+    <dgm:scene3d>
+      <a:camera prst="orthographicFront"/>
+      <a:lightRig rig="threePt" dir="t"/>
+    </dgm:scene3d>
+    <dgm:sp3d/>
+    <dgm:txPr/>
+    <dgm:style>
+      <a:lnRef idx="2">
+        <a:scrgbClr r="0" g="0" b="0"/>
+      </a:lnRef>
+      <a:fillRef idx="1">
+        <a:scrgbClr r="0" g="0" b="0"/>
+      </a:fillRef>
+      <a:effectRef idx="0">
+        <a:scrgbClr r="0" g="0" b="0"/>
+      </a:effectRef>
+      <a:fontRef idx="minor">
+        <a:schemeClr val="lt1"/>
+      </a:fontRef>
+    </dgm:style>
+  </dgm:styleLbl>
+  <dgm:styleLbl name="parChTrans2D1">
+    <dgm:scene3d>
+      <a:camera prst="orthographicFront"/>
+      <a:lightRig rig="threePt" dir="t"/>
+    </dgm:scene3d>
+    <dgm:sp3d/>
+    <dgm:txPr/>
+    <dgm:style>
+      <a:lnRef idx="2">
+        <a:scrgbClr r="0" g="0" b="0"/>
+      </a:lnRef>
+      <a:fillRef idx="1">
+        <a:scrgbClr r="0" g="0" b="0"/>
+      </a:fillRef>
+      <a:effectRef idx="0">
+        <a:scrgbClr r="0" g="0" b="0"/>
+      </a:effectRef>
+      <a:fontRef idx="minor">
+        <a:schemeClr val="lt1"/>
+      </a:fontRef>
+    </dgm:style>
+  </dgm:styleLbl>
+  <dgm:styleLbl name="parChTrans2D2">
+    <dgm:scene3d>
+      <a:camera prst="orthographicFront"/>
+      <a:lightRig rig="threePt" dir="t"/>
+    </dgm:scene3d>
+    <dgm:sp3d/>
+    <dgm:txPr/>
+    <dgm:style>
+      <a:lnRef idx="2">
+        <a:scrgbClr r="0" g="0" b="0"/>
+      </a:lnRef>
+      <a:fillRef idx="1">
+        <a:scrgbClr r="0" g="0" b="0"/>
+      </a:fillRef>
+      <a:effectRef idx="0">
+        <a:scrgbClr r="0" g="0" b="0"/>
+      </a:effectRef>
+      <a:fontRef idx="minor">
+        <a:schemeClr val="lt1"/>
+      </a:fontRef>
+    </dgm:style>
+  </dgm:styleLbl>
+  <dgm:styleLbl name="parChTrans2D3">
+    <dgm:scene3d>
+      <a:camera prst="orthographicFront"/>
+      <a:lightRig rig="threePt" dir="t"/>
+    </dgm:scene3d>
+    <dgm:sp3d/>
+    <dgm:txPr/>
+    <dgm:style>
+      <a:lnRef idx="2">
+        <a:scrgbClr r="0" g="0" b="0"/>
+      </a:lnRef>
+      <a:fillRef idx="1">
+        <a:scrgbClr r="0" g="0" b="0"/>
+      </a:fillRef>
+      <a:effectRef idx="0">
+        <a:scrgbClr r="0" g="0" b="0"/>
+      </a:effectRef>
+      <a:fontRef idx="minor">
+        <a:schemeClr val="lt1"/>
+      </a:fontRef>
+    </dgm:style>
+  </dgm:styleLbl>
+  <dgm:styleLbl name="parChTrans2D4">
+    <dgm:scene3d>
+      <a:camera prst="orthographicFront"/>
+      <a:lightRig rig="threePt" dir="t"/>
+    </dgm:scene3d>
+    <dgm:sp3d/>
+    <dgm:txPr/>
+    <dgm:style>
+      <a:lnRef idx="2">
+        <a:scrgbClr r="0" g="0" b="0"/>
+      </a:lnRef>
+      <a:fillRef idx="1">
+        <a:scrgbClr r="0" g="0" b="0"/>
+      </a:fillRef>
+      <a:effectRef idx="0">
+        <a:scrgbClr r="0" g="0" b="0"/>
+      </a:effectRef>
+      <a:fontRef idx="minor">
+        <a:schemeClr val="lt1"/>
+      </a:fontRef>
+    </dgm:style>
+  </dgm:styleLbl>
+  <dgm:styleLbl name="parChTrans1D1">
+    <dgm:scene3d>
+      <a:camera prst="orthographicFront"/>
+      <a:lightRig rig="threePt" dir="t"/>
+    </dgm:scene3d>
+    <dgm:sp3d/>
+    <dgm:txPr/>
+    <dgm:style>
+      <a:lnRef idx="2">
+        <a:scrgbClr r="0" g="0" b="0"/>
+      </a:lnRef>
+      <a:fillRef idx="0">
+        <a:scrgbClr r="0" g="0" b="0"/>
+      </a:fillRef>
+      <a:effectRef idx="0">
+        <a:scrgbClr r="0" g="0" b="0"/>
+      </a:effectRef>
+      <a:fontRef idx="minor"/>
+    </dgm:style>
+  </dgm:styleLbl>
+  <dgm:styleLbl name="parChTrans1D2">
+    <dgm:scene3d>
+      <a:camera prst="orthographicFront"/>
+      <a:lightRig rig="threePt" dir="t"/>
+    </dgm:scene3d>
+    <dgm:sp3d/>
+    <dgm:txPr/>
+    <dgm:style>
+      <a:lnRef idx="2">
+        <a:scrgbClr r="0" g="0" b="0"/>
+      </a:lnRef>
+      <a:fillRef idx="0">
+        <a:scrgbClr r="0" g="0" b="0"/>
+      </a:fillRef>
+      <a:effectRef idx="0">
+        <a:scrgbClr r="0" g="0" b="0"/>
+      </a:effectRef>
+      <a:fontRef idx="minor"/>
+    </dgm:style>
+  </dgm:styleLbl>
+  <dgm:styleLbl name="parChTrans1D3">
+    <dgm:scene3d>
+      <a:camera prst="orthographicFront"/>
+      <a:lightRig rig="threePt" dir="t"/>
+    </dgm:scene3d>
+    <dgm:sp3d/>
+    <dgm:txPr/>
+    <dgm:style>
+      <a:lnRef idx="2">
+        <a:scrgbClr r="0" g="0" b="0"/>
+      </a:lnRef>
+      <a:fillRef idx="0">
+        <a:scrgbClr r="0" g="0" b="0"/>
+      </a:fillRef>
+      <a:effectRef idx="0">
+        <a:scrgbClr r="0" g="0" b="0"/>
+      </a:effectRef>
+      <a:fontRef idx="minor"/>
+    </dgm:style>
+  </dgm:styleLbl>
+  <dgm:styleLbl name="parChTrans1D4">
+    <dgm:scene3d>
+      <a:camera prst="orthographicFront"/>
+      <a:lightRig rig="threePt" dir="t"/>
+    </dgm:scene3d>
+    <dgm:sp3d/>
+    <dgm:txPr/>
+    <dgm:style>
+      <a:lnRef idx="2">
+        <a:scrgbClr r="0" g="0" b="0"/>
+      </a:lnRef>
+      <a:fillRef idx="0">
+        <a:scrgbClr r="0" g="0" b="0"/>
+      </a:fillRef>
+      <a:effectRef idx="0">
+        <a:scrgbClr r="0" g="0" b="0"/>
+      </a:effectRef>
+      <a:fontRef idx="minor"/>
+    </dgm:style>
+  </dgm:styleLbl>
+  <dgm:styleLbl name="fgAcc1">
+    <dgm:scene3d>
+      <a:camera prst="orthographicFront"/>
+      <a:lightRig rig="threePt" dir="t"/>
+    </dgm:scene3d>
+    <dgm:sp3d/>
+    <dgm:txPr/>
+    <dgm:style>
+      <a:lnRef idx="2">
+        <a:scrgbClr r="0" g="0" b="0"/>
+      </a:lnRef>
+      <a:fillRef idx="1">
+        <a:scrgbClr r="0" g="0" b="0"/>
+      </a:fillRef>
+      <a:effectRef idx="0">
+        <a:scrgbClr r="0" g="0" b="0"/>
+      </a:effectRef>
+      <a:fontRef idx="minor"/>
+    </dgm:style>
+  </dgm:styleLbl>
+  <dgm:styleLbl name="conFgAcc1">
+    <dgm:scene3d>
+      <a:camera prst="orthographicFront"/>
+      <a:lightRig rig="threePt" dir="t"/>
+    </dgm:scene3d>
+    <dgm:sp3d/>
+    <dgm:txPr/>
+    <dgm:style>
+      <a:lnRef idx="2">
+        <a:scrgbClr r="0" g="0" b="0"/>
+      </a:lnRef>
+      <a:fillRef idx="1">
+        <a:scrgbClr r="0" g="0" b="0"/>
+      </a:fillRef>
+      <a:effectRef idx="0">
+        <a:scrgbClr r="0" g="0" b="0"/>
+      </a:effectRef>
+      <a:fontRef idx="minor"/>
+    </dgm:style>
+  </dgm:styleLbl>
+  <dgm:styleLbl name="alignAcc1">
+    <dgm:scene3d>
+      <a:camera prst="orthographicFront"/>
+      <a:lightRig rig="threePt" dir="t"/>
+    </dgm:scene3d>
+    <dgm:sp3d/>
+    <dgm:txPr/>
+    <dgm:style>
+      <a:lnRef idx="2">
+        <a:scrgbClr r="0" g="0" b="0"/>
+      </a:lnRef>
+      <a:fillRef idx="1">
+        <a:scrgbClr r="0" g="0" b="0"/>
+      </a:fillRef>
+      <a:effectRef idx="0">
+        <a:scrgbClr r="0" g="0" b="0"/>
+      </a:effectRef>
+      <a:fontRef idx="minor"/>
+    </dgm:style>
+  </dgm:styleLbl>
+  <dgm:styleLbl name="trAlignAcc1">
+    <dgm:scene3d>
+      <a:camera prst="orthographicFront"/>
+      <a:lightRig rig="threePt" dir="t"/>
+    </dgm:scene3d>
+    <dgm:sp3d/>
+    <dgm:txPr/>
+    <dgm:style>
+      <a:lnRef idx="1">
+        <a:scrgbClr r="0" g="0" b="0"/>
+      </a:lnRef>
+      <a:fillRef idx="1">
+        <a:scrgbClr r="0" g="0" b="0"/>
+      </a:fillRef>
+      <a:effectRef idx="0">
+        <a:scrgbClr r="0" g="0" b="0"/>
+      </a:effectRef>
+      <a:fontRef idx="minor"/>
+    </dgm:style>
+  </dgm:styleLbl>
+  <dgm:styleLbl name="bgAcc1">
+    <dgm:scene3d>
+      <a:camera prst="orthographicFront"/>
+      <a:lightRig rig="threePt" dir="t"/>
+    </dgm:scene3d>
+    <dgm:sp3d/>
+    <dgm:txPr/>
+    <dgm:style>
+      <a:lnRef idx="2">
+        <a:scrgbClr r="0" g="0" b="0"/>
+      </a:lnRef>
+      <a:fillRef idx="1">
+        <a:scrgbClr r="0" g="0" b="0"/>
+      </a:fillRef>
+      <a:effectRef idx="0">
+        <a:scrgbClr r="0" g="0" b="0"/>
+      </a:effectRef>
+      <a:fontRef idx="minor"/>
+    </dgm:style>
+  </dgm:styleLbl>
+  <dgm:styleLbl name="solidFgAcc1">
+    <dgm:scene3d>
+      <a:camera prst="orthographicFront"/>
+      <a:lightRig rig="threePt" dir="t"/>
+    </dgm:scene3d>
+    <dgm:sp3d/>
+    <dgm:txPr/>
+    <dgm:style>
+      <a:lnRef idx="2">
+        <a:scrgbClr r="0" g="0" b="0"/>
+      </a:lnRef>
+      <a:fillRef idx="1">
+        <a:scrgbClr r="0" g="0" b="0"/>
+      </a:fillRef>
+      <a:effectRef idx="0">
+        <a:scrgbClr r="0" g="0" b="0"/>
+      </a:effectRef>
+      <a:fontRef idx="minor"/>
+    </dgm:style>
+  </dgm:styleLbl>
+  <dgm:styleLbl name="solidAlignAcc1">
+    <dgm:scene3d>
+      <a:camera prst="orthographicFront"/>
+      <a:lightRig rig="threePt" dir="t"/>
+    </dgm:scene3d>
+    <dgm:sp3d/>
+    <dgm:txPr/>
+    <dgm:style>
+      <a:lnRef idx="2">
+        <a:scrgbClr r="0" g="0" b="0"/>
+      </a:lnRef>
+      <a:fillRef idx="1">
+        <a:scrgbClr r="0" g="0" b="0"/>
+      </a:fillRef>
+      <a:effectRef idx="0">
+        <a:scrgbClr r="0" g="0" b="0"/>
+      </a:effectRef>
+      <a:fontRef idx="minor"/>
+    </dgm:style>
+  </dgm:styleLbl>
+  <dgm:styleLbl name="solidBgAcc1">
+    <dgm:scene3d>
+      <a:camera prst="orthographicFront"/>
+      <a:lightRig rig="threePt" dir="t"/>
+    </dgm:scene3d>
+    <dgm:sp3d/>
+    <dgm:txPr/>
+    <dgm:style>
+      <a:lnRef idx="2">
+        <a:scrgbClr r="0" g="0" b="0"/>
+      </a:lnRef>
+      <a:fillRef idx="1">
+        <a:scrgbClr r="0" g="0" b="0"/>
+      </a:fillRef>
+      <a:effectRef idx="0">
+        <a:scrgbClr r="0" g="0" b="0"/>
+      </a:effectRef>
+      <a:fontRef idx="minor"/>
+    </dgm:style>
+  </dgm:styleLbl>
+  <dgm:styleLbl name="fgAccFollowNode1">
+    <dgm:scene3d>
+      <a:camera prst="orthographicFront"/>
+      <a:lightRig rig="threePt" dir="t"/>
+    </dgm:scene3d>
+    <dgm:sp3d/>
+    <dgm:txPr/>
+    <dgm:style>
+      <a:lnRef idx="2">
+        <a:scrgbClr r="0" g="0" b="0"/>
+      </a:lnRef>
+      <a:fillRef idx="1">
+        <a:scrgbClr r="0" g="0" b="0"/>
+      </a:fillRef>
+      <a:effectRef idx="0">
+        <a:scrgbClr r="0" g="0" b="0"/>
+      </a:effectRef>
+      <a:fontRef idx="minor"/>
+    </dgm:style>
+  </dgm:styleLbl>
+  <dgm:styleLbl name="alignAccFollowNode1">
+    <dgm:scene3d>
+      <a:camera prst="orthographicFront"/>
+      <a:lightRig rig="threePt" dir="t"/>
+    </dgm:scene3d>
+    <dgm:sp3d/>
+    <dgm:txPr/>
+    <dgm:style>
+      <a:lnRef idx="2">
+        <a:scrgbClr r="0" g="0" b="0"/>
+      </a:lnRef>
+      <a:fillRef idx="1">
+        <a:scrgbClr r="0" g="0" b="0"/>
+      </a:fillRef>
+      <a:effectRef idx="0">
+        <a:scrgbClr r="0" g="0" b="0"/>
+      </a:effectRef>
+      <a:fontRef idx="minor"/>
+    </dgm:style>
+  </dgm:styleLbl>
+  <dgm:styleLbl name="bgAccFollowNode1">
+    <dgm:scene3d>
+      <a:camera prst="orthographicFront"/>
+      <a:lightRig rig="threePt" dir="t"/>
+    </dgm:scene3d>
+    <dgm:sp3d/>
+    <dgm:txPr/>
+    <dgm:style>
+      <a:lnRef idx="2">
+        <a:scrgbClr r="0" g="0" b="0"/>
+      </a:lnRef>
+      <a:fillRef idx="1">
+        <a:scrgbClr r="0" g="0" b="0"/>
+      </a:fillRef>
+      <a:effectRef idx="0">
+        <a:scrgbClr r="0" g="0" b="0"/>
+      </a:effectRef>
+      <a:fontRef idx="minor"/>
+    </dgm:style>
+  </dgm:styleLbl>
+  <dgm:styleLbl name="fgAcc0">
+    <dgm:scene3d>
+      <a:camera prst="orthographicFront"/>
+      <a:lightRig rig="threePt" dir="t"/>
+    </dgm:scene3d>
+    <dgm:sp3d/>
+    <dgm:txPr/>
+    <dgm:style>
+      <a:lnRef idx="2">
+        <a:scrgbClr r="0" g="0" b="0"/>
+      </a:lnRef>
+      <a:fillRef idx="1">
+        <a:scrgbClr r="0" g="0" b="0"/>
+      </a:fillRef>
+      <a:effectRef idx="0">
+        <a:scrgbClr r="0" g="0" b="0"/>
+      </a:effectRef>
+      <a:fontRef idx="minor"/>
+    </dgm:style>
+  </dgm:styleLbl>
+  <dgm:styleLbl name="fgAcc2">
+    <dgm:scene3d>
+      <a:camera prst="orthographicFront"/>
+      <a:lightRig rig="threePt" dir="t"/>
+    </dgm:scene3d>
+    <dgm:sp3d/>
+    <dgm:txPr/>
+    <dgm:style>
+      <a:lnRef idx="2">
+        <a:scrgbClr r="0" g="0" b="0"/>
+      </a:lnRef>
+      <a:fillRef idx="1">
+        <a:scrgbClr r="0" g="0" b="0"/>
+      </a:fillRef>
+      <a:effectRef idx="0">
+        <a:scrgbClr r="0" g="0" b="0"/>
+      </a:effectRef>
+      <a:fontRef idx="minor"/>
+    </dgm:style>
+  </dgm:styleLbl>
+  <dgm:styleLbl name="fgAcc3">
+    <dgm:scene3d>
+      <a:camera prst="orthographicFront"/>
+      <a:lightRig rig="threePt" dir="t"/>
+    </dgm:scene3d>
+    <dgm:sp3d/>
+    <dgm:txPr/>
+    <dgm:style>
+      <a:lnRef idx="2">
+        <a:scrgbClr r="0" g="0" b="0"/>
+      </a:lnRef>
+      <a:fillRef idx="1">
+        <a:scrgbClr r="0" g="0" b="0"/>
+      </a:fillRef>
+      <a:effectRef idx="0">
+        <a:scrgbClr r="0" g="0" b="0"/>
+      </a:effectRef>
+      <a:fontRef idx="minor"/>
+    </dgm:style>
+  </dgm:styleLbl>
+  <dgm:styleLbl name="fgAcc4">
+    <dgm:scene3d>
+      <a:camera prst="orthographicFront"/>
+      <a:lightRig rig="threePt" dir="t"/>
+    </dgm:scene3d>
+    <dgm:sp3d/>
+    <dgm:txPr/>
+    <dgm:style>
+      <a:lnRef idx="2">
+        <a:scrgbClr r="0" g="0" b="0"/>
+      </a:lnRef>
+      <a:fillRef idx="1">
+        <a:scrgbClr r="0" g="0" b="0"/>
+      </a:fillRef>
+      <a:effectRef idx="0">
+        <a:scrgbClr r="0" g="0" b="0"/>
+      </a:effectRef>
+      <a:fontRef idx="minor"/>
+    </dgm:style>
+  </dgm:styleLbl>
+  <dgm:styleLbl name="bgShp">
+    <dgm:scene3d>
+      <a:camera prst="orthographicFront"/>
+      <a:lightRig rig="threePt" dir="t"/>
+    </dgm:scene3d>
+    <dgm:sp3d/>
+    <dgm:txPr/>
+    <dgm:style>
+      <a:lnRef idx="0">
+        <a:scrgbClr r="0" g="0" b="0"/>
+      </a:lnRef>
+      <a:fillRef idx="1">
+        <a:scrgbClr r="0" g="0" b="0"/>
+      </a:fillRef>
+      <a:effectRef idx="0">
+        <a:scrgbClr r="0" g="0" b="0"/>
+      </a:effectRef>
+      <a:fontRef idx="minor"/>
+    </dgm:style>
+  </dgm:styleLbl>
+  <dgm:styleLbl name="dkBgShp">
+    <dgm:scene3d>
+      <a:camera prst="orthographicFront"/>
+      <a:lightRig rig="threePt" dir="t"/>
+    </dgm:scene3d>
+    <dgm:sp3d/>
+    <dgm:txPr/>
+    <dgm:style>
+      <a:lnRef idx="0">
+        <a:scrgbClr r="0" g="0" b="0"/>
+      </a:lnRef>
+      <a:fillRef idx="1">
+        <a:scrgbClr r="0" g="0" b="0"/>
+      </a:fillRef>
+      <a:effectRef idx="0">
+        <a:scrgbClr r="0" g="0" b="0"/>
+      </a:effectRef>
+      <a:fontRef idx="minor"/>
+    </dgm:style>
+  </dgm:styleLbl>
+  <dgm:styleLbl name="trBgShp">
+    <dgm:scene3d>
+      <a:camera prst="orthographicFront"/>
+      <a:lightRig rig="threePt" dir="t"/>
+    </dgm:scene3d>
+    <dgm:sp3d/>
+    <dgm:txPr/>
+    <dgm:style>
+      <a:lnRef idx="0">
+        <a:scrgbClr r="0" g="0" b="0"/>
+      </a:lnRef>
+      <a:fillRef idx="1">
+        <a:scrgbClr r="0" g="0" b="0"/>
+      </a:fillRef>
+      <a:effectRef idx="0">
+        <a:scrgbClr r="0" g="0" b="0"/>
+      </a:effectRef>
+      <a:fontRef idx="minor"/>
+    </dgm:style>
+  </dgm:styleLbl>
+  <dgm:styleLbl name="fgShp">
+    <dgm:scene3d>
+      <a:camera prst="orthographicFront"/>
+      <a:lightRig rig="threePt" dir="t"/>
+    </dgm:scene3d>
+    <dgm:sp3d/>
+    <dgm:txPr/>
+    <dgm:style>
+      <a:lnRef idx="2">
+        <a:scrgbClr r="0" g="0" b="0"/>
+      </a:lnRef>
+      <a:fillRef idx="1">
+        <a:scrgbClr r="0" g="0" b="0"/>
+      </a:fillRef>
+      <a:effectRef idx="0">
+        <a:scrgbClr r="0" g="0" b="0"/>
+      </a:effectRef>
+      <a:fontRef idx="minor"/>
+    </dgm:style>
+  </dgm:styleLbl>
+  <dgm:styleLbl name="revTx">
+    <dgm:scene3d>
+      <a:camera prst="orthographicFront"/>
+      <a:lightRig rig="threePt" dir="t"/>
+    </dgm:scene3d>
+    <dgm:sp3d/>
+    <dgm:txPr/>
+    <dgm:style>
+      <a:lnRef idx="0">
+        <a:scrgbClr r="0" g="0" b="0"/>
+      </a:lnRef>
+      <a:fillRef idx="0">
+        <a:scrgbClr r="0" g="0" b="0"/>
+      </a:fillRef>
+      <a:effectRef idx="0">
+        <a:scrgbClr r="0" g="0" b="0"/>
+      </a:effectRef>
+      <a:fontRef idx="minor"/>
+    </dgm:style>
+  </dgm:styleLbl>
+</dgm:styleDef>
+</file>
+
+<file path=ppt/diagrams/quickStyle3.xml><?xml version="1.0" encoding="utf-8"?>
 <dgm:styleDef xmlns:dgm="http://schemas.openxmlformats.org/drawingml/2006/diagram" xmlns:a="http://schemas.openxmlformats.org/drawingml/2006/main" uniqueId="urn:microsoft.com/office/officeart/2005/8/quickstyle/simple1">
   <dgm:title val=""/>
   <dgm:desc val=""/>
@@ -10236,38 +13525,37 @@
           </a:p>
         </p:txBody>
       </p:sp>
-      <p:sp>
-        <p:nvSpPr>
-          <p:cNvPr id="5" name="Content Placeholder 4">
+      <p:graphicFrame>
+        <p:nvGraphicFramePr>
+          <p:cNvPr id="31" name="Content Placeholder 4">
             <a:extLst>
               <a:ext uri="{FF2B5EF4-FFF2-40B4-BE49-F238E27FC236}">
-                <a16:creationId xmlns:a16="http://schemas.microsoft.com/office/drawing/2014/main" id="{10A9D081-F84F-4CD9-906C-155C8A46BD27}"/>
+                <a16:creationId xmlns:a16="http://schemas.microsoft.com/office/drawing/2014/main" id="{960C352E-846B-476C-856B-962BEEE5B100}"/>
               </a:ext>
             </a:extLst>
           </p:cNvPr>
-          <p:cNvSpPr>
-            <a:spLocks noGrp="1"/>
-          </p:cNvSpPr>
+          <p:cNvGraphicFramePr>
+            <a:graphicFrameLocks noGrp="1"/>
+          </p:cNvGraphicFramePr>
           <p:nvPr>
             <p:ph idx="1"/>
+            <p:extLst>
+              <p:ext uri="{D42A27DB-BD31-4B8C-83A1-F6EECF244321}">
+                <p14:modId xmlns:p14="http://schemas.microsoft.com/office/powerpoint/2010/main" val="2489606943"/>
+              </p:ext>
+            </p:extLst>
           </p:nvPr>
-        </p:nvSpPr>
-        <p:spPr>
-          <a:xfrm>
-            <a:off x="6503158" y="649480"/>
-            <a:ext cx="4862447" cy="5546047"/>
-          </a:xfrm>
-        </p:spPr>
-        <p:txBody>
-          <a:bodyPr anchor="ctr">
-            <a:normAutofit/>
-          </a:bodyPr>
-          <a:lstStyle/>
-          <a:p>
-            <a:endParaRPr lang="en-US" sz="2000"/>
-          </a:p>
-        </p:txBody>
-      </p:sp>
+        </p:nvGraphicFramePr>
+        <p:xfrm>
+          <a:off x="6503158" y="649480"/>
+          <a:ext cx="4862447" cy="5546047"/>
+        </p:xfrm>
+        <a:graphic>
+          <a:graphicData uri="http://schemas.openxmlformats.org/drawingml/2006/diagram">
+            <dgm:relIds xmlns:dgm="http://schemas.openxmlformats.org/drawingml/2006/diagram" xmlns:r="http://schemas.openxmlformats.org/officeDocument/2006/relationships" r:dm="rId2" r:lo="rId3" r:qs="rId4" r:cs="rId5"/>
+          </a:graphicData>
+        </a:graphic>
+      </p:graphicFrame>
     </p:spTree>
     <p:extLst>
       <p:ext uri="{BB962C8B-B14F-4D97-AF65-F5344CB8AC3E}">
@@ -10986,7 +14274,7 @@
           <a:lstStyle/>
           <a:p>
             <a:r>
-              <a:rPr lang="en-US" sz="4000">
+              <a:rPr lang="en-US" sz="4000" dirty="0">
                 <a:solidFill>
                   <a:srgbClr val="FFFFFF"/>
                 </a:solidFill>
@@ -11020,13 +14308,13 @@
         </p:spPr>
         <p:txBody>
           <a:bodyPr>
-            <a:normAutofit lnSpcReduction="10000"/>
+            <a:normAutofit/>
           </a:bodyPr>
           <a:lstStyle/>
           <a:p>
             <a:r>
               <a:rPr lang="en-US" dirty="0"/>
-              <a:t>Application decoupled from OS</a:t>
+              <a:t>App decoupled from OS</a:t>
             </a:r>
             <a:br>
               <a:rPr lang="en-US" dirty="0"/>
@@ -11046,17 +14334,7 @@
           <a:p>
             <a:r>
               <a:rPr lang="en-US" dirty="0"/>
-              <a:t>Requires Container Engine</a:t>
-            </a:r>
-            <a:br>
-              <a:rPr lang="en-US" dirty="0"/>
-            </a:br>
-            <a:endParaRPr lang="en-US" dirty="0"/>
-          </a:p>
-          <a:p>
-            <a:r>
-              <a:rPr lang="en-US" dirty="0"/>
-              <a:t>Immutable: VM (care for it), immutable (don’t change in Prod)</a:t>
+              <a:t>Immutable: nothing changes in Production</a:t>
             </a:r>
           </a:p>
         </p:txBody>
@@ -12094,7 +15372,7 @@
             <p:ph idx="1"/>
             <p:extLst>
               <p:ext uri="{D42A27DB-BD31-4B8C-83A1-F6EECF244321}">
-                <p14:modId xmlns:p14="http://schemas.microsoft.com/office/powerpoint/2010/main" val="3998422145"/>
+                <p14:modId xmlns:p14="http://schemas.microsoft.com/office/powerpoint/2010/main" val="1514301235"/>
               </p:ext>
             </p:extLst>
           </p:nvPr>
@@ -12504,14 +15782,14 @@
             <p:ph idx="1"/>
             <p:extLst>
               <p:ext uri="{D42A27DB-BD31-4B8C-83A1-F6EECF244321}">
-                <p14:modId xmlns:p14="http://schemas.microsoft.com/office/powerpoint/2010/main" val="894228664"/>
+                <p14:modId xmlns:p14="http://schemas.microsoft.com/office/powerpoint/2010/main" val="3873474887"/>
               </p:ext>
             </p:extLst>
           </p:nvPr>
         </p:nvGraphicFramePr>
         <p:xfrm>
-          <a:off x="644056" y="2112579"/>
-          <a:ext cx="10927829" cy="4192805"/>
+          <a:off x="5968844" y="2112579"/>
+          <a:ext cx="5603041" cy="4540663"/>
         </p:xfrm>
         <a:graphic>
           <a:graphicData uri="http://schemas.openxmlformats.org/drawingml/2006/diagram">
@@ -12519,10 +15797,543 @@
           </a:graphicData>
         </a:graphic>
       </p:graphicFrame>
+      <p:sp>
+        <p:nvSpPr>
+          <p:cNvPr id="3" name="TextBox 2">
+            <a:extLst>
+              <a:ext uri="{FF2B5EF4-FFF2-40B4-BE49-F238E27FC236}">
+                <a16:creationId xmlns:a16="http://schemas.microsoft.com/office/drawing/2014/main" id="{B0E5929E-2FB0-4D70-86AE-13DEA4EECF05}"/>
+              </a:ext>
+            </a:extLst>
+          </p:cNvPr>
+          <p:cNvSpPr txBox="1"/>
+          <p:nvPr/>
+        </p:nvSpPr>
+        <p:spPr>
+          <a:xfrm>
+            <a:off x="538542" y="1985875"/>
+            <a:ext cx="5032005" cy="3539430"/>
+          </a:xfrm>
+          <a:prstGeom prst="rect">
+            <a:avLst/>
+          </a:prstGeom>
+          <a:noFill/>
+        </p:spPr>
+        <p:txBody>
+          <a:bodyPr wrap="square" rtlCol="0">
+            <a:spAutoFit/>
+          </a:bodyPr>
+          <a:lstStyle/>
+          <a:p>
+            <a:pPr marL="285750" indent="-285750">
+              <a:buFont typeface="Arial" panose="020B0604020202020204" pitchFamily="34" charset="0"/>
+              <a:buChar char="•"/>
+            </a:pPr>
+            <a:r>
+              <a:rPr lang="en-US" sz="2800" dirty="0"/>
+              <a:t>Docker supports Open Container Interface (OCI) Standard</a:t>
+            </a:r>
+            <a:br>
+              <a:rPr lang="en-US" sz="2800" dirty="0"/>
+            </a:br>
+            <a:br>
+              <a:rPr lang="en-US" sz="2800" dirty="0"/>
+            </a:br>
+            <a:endParaRPr lang="en-US" sz="2800" dirty="0"/>
+          </a:p>
+          <a:p>
+            <a:pPr marL="285750" indent="-285750">
+              <a:buFont typeface="Arial" panose="020B0604020202020204" pitchFamily="34" charset="0"/>
+              <a:buChar char="•"/>
+            </a:pPr>
+            <a:r>
+              <a:rPr lang="en-US" sz="2800" dirty="0"/>
+              <a:t>Kubernetes runs a different container engine but supports OCI</a:t>
+            </a:r>
+          </a:p>
+        </p:txBody>
+      </p:sp>
     </p:spTree>
     <p:extLst>
       <p:ext uri="{BB962C8B-B14F-4D97-AF65-F5344CB8AC3E}">
         <p14:creationId xmlns:p14="http://schemas.microsoft.com/office/powerpoint/2010/main" val="1134802191"/>
+      </p:ext>
+    </p:extLst>
+  </p:cSld>
+  <p:clrMapOvr>
+    <a:masterClrMapping/>
+  </p:clrMapOvr>
+</p:sld>
+</file>
+
+<file path=ppt/slides/slide7.xml><?xml version="1.0" encoding="utf-8"?>
+<p:sld xmlns:a="http://schemas.openxmlformats.org/drawingml/2006/main" xmlns:r="http://schemas.openxmlformats.org/officeDocument/2006/relationships" xmlns:p="http://schemas.openxmlformats.org/presentationml/2006/main">
+  <p:cSld>
+    <p:bg>
+      <p:bgPr>
+        <a:solidFill>
+          <a:schemeClr val="bg1"/>
+        </a:solidFill>
+        <a:effectLst/>
+      </p:bgPr>
+    </p:bg>
+    <p:spTree>
+      <p:nvGrpSpPr>
+        <p:cNvPr id="1" name=""/>
+        <p:cNvGrpSpPr/>
+        <p:nvPr/>
+      </p:nvGrpSpPr>
+      <p:grpSpPr>
+        <a:xfrm>
+          <a:off x="0" y="0"/>
+          <a:ext cx="0" cy="0"/>
+          <a:chOff x="0" y="0"/>
+          <a:chExt cx="0" cy="0"/>
+        </a:xfrm>
+      </p:grpSpPr>
+      <p:sp>
+        <p:nvSpPr>
+          <p:cNvPr id="28" name="Down Arrow 7">
+            <a:extLst>
+              <a:ext uri="{FF2B5EF4-FFF2-40B4-BE49-F238E27FC236}">
+                <a16:creationId xmlns:a16="http://schemas.microsoft.com/office/drawing/2014/main" id="{D4771268-CB57-404A-9271-370EB28F6090}"/>
+              </a:ext>
+              <a:ext uri="{C183D7F6-B498-43B3-948B-1728B52AA6E4}">
+                <adec:decorative xmlns:adec="http://schemas.microsoft.com/office/drawing/2017/decorative" val="1"/>
+              </a:ext>
+            </a:extLst>
+          </p:cNvPr>
+          <p:cNvSpPr>
+            <a:spLocks noGrp="1" noRot="1" noChangeAspect="1" noMove="1" noResize="1" noEditPoints="1" noAdjustHandles="1" noChangeArrowheads="1" noChangeShapeType="1" noTextEdit="1"/>
+          </p:cNvSpPr>
+          <p:nvPr>
+            <p:extLst>
+              <p:ext uri="{386F3935-93C4-4BCD-93E2-E3B085C9AB24}">
+                <p16:designElem xmlns:p16="http://schemas.microsoft.com/office/powerpoint/2015/main" val="1"/>
+              </p:ext>
+            </p:extLst>
+          </p:nvPr>
+        </p:nvSpPr>
+        <p:spPr>
+          <a:xfrm rot="16200000">
+            <a:off x="800100" y="1491343"/>
+            <a:ext cx="3333749" cy="3499103"/>
+          </a:xfrm>
+          <a:prstGeom prst="downArrow">
+            <a:avLst>
+              <a:gd name="adj1" fmla="val 100000"/>
+              <a:gd name="adj2" fmla="val 15788"/>
+            </a:avLst>
+          </a:prstGeom>
+          <a:solidFill>
+            <a:srgbClr val="404040"/>
+          </a:solidFill>
+          <a:ln w="53975">
+            <a:noFill/>
+          </a:ln>
+        </p:spPr>
+        <p:style>
+          <a:lnRef idx="2">
+            <a:schemeClr val="accent1">
+              <a:shade val="50000"/>
+            </a:schemeClr>
+          </a:lnRef>
+          <a:fillRef idx="1">
+            <a:schemeClr val="accent1"/>
+          </a:fillRef>
+          <a:effectRef idx="0">
+            <a:schemeClr val="accent1"/>
+          </a:effectRef>
+          <a:fontRef idx="minor">
+            <a:schemeClr val="lt1"/>
+          </a:fontRef>
+        </p:style>
+        <p:txBody>
+          <a:bodyPr rtlCol="0" anchor="ctr"/>
+          <a:lstStyle/>
+          <a:p>
+            <a:pPr algn="ctr"/>
+            <a:endParaRPr lang="en-US"/>
+          </a:p>
+        </p:txBody>
+      </p:sp>
+      <p:sp>
+        <p:nvSpPr>
+          <p:cNvPr id="2" name="Title 1">
+            <a:extLst>
+              <a:ext uri="{FF2B5EF4-FFF2-40B4-BE49-F238E27FC236}">
+                <a16:creationId xmlns:a16="http://schemas.microsoft.com/office/drawing/2014/main" id="{17FDB0B4-404A-4054-9FFF-18309E654372}"/>
+              </a:ext>
+            </a:extLst>
+          </p:cNvPr>
+          <p:cNvSpPr>
+            <a:spLocks noGrp="1"/>
+          </p:cNvSpPr>
+          <p:nvPr>
+            <p:ph type="title"/>
+          </p:nvPr>
+        </p:nvSpPr>
+        <p:spPr>
+          <a:xfrm>
+            <a:off x="1028700" y="1967266"/>
+            <a:ext cx="2628900" cy="2547257"/>
+          </a:xfrm>
+          <a:noFill/>
+        </p:spPr>
+        <p:txBody>
+          <a:bodyPr vert="horz" lIns="91440" tIns="45720" rIns="91440" bIns="45720" rtlCol="0" anchor="ctr">
+            <a:normAutofit/>
+          </a:bodyPr>
+          <a:lstStyle/>
+          <a:p>
+            <a:pPr algn="ctr"/>
+            <a:r>
+              <a:rPr lang="en-US" sz="3600" kern="1200">
+                <a:solidFill>
+                  <a:srgbClr val="FFFFFF"/>
+                </a:solidFill>
+                <a:latin typeface="+mj-lt"/>
+                <a:ea typeface="+mj-ea"/>
+                <a:cs typeface="+mj-cs"/>
+              </a:rPr>
+              <a:t>Kubernetes</a:t>
+            </a:r>
+          </a:p>
+        </p:txBody>
+      </p:sp>
+      <p:pic>
+        <p:nvPicPr>
+          <p:cNvPr id="7" name="Content Placeholder 6" descr="A screenshot of a computer&#10;&#10;Description automatically generated with medium confidence">
+            <a:extLst>
+              <a:ext uri="{FF2B5EF4-FFF2-40B4-BE49-F238E27FC236}">
+                <a16:creationId xmlns:a16="http://schemas.microsoft.com/office/drawing/2014/main" id="{3A0FD26B-0809-47B3-B7B9-62FAF82A3743}"/>
+              </a:ext>
+            </a:extLst>
+          </p:cNvPr>
+          <p:cNvPicPr>
+            <a:picLocks noGrp="1" noChangeAspect="1"/>
+          </p:cNvPicPr>
+          <p:nvPr>
+            <p:ph idx="1"/>
+          </p:nvPr>
+        </p:nvPicPr>
+        <p:blipFill>
+          <a:blip r:embed="rId2">
+            <a:extLst>
+              <a:ext uri="{28A0092B-C50C-407E-A947-70E740481C1C}">
+                <a14:useLocalDpi xmlns:a14="http://schemas.microsoft.com/office/drawing/2010/main" val="0"/>
+              </a:ext>
+            </a:extLst>
+          </a:blip>
+          <a:stretch>
+            <a:fillRect/>
+          </a:stretch>
+        </p:blipFill>
+        <p:spPr>
+          <a:xfrm>
+            <a:off x="4777316" y="808790"/>
+            <a:ext cx="6780700" cy="5238090"/>
+          </a:xfrm>
+          <a:prstGeom prst="rect">
+            <a:avLst/>
+          </a:prstGeom>
+        </p:spPr>
+      </p:pic>
+    </p:spTree>
+    <p:extLst>
+      <p:ext uri="{BB962C8B-B14F-4D97-AF65-F5344CB8AC3E}">
+        <p14:creationId xmlns:p14="http://schemas.microsoft.com/office/powerpoint/2010/main" val="2526694344"/>
+      </p:ext>
+    </p:extLst>
+  </p:cSld>
+  <p:clrMapOvr>
+    <a:masterClrMapping/>
+  </p:clrMapOvr>
+</p:sld>
+</file>
+
+<file path=ppt/slides/slide8.xml><?xml version="1.0" encoding="utf-8"?>
+<p:sld xmlns:a="http://schemas.openxmlformats.org/drawingml/2006/main" xmlns:r="http://schemas.openxmlformats.org/officeDocument/2006/relationships" xmlns:p="http://schemas.openxmlformats.org/presentationml/2006/main">
+  <p:cSld>
+    <p:bg>
+      <p:bgPr>
+        <a:solidFill>
+          <a:schemeClr val="bg1"/>
+        </a:solidFill>
+        <a:effectLst/>
+      </p:bgPr>
+    </p:bg>
+    <p:spTree>
+      <p:nvGrpSpPr>
+        <p:cNvPr id="1" name=""/>
+        <p:cNvGrpSpPr/>
+        <p:nvPr/>
+      </p:nvGrpSpPr>
+      <p:grpSpPr>
+        <a:xfrm>
+          <a:off x="0" y="0"/>
+          <a:ext cx="0" cy="0"/>
+          <a:chOff x="0" y="0"/>
+          <a:chExt cx="0" cy="0"/>
+        </a:xfrm>
+      </p:grpSpPr>
+      <p:sp useBgFill="1">
+        <p:nvSpPr>
+          <p:cNvPr id="17" name="Rectangle 16">
+            <a:extLst>
+              <a:ext uri="{FF2B5EF4-FFF2-40B4-BE49-F238E27FC236}">
+                <a16:creationId xmlns:a16="http://schemas.microsoft.com/office/drawing/2014/main" id="{85016AEC-0320-4ED0-8ECB-FE11DDDFE17A}"/>
+              </a:ext>
+              <a:ext uri="{C183D7F6-B498-43B3-948B-1728B52AA6E4}">
+                <adec:decorative xmlns:adec="http://schemas.microsoft.com/office/drawing/2017/decorative" val="1"/>
+              </a:ext>
+            </a:extLst>
+          </p:cNvPr>
+          <p:cNvSpPr>
+            <a:spLocks noGrp="1" noRot="1" noChangeAspect="1" noMove="1" noResize="1" noEditPoints="1" noAdjustHandles="1" noChangeArrowheads="1" noChangeShapeType="1" noTextEdit="1"/>
+          </p:cNvSpPr>
+          <p:nvPr>
+            <p:extLst>
+              <p:ext uri="{386F3935-93C4-4BCD-93E2-E3B085C9AB24}">
+                <p16:designElem xmlns:p16="http://schemas.microsoft.com/office/powerpoint/2015/main" val="1"/>
+              </p:ext>
+            </p:extLst>
+          </p:nvPr>
+        </p:nvSpPr>
+        <p:spPr>
+          <a:xfrm>
+            <a:off x="-1" y="0"/>
+            <a:ext cx="12191695" cy="6858000"/>
+          </a:xfrm>
+          <a:prstGeom prst="rect">
+            <a:avLst/>
+          </a:prstGeom>
+          <a:ln>
+            <a:noFill/>
+          </a:ln>
+        </p:spPr>
+        <p:style>
+          <a:lnRef idx="2">
+            <a:schemeClr val="accent1">
+              <a:shade val="50000"/>
+            </a:schemeClr>
+          </a:lnRef>
+          <a:fillRef idx="1">
+            <a:schemeClr val="accent1"/>
+          </a:fillRef>
+          <a:effectRef idx="0">
+            <a:schemeClr val="accent1"/>
+          </a:effectRef>
+          <a:fontRef idx="minor">
+            <a:schemeClr val="lt1"/>
+          </a:fontRef>
+        </p:style>
+        <p:txBody>
+          <a:bodyPr rtlCol="0" anchor="ctr"/>
+          <a:lstStyle/>
+          <a:p>
+            <a:pPr algn="ctr"/>
+            <a:endParaRPr lang="en-US"/>
+          </a:p>
+        </p:txBody>
+      </p:sp>
+      <p:sp>
+        <p:nvSpPr>
+          <p:cNvPr id="2" name="Title 1">
+            <a:extLst>
+              <a:ext uri="{FF2B5EF4-FFF2-40B4-BE49-F238E27FC236}">
+                <a16:creationId xmlns:a16="http://schemas.microsoft.com/office/drawing/2014/main" id="{73594F39-8D08-4CD3-A6F2-51DBB9970DC3}"/>
+              </a:ext>
+            </a:extLst>
+          </p:cNvPr>
+          <p:cNvSpPr>
+            <a:spLocks noGrp="1"/>
+          </p:cNvSpPr>
+          <p:nvPr>
+            <p:ph type="title"/>
+          </p:nvPr>
+        </p:nvSpPr>
+        <p:spPr>
+          <a:xfrm>
+            <a:off x="1349531" y="4233675"/>
+            <a:ext cx="4424430" cy="2015774"/>
+          </a:xfrm>
+        </p:spPr>
+        <p:txBody>
+          <a:bodyPr>
+            <a:normAutofit/>
+          </a:bodyPr>
+          <a:lstStyle/>
+          <a:p>
+            <a:r>
+              <a:rPr lang="en-US" sz="4000"/>
+              <a:t>GitOps</a:t>
+            </a:r>
+          </a:p>
+        </p:txBody>
+      </p:sp>
+      <p:sp>
+        <p:nvSpPr>
+          <p:cNvPr id="19" name="Rectangle 18">
+            <a:extLst>
+              <a:ext uri="{FF2B5EF4-FFF2-40B4-BE49-F238E27FC236}">
+                <a16:creationId xmlns:a16="http://schemas.microsoft.com/office/drawing/2014/main" id="{C70C3B59-DE2C-4611-8148-812575C5CA48}"/>
+              </a:ext>
+              <a:ext uri="{C183D7F6-B498-43B3-948B-1728B52AA6E4}">
+                <adec:decorative xmlns:adec="http://schemas.microsoft.com/office/drawing/2017/decorative" val="1"/>
+              </a:ext>
+            </a:extLst>
+          </p:cNvPr>
+          <p:cNvSpPr>
+            <a:spLocks noGrp="1" noRot="1" noChangeAspect="1" noMove="1" noResize="1" noEditPoints="1" noAdjustHandles="1" noChangeArrowheads="1" noChangeShapeType="1" noTextEdit="1"/>
+          </p:cNvSpPr>
+          <p:nvPr>
+            <p:extLst>
+              <p:ext uri="{386F3935-93C4-4BCD-93E2-E3B085C9AB24}">
+                <p16:designElem xmlns:p16="http://schemas.microsoft.com/office/powerpoint/2015/main" val="1"/>
+              </p:ext>
+            </p:extLst>
+          </p:nvPr>
+        </p:nvSpPr>
+        <p:spPr>
+          <a:xfrm>
+            <a:off x="0" y="891540"/>
+            <a:ext cx="722376" cy="5071110"/>
+          </a:xfrm>
+          <a:prstGeom prst="rect">
+            <a:avLst/>
+          </a:prstGeom>
+          <a:solidFill>
+            <a:srgbClr val="4C5254"/>
+          </a:solidFill>
+          <a:ln>
+            <a:noFill/>
+          </a:ln>
+        </p:spPr>
+        <p:style>
+          <a:lnRef idx="2">
+            <a:schemeClr val="accent1">
+              <a:shade val="50000"/>
+            </a:schemeClr>
+          </a:lnRef>
+          <a:fillRef idx="1">
+            <a:schemeClr val="accent1"/>
+          </a:fillRef>
+          <a:effectRef idx="0">
+            <a:schemeClr val="accent1"/>
+          </a:effectRef>
+          <a:fontRef idx="minor">
+            <a:schemeClr val="lt1"/>
+          </a:fontRef>
+        </p:style>
+        <p:txBody>
+          <a:bodyPr rtlCol="0" anchor="ctr"/>
+          <a:lstStyle/>
+          <a:p>
+            <a:pPr algn="ctr"/>
+            <a:endParaRPr lang="en-US"/>
+          </a:p>
+        </p:txBody>
+      </p:sp>
+      <p:pic>
+        <p:nvPicPr>
+          <p:cNvPr id="5" name="Picture 4" descr="Diagram&#10;&#10;Description automatically generated">
+            <a:extLst>
+              <a:ext uri="{FF2B5EF4-FFF2-40B4-BE49-F238E27FC236}">
+                <a16:creationId xmlns:a16="http://schemas.microsoft.com/office/drawing/2014/main" id="{3C90871A-5938-4F8F-9B90-81B4EDE200B4}"/>
+              </a:ext>
+            </a:extLst>
+          </p:cNvPr>
+          <p:cNvPicPr>
+            <a:picLocks noChangeAspect="1"/>
+          </p:cNvPicPr>
+          <p:nvPr/>
+        </p:nvPicPr>
+        <p:blipFill>
+          <a:blip r:embed="rId2"/>
+          <a:stretch>
+            <a:fillRect/>
+          </a:stretch>
+        </p:blipFill>
+        <p:spPr>
+          <a:xfrm>
+            <a:off x="1349531" y="917931"/>
+            <a:ext cx="10228659" cy="3017453"/>
+          </a:xfrm>
+          <a:prstGeom prst="rect">
+            <a:avLst/>
+          </a:prstGeom>
+          <a:effectLst>
+            <a:outerShdw blurRad="406400" dist="317500" dir="5400000" sx="89000" sy="89000" rotWithShape="0">
+              <a:prstClr val="black">
+                <a:alpha val="15000"/>
+              </a:prstClr>
+            </a:outerShdw>
+          </a:effectLst>
+        </p:spPr>
+      </p:pic>
+      <p:sp>
+        <p:nvSpPr>
+          <p:cNvPr id="3" name="Content Placeholder 2">
+            <a:extLst>
+              <a:ext uri="{FF2B5EF4-FFF2-40B4-BE49-F238E27FC236}">
+                <a16:creationId xmlns:a16="http://schemas.microsoft.com/office/drawing/2014/main" id="{82B3C30A-EE9C-4DB0-B3C6-F9771A3D4DB5}"/>
+              </a:ext>
+            </a:extLst>
+          </p:cNvPr>
+          <p:cNvSpPr>
+            <a:spLocks noGrp="1"/>
+          </p:cNvSpPr>
+          <p:nvPr>
+            <p:ph idx="1"/>
+          </p:nvPr>
+        </p:nvSpPr>
+        <p:spPr>
+          <a:xfrm>
+            <a:off x="6417733" y="4212709"/>
+            <a:ext cx="5160457" cy="2036742"/>
+          </a:xfrm>
+        </p:spPr>
+        <p:txBody>
+          <a:bodyPr anchor="ctr">
+            <a:normAutofit/>
+          </a:bodyPr>
+          <a:lstStyle/>
+          <a:p>
+            <a:r>
+              <a:rPr lang="en-US" sz="2000"/>
+              <a:t>Describe Infrastructure </a:t>
+            </a:r>
+            <a:r>
+              <a:rPr lang="de-AT" sz="2000"/>
+              <a:t>as Code</a:t>
+            </a:r>
+          </a:p>
+          <a:p>
+            <a:r>
+              <a:rPr lang="de-AT" sz="2000"/>
+              <a:t>Store in Git repository</a:t>
+            </a:r>
+          </a:p>
+          <a:p>
+            <a:r>
+              <a:rPr lang="de-AT" sz="2000"/>
+              <a:t>Trigger CI/CD for Desired State</a:t>
+            </a:r>
+          </a:p>
+          <a:p>
+            <a:r>
+              <a:rPr lang="de-AT" sz="2000"/>
+              <a:t>Version control for infrastucture changes</a:t>
+            </a:r>
+            <a:endParaRPr lang="en-US" sz="2000"/>
+          </a:p>
+        </p:txBody>
+      </p:sp>
+    </p:spTree>
+    <p:extLst>
+      <p:ext uri="{BB962C8B-B14F-4D97-AF65-F5344CB8AC3E}">
+        <p14:creationId xmlns:p14="http://schemas.microsoft.com/office/powerpoint/2010/main" val="609298913"/>
       </p:ext>
     </p:extLst>
   </p:cSld>

</xml_diff>